<commit_message>
Update WDS trainer presentation - Windows Virtual Desktop.pptx
</commit_message>
<xml_diff>
--- a/Whiteboard-design-session/WDS trainer presentation - Windows Virtual Desktop.pptx
+++ b/Whiteboard-design-session/WDS trainer presentation - Windows Virtual Desktop.pptx
@@ -155,8 +155,8 @@
 <file path=ppt/revisionInfo.xml><?xml version="1.0" encoding="utf-8"?>
 <p1510:revInfo xmlns:a="http://schemas.openxmlformats.org/drawingml/2006/main" xmlns:r="http://schemas.openxmlformats.org/officeDocument/2006/relationships" xmlns:p1510="http://schemas.microsoft.com/office/powerpoint/2015/10/main">
   <p1510:revLst>
+    <p1510:client id="{45DAC7FA-35A3-433A-B1DD-BD527FEE6E7D}" v="47" dt="2020-06-18T20:43:30.278"/>
     <p1510:client id="{533E8348-C747-4E3C-A039-FC8951A33AF0}" v="21" dt="2020-06-18T15:16:43.100"/>
-    <p1510:client id="{45DAC7FA-35A3-433A-B1DD-BD527FEE6E7D}" v="47" dt="2020-06-18T20:43:30.278"/>
   </p1510:revLst>
 </p1510:revInfo>
 </file>
@@ -243,7 +243,7 @@
           <a:p>
             <a:fld id="{52A13B17-C506-4D51-BB37-16B365906619}" type="datetimeFigureOut">
               <a:rPr lang="en-US" smtClean="0"/>
-              <a:t>6/18/2020</a:t>
+              <a:t>6/24/20</a:t>
             </a:fld>
             <a:endParaRPr lang="en-US" dirty="0"/>
           </a:p>
@@ -1782,7 +1782,18 @@
           <a:bodyPr/>
           <a:lstStyle/>
           <a:p>
-            <a:endParaRPr lang="en-US" dirty="0"/>
+            <a:r>
+              <a:rPr lang="en-US" dirty="0"/>
+              <a:t>Add, cloud app sec, </a:t>
+            </a:r>
+            <a:r>
+              <a:rPr lang="en-US" dirty="0" err="1"/>
+              <a:t>sentinal</a:t>
+            </a:r>
+            <a:r>
+              <a:rPr lang="en-US" dirty="0"/>
+              <a:t> , ATP</a:t>
+            </a:r>
           </a:p>
         </p:txBody>
       </p:sp>
@@ -1793,7 +1804,7 @@
             <a:spLocks noGrp="1"/>
           </p:cNvSpPr>
           <p:nvPr>
-            <p:ph type="sldNum" sz="quarter" idx="10"/>
+            <p:ph type="sldNum" sz="quarter" idx="5"/>
           </p:nvPr>
         </p:nvSpPr>
         <p:spPr/>
@@ -1803,7 +1814,7 @@
           <a:p>
             <a:fld id="{0998D5BB-B127-481F-BC0A-2F77C576BB34}" type="slidenum">
               <a:rPr lang="en-US" smtClean="0"/>
-              <a:t>24</a:t>
+              <a:t>23</a:t>
             </a:fld>
             <a:endParaRPr lang="en-US" dirty="0"/>
           </a:p>
@@ -1812,7 +1823,7 @@
     </p:spTree>
     <p:extLst>
       <p:ext uri="{BB962C8B-B14F-4D97-AF65-F5344CB8AC3E}">
-        <p14:creationId xmlns:p14="http://schemas.microsoft.com/office/powerpoint/2010/main" val="3608391534"/>
+        <p14:creationId xmlns:p14="http://schemas.microsoft.com/office/powerpoint/2010/main" val="3839677113"/>
       </p:ext>
     </p:extLst>
   </p:cSld>
@@ -1866,7 +1877,24 @@
           <a:bodyPr/>
           <a:lstStyle/>
           <a:p>
-            <a:endParaRPr lang="en-US" dirty="0"/>
+            <a:r>
+              <a:rPr lang="en-US" dirty="0"/>
+              <a:t>Change regions for CA</a:t>
+            </a:r>
+          </a:p>
+          <a:p>
+            <a:r>
+              <a:rPr lang="en-US" dirty="0"/>
+              <a:t>Add Service Map under </a:t>
+            </a:r>
+            <a:r>
+              <a:rPr lang="en-US" dirty="0" err="1"/>
+              <a:t>montioring</a:t>
+            </a:r>
+            <a:r>
+              <a:rPr lang="en-US" dirty="0"/>
+              <a:t> and alerting</a:t>
+            </a:r>
           </a:p>
         </p:txBody>
       </p:sp>
@@ -1887,7 +1915,7 @@
           <a:p>
             <a:fld id="{0998D5BB-B127-481F-BC0A-2F77C576BB34}" type="slidenum">
               <a:rPr lang="en-US" smtClean="0"/>
-              <a:t>25</a:t>
+              <a:t>24</a:t>
             </a:fld>
             <a:endParaRPr lang="en-US" dirty="0"/>
           </a:p>
@@ -1896,7 +1924,7 @@
     </p:spTree>
     <p:extLst>
       <p:ext uri="{BB962C8B-B14F-4D97-AF65-F5344CB8AC3E}">
-        <p14:creationId xmlns:p14="http://schemas.microsoft.com/office/powerpoint/2010/main" val="3449361915"/>
+        <p14:creationId xmlns:p14="http://schemas.microsoft.com/office/powerpoint/2010/main" val="3608391534"/>
       </p:ext>
     </p:extLst>
   </p:cSld>
@@ -1950,7 +1978,18 @@
           <a:bodyPr/>
           <a:lstStyle/>
           <a:p>
-            <a:endParaRPr lang="en-US" dirty="0"/>
+            <a:r>
+              <a:rPr lang="en-US" dirty="0"/>
+              <a:t>Use managed image, use VHD as alternate, app delivery through </a:t>
+            </a:r>
+            <a:r>
+              <a:rPr lang="en-US" dirty="0" err="1"/>
+              <a:t>wvd</a:t>
+            </a:r>
+            <a:r>
+              <a:rPr lang="en-US" dirty="0"/>
+              <a:t>, </a:t>
+            </a:r>
           </a:p>
         </p:txBody>
       </p:sp>
@@ -1971,7 +2010,7 @@
           <a:p>
             <a:fld id="{0998D5BB-B127-481F-BC0A-2F77C576BB34}" type="slidenum">
               <a:rPr lang="en-US" smtClean="0"/>
-              <a:t>26</a:t>
+              <a:t>25</a:t>
             </a:fld>
             <a:endParaRPr lang="en-US" dirty="0"/>
           </a:p>
@@ -1980,7 +2019,7 @@
     </p:spTree>
     <p:extLst>
       <p:ext uri="{BB962C8B-B14F-4D97-AF65-F5344CB8AC3E}">
-        <p14:creationId xmlns:p14="http://schemas.microsoft.com/office/powerpoint/2010/main" val="2968351838"/>
+        <p14:creationId xmlns:p14="http://schemas.microsoft.com/office/powerpoint/2010/main" val="3449361915"/>
       </p:ext>
     </p:extLst>
   </p:cSld>
@@ -2035,43 +2074,27 @@
           <a:lstStyle/>
           <a:p>
             <a:r>
-              <a:rPr lang="en-US" sz="1200" b="1" kern="1200" dirty="0">
-                <a:solidFill>
-                  <a:schemeClr val="tx1"/>
-                </a:solidFill>
-                <a:effectLst/>
-                <a:latin typeface="+mn-lt"/>
-                <a:ea typeface="+mn-ea"/>
-                <a:cs typeface="+mn-cs"/>
-              </a:rPr>
-              <a:t>**Objection:**</a:t>
-            </a:r>
-          </a:p>
-          <a:p>
-            <a:br>
-              <a:rPr lang="en-US" sz="1200" b="0" kern="1200" dirty="0">
-                <a:solidFill>
-                  <a:schemeClr val="tx1"/>
-                </a:solidFill>
-                <a:effectLst/>
-                <a:latin typeface="+mn-lt"/>
-                <a:ea typeface="+mn-ea"/>
-                <a:cs typeface="+mn-cs"/>
-              </a:rPr>
-            </a:br>
-            <a:r>
-              <a:rPr lang="en-US" sz="1200" b="1" kern="1200" dirty="0">
-                <a:solidFill>
-                  <a:schemeClr val="tx1"/>
-                </a:solidFill>
-                <a:effectLst/>
-                <a:latin typeface="+mn-lt"/>
-                <a:ea typeface="+mn-ea"/>
-                <a:cs typeface="+mn-cs"/>
-              </a:rPr>
-              <a:t>**Answer:**</a:t>
-            </a:r>
-            <a:endParaRPr lang="en-US" dirty="0"/>
+              <a:rPr lang="en-US" dirty="0"/>
+              <a:t>Change to 250 users per 25 VMs</a:t>
+            </a:r>
+          </a:p>
+          <a:p>
+            <a:r>
+              <a:rPr lang="en-US" dirty="0"/>
+              <a:t>Call out workload scaling general guidelines/user personas </a:t>
+            </a:r>
+          </a:p>
+          <a:p>
+            <a:r>
+              <a:rPr lang="en-US" dirty="0"/>
+              <a:t>Published desktops (clinical) or published apps (non-clinical)? </a:t>
+            </a:r>
+          </a:p>
+          <a:p>
+            <a:r>
+              <a:rPr lang="en-US" dirty="0"/>
+              <a:t>Initial workload for non-clinical users (single host pool)</a:t>
+            </a:r>
           </a:p>
         </p:txBody>
       </p:sp>
@@ -2092,7 +2115,7 @@
           <a:p>
             <a:fld id="{0998D5BB-B127-481F-BC0A-2F77C576BB34}" type="slidenum">
               <a:rPr lang="en-US" smtClean="0"/>
-              <a:t>28</a:t>
+              <a:t>26</a:t>
             </a:fld>
             <a:endParaRPr lang="en-US" dirty="0"/>
           </a:p>
@@ -2101,7 +2124,7 @@
     </p:spTree>
     <p:extLst>
       <p:ext uri="{BB962C8B-B14F-4D97-AF65-F5344CB8AC3E}">
-        <p14:creationId xmlns:p14="http://schemas.microsoft.com/office/powerpoint/2010/main" val="4115832635"/>
+        <p14:creationId xmlns:p14="http://schemas.microsoft.com/office/powerpoint/2010/main" val="2968351838"/>
       </p:ext>
     </p:extLst>
   </p:cSld>
@@ -2156,43 +2179,27 @@
           <a:lstStyle/>
           <a:p>
             <a:r>
-              <a:rPr lang="en-US" sz="1200" b="1" kern="1200" dirty="0">
-                <a:solidFill>
-                  <a:schemeClr val="tx1"/>
-                </a:solidFill>
-                <a:effectLst/>
-                <a:latin typeface="+mn-lt"/>
-                <a:ea typeface="+mn-ea"/>
-                <a:cs typeface="+mn-cs"/>
-              </a:rPr>
-              <a:t>**Objection:**</a:t>
-            </a:r>
-          </a:p>
-          <a:p>
-            <a:br>
-              <a:rPr lang="en-US" sz="1200" b="0" kern="1200" dirty="0">
-                <a:solidFill>
-                  <a:schemeClr val="tx1"/>
-                </a:solidFill>
-                <a:effectLst/>
-                <a:latin typeface="+mn-lt"/>
-                <a:ea typeface="+mn-ea"/>
-                <a:cs typeface="+mn-cs"/>
-              </a:rPr>
-            </a:br>
-            <a:r>
-              <a:rPr lang="en-US" sz="1200" b="1" kern="1200" dirty="0">
-                <a:solidFill>
-                  <a:schemeClr val="tx1"/>
-                </a:solidFill>
-                <a:effectLst/>
-                <a:latin typeface="+mn-lt"/>
-                <a:ea typeface="+mn-ea"/>
-                <a:cs typeface="+mn-cs"/>
-              </a:rPr>
-              <a:t>**Answer:**</a:t>
-            </a:r>
-            <a:endParaRPr lang="en-US" dirty="0"/>
+              <a:rPr lang="en-US" dirty="0"/>
+              <a:t>Update based on new icons </a:t>
+            </a:r>
+          </a:p>
+          <a:p>
+            <a:r>
+              <a:rPr lang="en-US" dirty="0"/>
+              <a:t>Both sites should connect to Azure</a:t>
+            </a:r>
+          </a:p>
+          <a:p>
+            <a:r>
+              <a:rPr lang="en-US" dirty="0"/>
+              <a:t>More emphasis on peering</a:t>
+            </a:r>
+          </a:p>
+          <a:p>
+            <a:r>
+              <a:rPr lang="en-US" dirty="0"/>
+              <a:t>Need WVD control plane</a:t>
+            </a:r>
           </a:p>
         </p:txBody>
       </p:sp>
@@ -2203,7 +2210,7 @@
             <a:spLocks noGrp="1"/>
           </p:cNvSpPr>
           <p:nvPr>
-            <p:ph type="sldNum" sz="quarter" idx="10"/>
+            <p:ph type="sldNum" sz="quarter" idx="5"/>
           </p:nvPr>
         </p:nvSpPr>
         <p:spPr/>
@@ -2213,7 +2220,7 @@
           <a:p>
             <a:fld id="{0998D5BB-B127-481F-BC0A-2F77C576BB34}" type="slidenum">
               <a:rPr lang="en-US" smtClean="0"/>
-              <a:t>29</a:t>
+              <a:t>27</a:t>
             </a:fld>
             <a:endParaRPr lang="en-US" dirty="0"/>
           </a:p>
@@ -2222,7 +2229,7 @@
     </p:spTree>
     <p:extLst>
       <p:ext uri="{BB962C8B-B14F-4D97-AF65-F5344CB8AC3E}">
-        <p14:creationId xmlns:p14="http://schemas.microsoft.com/office/powerpoint/2010/main" val="4041440512"/>
+        <p14:creationId xmlns:p14="http://schemas.microsoft.com/office/powerpoint/2010/main" val="11525056"/>
       </p:ext>
     </p:extLst>
   </p:cSld>
@@ -2313,11 +2320,71 @@
               </a:rPr>
               <a:t>**Answer:**</a:t>
             </a:r>
-            <a:endParaRPr lang="en-US" dirty="0">
+          </a:p>
+          <a:p>
+            <a:endParaRPr lang="en-US" sz="1200" b="1" kern="1200" dirty="0">
               <a:solidFill>
-                <a:schemeClr val="bg1"/>
+                <a:schemeClr val="tx1"/>
               </a:solidFill>
+              <a:effectLst/>
+              <a:latin typeface="+mn-lt"/>
+              <a:ea typeface="+mn-ea"/>
+              <a:cs typeface="+mn-cs"/>
             </a:endParaRPr>
+          </a:p>
+          <a:p>
+            <a:r>
+              <a:rPr lang="en-US" sz="1200" b="1" kern="1200" dirty="0">
+                <a:solidFill>
+                  <a:schemeClr val="tx1"/>
+                </a:solidFill>
+                <a:effectLst/>
+                <a:latin typeface="+mn-lt"/>
+                <a:ea typeface="+mn-ea"/>
+                <a:cs typeface="+mn-cs"/>
+              </a:rPr>
+              <a:t>Focus more on WVD native solution, then talk about how Citrix &amp; VMWare changes the solution. (note that Citrix &amp; VMWare brings shorter time to solution)</a:t>
+            </a:r>
+          </a:p>
+          <a:p>
+            <a:r>
+              <a:rPr lang="en-US" sz="1200" b="1" kern="1200" dirty="0">
+                <a:solidFill>
+                  <a:schemeClr val="tx1"/>
+                </a:solidFill>
+                <a:effectLst/>
+                <a:latin typeface="+mn-lt"/>
+                <a:ea typeface="+mn-ea"/>
+                <a:cs typeface="+mn-cs"/>
+              </a:rPr>
+              <a:t>Move this obj to the end</a:t>
+            </a:r>
+          </a:p>
+          <a:p>
+            <a:endParaRPr lang="en-US" sz="1200" b="1" kern="1200" dirty="0">
+              <a:solidFill>
+                <a:schemeClr val="tx1"/>
+              </a:solidFill>
+              <a:effectLst/>
+              <a:latin typeface="+mn-lt"/>
+              <a:ea typeface="+mn-ea"/>
+              <a:cs typeface="+mn-cs"/>
+            </a:endParaRPr>
+          </a:p>
+          <a:p>
+            <a:r>
+              <a:rPr lang="en-US" sz="1200" b="1" kern="1200" dirty="0">
+                <a:solidFill>
+                  <a:schemeClr val="tx1"/>
+                </a:solidFill>
+                <a:effectLst/>
+                <a:latin typeface="+mn-lt"/>
+                <a:ea typeface="+mn-ea"/>
+                <a:cs typeface="+mn-cs"/>
+              </a:rPr>
+              <a:t>Segway to AMP </a:t>
+            </a:r>
+            <a:endParaRPr lang="en-US" dirty="0"/>
           </a:p>
         </p:txBody>
       </p:sp>
@@ -2338,7 +2405,7 @@
           <a:p>
             <a:fld id="{0998D5BB-B127-481F-BC0A-2F77C576BB34}" type="slidenum">
               <a:rPr lang="en-US" smtClean="0"/>
-              <a:t>30</a:t>
+              <a:t>28</a:t>
             </a:fld>
             <a:endParaRPr lang="en-US" dirty="0"/>
           </a:p>
@@ -2347,7 +2414,7 @@
     </p:spTree>
     <p:extLst>
       <p:ext uri="{BB962C8B-B14F-4D97-AF65-F5344CB8AC3E}">
-        <p14:creationId xmlns:p14="http://schemas.microsoft.com/office/powerpoint/2010/main" val="1067831621"/>
+        <p14:creationId xmlns:p14="http://schemas.microsoft.com/office/powerpoint/2010/main" val="4115832635"/>
       </p:ext>
     </p:extLst>
   </p:cSld>
@@ -2438,7 +2505,9 @@
               </a:rPr>
               <a:t>**Answer:**</a:t>
             </a:r>
-            <a:endParaRPr lang="en-US" sz="1200" b="0" kern="1200" dirty="0">
+          </a:p>
+          <a:p>
+            <a:endParaRPr lang="en-US" sz="1200" b="1" kern="1200" dirty="0">
               <a:solidFill>
                 <a:schemeClr val="tx1"/>
               </a:solidFill>
@@ -2447,6 +2516,21 @@
               <a:ea typeface="+mn-ea"/>
               <a:cs typeface="+mn-cs"/>
             </a:endParaRPr>
+          </a:p>
+          <a:p>
+            <a:r>
+              <a:rPr lang="en-US" sz="1200" b="1" kern="1200" dirty="0">
+                <a:solidFill>
+                  <a:schemeClr val="tx1"/>
+                </a:solidFill>
+                <a:effectLst/>
+                <a:latin typeface="+mn-lt"/>
+                <a:ea typeface="+mn-ea"/>
+                <a:cs typeface="+mn-cs"/>
+              </a:rPr>
+              <a:t>Add non-windows OS scenario to this objection (macs and thin clients)</a:t>
+            </a:r>
+            <a:endParaRPr lang="en-US" dirty="0"/>
           </a:p>
         </p:txBody>
       </p:sp>
@@ -2467,7 +2551,7 @@
           <a:p>
             <a:fld id="{0998D5BB-B127-481F-BC0A-2F77C576BB34}" type="slidenum">
               <a:rPr lang="en-US" smtClean="0"/>
-              <a:t>31</a:t>
+              <a:t>29</a:t>
             </a:fld>
             <a:endParaRPr lang="en-US" dirty="0"/>
           </a:p>
@@ -2476,7 +2560,7 @@
     </p:spTree>
     <p:extLst>
       <p:ext uri="{BB962C8B-B14F-4D97-AF65-F5344CB8AC3E}">
-        <p14:creationId xmlns:p14="http://schemas.microsoft.com/office/powerpoint/2010/main" val="4205639758"/>
+        <p14:creationId xmlns:p14="http://schemas.microsoft.com/office/powerpoint/2010/main" val="4041440512"/>
       </p:ext>
     </p:extLst>
   </p:cSld>
@@ -2567,7 +2651,9 @@
               </a:rPr>
               <a:t>**Answer:**</a:t>
             </a:r>
-            <a:endParaRPr lang="en-US" sz="1200" b="0" kern="1200" dirty="0">
+          </a:p>
+          <a:p>
+            <a:endParaRPr lang="en-US" sz="1200" b="1" kern="1200" dirty="0">
               <a:solidFill>
                 <a:schemeClr val="tx1"/>
               </a:solidFill>
@@ -2575,6 +2661,74 @@
               <a:latin typeface="+mn-lt"/>
               <a:ea typeface="+mn-ea"/>
               <a:cs typeface="+mn-cs"/>
+            </a:endParaRPr>
+          </a:p>
+          <a:p>
+            <a:r>
+              <a:rPr lang="en-US" sz="1200" b="1" kern="1200" dirty="0">
+                <a:solidFill>
+                  <a:schemeClr val="tx1"/>
+                </a:solidFill>
+                <a:effectLst/>
+                <a:latin typeface="+mn-lt"/>
+                <a:ea typeface="+mn-ea"/>
+                <a:cs typeface="+mn-cs"/>
+              </a:rPr>
+              <a:t>Note that Cloud App Security requires additional license</a:t>
+            </a:r>
+          </a:p>
+          <a:p>
+            <a:endParaRPr lang="en-US" sz="1200" b="1" kern="1200" dirty="0">
+              <a:solidFill>
+                <a:schemeClr val="tx1"/>
+              </a:solidFill>
+              <a:effectLst/>
+              <a:latin typeface="+mn-lt"/>
+              <a:ea typeface="+mn-ea"/>
+              <a:cs typeface="+mn-cs"/>
+            </a:endParaRPr>
+          </a:p>
+          <a:p>
+            <a:r>
+              <a:rPr lang="en-US" sz="1200" b="1" kern="1200" dirty="0">
+                <a:solidFill>
+                  <a:schemeClr val="tx1"/>
+                </a:solidFill>
+                <a:effectLst/>
+                <a:latin typeface="+mn-lt"/>
+                <a:ea typeface="+mn-ea"/>
+                <a:cs typeface="+mn-cs"/>
+              </a:rPr>
+              <a:t>Callout </a:t>
+            </a:r>
+            <a:r>
+              <a:rPr lang="en-US" sz="1200" b="1" kern="1200" dirty="0" err="1">
+                <a:solidFill>
+                  <a:schemeClr val="tx1"/>
+                </a:solidFill>
+                <a:effectLst/>
+                <a:latin typeface="+mn-lt"/>
+                <a:ea typeface="+mn-ea"/>
+                <a:cs typeface="+mn-cs"/>
+              </a:rPr>
+              <a:t>Sentinal</a:t>
+            </a:r>
+            <a:r>
+              <a:rPr lang="en-US" sz="1200" b="1" kern="1200" dirty="0">
+                <a:solidFill>
+                  <a:schemeClr val="tx1"/>
+                </a:solidFill>
+                <a:effectLst/>
+                <a:latin typeface="+mn-lt"/>
+                <a:ea typeface="+mn-ea"/>
+                <a:cs typeface="+mn-cs"/>
+              </a:rPr>
+              <a:t>, Defender ATP, Security Center</a:t>
+            </a:r>
+            <a:endParaRPr lang="en-US" dirty="0">
+              <a:solidFill>
+                <a:schemeClr val="bg1"/>
+              </a:solidFill>
             </a:endParaRPr>
           </a:p>
         </p:txBody>
@@ -2596,7 +2750,7 @@
           <a:p>
             <a:fld id="{0998D5BB-B127-481F-BC0A-2F77C576BB34}" type="slidenum">
               <a:rPr lang="en-US" smtClean="0"/>
-              <a:t>32</a:t>
+              <a:t>30</a:t>
             </a:fld>
             <a:endParaRPr lang="en-US" dirty="0"/>
           </a:p>
@@ -2605,7 +2759,7 @@
     </p:spTree>
     <p:extLst>
       <p:ext uri="{BB962C8B-B14F-4D97-AF65-F5344CB8AC3E}">
-        <p14:creationId xmlns:p14="http://schemas.microsoft.com/office/powerpoint/2010/main" val="347754989"/>
+        <p14:creationId xmlns:p14="http://schemas.microsoft.com/office/powerpoint/2010/main" val="1067831621"/>
       </p:ext>
     </p:extLst>
   </p:cSld>
@@ -2642,12 +2796,7 @@
             <p:ph type="sldImg"/>
           </p:nvPr>
         </p:nvSpPr>
-        <p:spPr>
-          <a:xfrm>
-            <a:off x="381000" y="685800"/>
-            <a:ext cx="6096000" cy="3429000"/>
-          </a:xfrm>
-        </p:spPr>
+        <p:spPr/>
       </p:sp>
       <p:sp>
         <p:nvSpPr>
@@ -2661,54 +2810,79 @@
         </p:nvSpPr>
         <p:spPr/>
         <p:txBody>
-          <a:bodyPr>
-            <a:normAutofit/>
-          </a:bodyPr>
+          <a:bodyPr/>
           <a:lstStyle/>
           <a:p>
-            <a:endParaRPr lang="en-US" dirty="0"/>
+            <a:r>
+              <a:rPr lang="en-US" sz="1200" b="1" kern="1200" dirty="0">
+                <a:solidFill>
+                  <a:schemeClr val="tx1"/>
+                </a:solidFill>
+                <a:effectLst/>
+                <a:latin typeface="+mn-lt"/>
+                <a:ea typeface="+mn-ea"/>
+                <a:cs typeface="+mn-cs"/>
+              </a:rPr>
+              <a:t>**Objection:**</a:t>
+            </a:r>
+          </a:p>
+          <a:p>
+            <a:br>
+              <a:rPr lang="en-US" sz="1200" b="0" kern="1200" dirty="0">
+                <a:solidFill>
+                  <a:schemeClr val="tx1"/>
+                </a:solidFill>
+                <a:effectLst/>
+                <a:latin typeface="+mn-lt"/>
+                <a:ea typeface="+mn-ea"/>
+                <a:cs typeface="+mn-cs"/>
+              </a:rPr>
+            </a:br>
+            <a:r>
+              <a:rPr lang="en-US" sz="1200" b="1" kern="1200" dirty="0">
+                <a:solidFill>
+                  <a:schemeClr val="tx1"/>
+                </a:solidFill>
+                <a:effectLst/>
+                <a:latin typeface="+mn-lt"/>
+                <a:ea typeface="+mn-ea"/>
+                <a:cs typeface="+mn-cs"/>
+              </a:rPr>
+              <a:t>**Answer:**</a:t>
+            </a:r>
+          </a:p>
+          <a:p>
+            <a:endParaRPr lang="en-US" sz="1200" b="1" kern="1200" dirty="0">
+              <a:solidFill>
+                <a:schemeClr val="tx1"/>
+              </a:solidFill>
+              <a:effectLst/>
+              <a:latin typeface="+mn-lt"/>
+              <a:ea typeface="+mn-ea"/>
+              <a:cs typeface="+mn-cs"/>
+            </a:endParaRPr>
+          </a:p>
+          <a:p>
+            <a:endParaRPr lang="en-US" sz="1200" b="0" kern="1200" dirty="0">
+              <a:solidFill>
+                <a:schemeClr val="tx1"/>
+              </a:solidFill>
+              <a:effectLst/>
+              <a:latin typeface="+mn-lt"/>
+              <a:ea typeface="+mn-ea"/>
+              <a:cs typeface="+mn-cs"/>
+            </a:endParaRPr>
           </a:p>
         </p:txBody>
       </p:sp>
       <p:sp>
         <p:nvSpPr>
-          <p:cNvPr id="4" name="Header Placeholder 3"/>
+          <p:cNvPr id="4" name="Slide Number Placeholder 3"/>
           <p:cNvSpPr>
             <a:spLocks noGrp="1"/>
           </p:cNvSpPr>
           <p:nvPr>
-            <p:ph type="hdr" sz="quarter" idx="10"/>
-          </p:nvPr>
-        </p:nvSpPr>
-        <p:spPr>
-          <a:xfrm>
-            <a:off x="0" y="0"/>
-            <a:ext cx="2971800" cy="457200"/>
-          </a:xfrm>
-          <a:prstGeom prst="rect">
-            <a:avLst/>
-          </a:prstGeom>
-        </p:spPr>
-        <p:txBody>
-          <a:bodyPr/>
-          <a:lstStyle/>
-          <a:p>
-            <a:endParaRPr lang="en-US" dirty="0">
-              <a:solidFill>
-                <a:prstClr val="black"/>
-              </a:solidFill>
-            </a:endParaRPr>
-          </a:p>
-        </p:txBody>
-      </p:sp>
-      <p:sp>
-        <p:nvSpPr>
-          <p:cNvPr id="5" name="Date Placeholder 4"/>
-          <p:cNvSpPr>
-            <a:spLocks noGrp="1"/>
-          </p:cNvSpPr>
-          <p:nvPr>
-            <p:ph type="dt" idx="11"/>
+            <p:ph type="sldNum" sz="quarter" idx="10"/>
           </p:nvPr>
         </p:nvSpPr>
         <p:spPr/>
@@ -2716,58 +2890,18 @@
           <a:bodyPr/>
           <a:lstStyle/>
           <a:p>
-            <a:fld id="{8AB9A6D4-FB34-4BDB-BA1E-7271914431FC}" type="datetime8">
-              <a:rPr lang="en-US" smtClean="0">
-                <a:solidFill>
-                  <a:prstClr val="black"/>
-                </a:solidFill>
-              </a:rPr>
-              <a:t>6/18/2020 4:41 PM</a:t>
+            <a:fld id="{0998D5BB-B127-481F-BC0A-2F77C576BB34}" type="slidenum">
+              <a:rPr lang="en-US" smtClean="0"/>
+              <a:t>31</a:t>
             </a:fld>
-            <a:endParaRPr lang="en-US" dirty="0">
-              <a:solidFill>
-                <a:prstClr val="black"/>
-              </a:solidFill>
-            </a:endParaRPr>
-          </a:p>
-        </p:txBody>
-      </p:sp>
-      <p:sp>
-        <p:nvSpPr>
-          <p:cNvPr id="7" name="Slide Number Placeholder 6"/>
-          <p:cNvSpPr>
-            <a:spLocks noGrp="1"/>
-          </p:cNvSpPr>
-          <p:nvPr>
-            <p:ph type="sldNum" sz="quarter" idx="13"/>
-          </p:nvPr>
-        </p:nvSpPr>
-        <p:spPr/>
-        <p:txBody>
-          <a:bodyPr/>
-          <a:lstStyle/>
-          <a:p>
-            <a:fld id="{EC87E0CF-87F6-4B58-B8B8-DCAB2DAAF3CA}" type="slidenum">
-              <a:rPr lang="en-US" smtClean="0">
-                <a:solidFill>
-                  <a:prstClr val="black"/>
-                </a:solidFill>
-              </a:rPr>
-              <a:pPr/>
-              <a:t>34</a:t>
-            </a:fld>
-            <a:endParaRPr lang="en-US" dirty="0">
-              <a:solidFill>
-                <a:prstClr val="black"/>
-              </a:solidFill>
-            </a:endParaRPr>
+            <a:endParaRPr lang="en-US" dirty="0"/>
           </a:p>
         </p:txBody>
       </p:sp>
     </p:spTree>
     <p:extLst>
       <p:ext uri="{BB962C8B-B14F-4D97-AF65-F5344CB8AC3E}">
-        <p14:creationId xmlns:p14="http://schemas.microsoft.com/office/powerpoint/2010/main" val="4011344012"/>
+        <p14:creationId xmlns:p14="http://schemas.microsoft.com/office/powerpoint/2010/main" val="4205639758"/>
       </p:ext>
     </p:extLst>
   </p:cSld>
@@ -2876,6 +3010,322 @@
     <p:extLst>
       <p:ext uri="{BB962C8B-B14F-4D97-AF65-F5344CB8AC3E}">
         <p14:creationId xmlns:p14="http://schemas.microsoft.com/office/powerpoint/2010/main" val="920679401"/>
+      </p:ext>
+    </p:extLst>
+  </p:cSld>
+  <p:clrMapOvr>
+    <a:masterClrMapping/>
+  </p:clrMapOvr>
+</p:notes>
+</file>
+
+<file path=ppt/notesSlides/notesSlide30.xml><?xml version="1.0" encoding="utf-8"?>
+<p:notes xmlns:a="http://schemas.openxmlformats.org/drawingml/2006/main" xmlns:r="http://schemas.openxmlformats.org/officeDocument/2006/relationships" xmlns:p="http://schemas.openxmlformats.org/presentationml/2006/main">
+  <p:cSld>
+    <p:spTree>
+      <p:nvGrpSpPr>
+        <p:cNvPr id="1" name=""/>
+        <p:cNvGrpSpPr/>
+        <p:nvPr/>
+      </p:nvGrpSpPr>
+      <p:grpSpPr>
+        <a:xfrm>
+          <a:off x="0" y="0"/>
+          <a:ext cx="0" cy="0"/>
+          <a:chOff x="0" y="0"/>
+          <a:chExt cx="0" cy="0"/>
+        </a:xfrm>
+      </p:grpSpPr>
+      <p:sp>
+        <p:nvSpPr>
+          <p:cNvPr id="2" name="Slide Image Placeholder 1"/>
+          <p:cNvSpPr>
+            <a:spLocks noGrp="1" noRot="1" noChangeAspect="1"/>
+          </p:cNvSpPr>
+          <p:nvPr>
+            <p:ph type="sldImg"/>
+          </p:nvPr>
+        </p:nvSpPr>
+        <p:spPr/>
+      </p:sp>
+      <p:sp>
+        <p:nvSpPr>
+          <p:cNvPr id="3" name="Notes Placeholder 2"/>
+          <p:cNvSpPr>
+            <a:spLocks noGrp="1"/>
+          </p:cNvSpPr>
+          <p:nvPr>
+            <p:ph type="body" idx="1"/>
+          </p:nvPr>
+        </p:nvSpPr>
+        <p:spPr/>
+        <p:txBody>
+          <a:bodyPr/>
+          <a:lstStyle/>
+          <a:p>
+            <a:r>
+              <a:rPr lang="en-US" sz="1200" b="1" kern="1200" dirty="0">
+                <a:solidFill>
+                  <a:schemeClr val="tx1"/>
+                </a:solidFill>
+                <a:effectLst/>
+                <a:latin typeface="+mn-lt"/>
+                <a:ea typeface="+mn-ea"/>
+                <a:cs typeface="+mn-cs"/>
+              </a:rPr>
+              <a:t>**Objection:**</a:t>
+            </a:r>
+          </a:p>
+          <a:p>
+            <a:br>
+              <a:rPr lang="en-US" sz="1200" b="0" kern="1200" dirty="0">
+                <a:solidFill>
+                  <a:schemeClr val="tx1"/>
+                </a:solidFill>
+                <a:effectLst/>
+                <a:latin typeface="+mn-lt"/>
+                <a:ea typeface="+mn-ea"/>
+                <a:cs typeface="+mn-cs"/>
+              </a:rPr>
+            </a:br>
+            <a:r>
+              <a:rPr lang="en-US" sz="1200" b="1" kern="1200" dirty="0">
+                <a:solidFill>
+                  <a:schemeClr val="tx1"/>
+                </a:solidFill>
+                <a:effectLst/>
+                <a:latin typeface="+mn-lt"/>
+                <a:ea typeface="+mn-ea"/>
+                <a:cs typeface="+mn-cs"/>
+              </a:rPr>
+              <a:t>**Answer:**</a:t>
+            </a:r>
+          </a:p>
+          <a:p>
+            <a:endParaRPr lang="en-US" sz="1200" b="1" kern="1200" dirty="0">
+              <a:solidFill>
+                <a:schemeClr val="tx1"/>
+              </a:solidFill>
+              <a:effectLst/>
+              <a:latin typeface="+mn-lt"/>
+              <a:ea typeface="+mn-ea"/>
+              <a:cs typeface="+mn-cs"/>
+            </a:endParaRPr>
+          </a:p>
+          <a:p>
+            <a:r>
+              <a:rPr lang="en-US" sz="1200" b="1" kern="1200" dirty="0" err="1">
+                <a:solidFill>
+                  <a:schemeClr val="tx1"/>
+                </a:solidFill>
+                <a:effectLst/>
+                <a:latin typeface="+mn-lt"/>
+                <a:ea typeface="+mn-ea"/>
+                <a:cs typeface="+mn-cs"/>
+              </a:rPr>
+              <a:t>Sentinal</a:t>
+            </a:r>
+            <a:endParaRPr lang="en-US" sz="1200" b="0" kern="1200" dirty="0">
+              <a:solidFill>
+                <a:schemeClr val="tx1"/>
+              </a:solidFill>
+              <a:effectLst/>
+              <a:latin typeface="+mn-lt"/>
+              <a:ea typeface="+mn-ea"/>
+              <a:cs typeface="+mn-cs"/>
+            </a:endParaRPr>
+          </a:p>
+        </p:txBody>
+      </p:sp>
+      <p:sp>
+        <p:nvSpPr>
+          <p:cNvPr id="4" name="Slide Number Placeholder 3"/>
+          <p:cNvSpPr>
+            <a:spLocks noGrp="1"/>
+          </p:cNvSpPr>
+          <p:nvPr>
+            <p:ph type="sldNum" sz="quarter" idx="10"/>
+          </p:nvPr>
+        </p:nvSpPr>
+        <p:spPr/>
+        <p:txBody>
+          <a:bodyPr/>
+          <a:lstStyle/>
+          <a:p>
+            <a:fld id="{0998D5BB-B127-481F-BC0A-2F77C576BB34}" type="slidenum">
+              <a:rPr lang="en-US" smtClean="0"/>
+              <a:t>32</a:t>
+            </a:fld>
+            <a:endParaRPr lang="en-US" dirty="0"/>
+          </a:p>
+        </p:txBody>
+      </p:sp>
+    </p:spTree>
+    <p:extLst>
+      <p:ext uri="{BB962C8B-B14F-4D97-AF65-F5344CB8AC3E}">
+        <p14:creationId xmlns:p14="http://schemas.microsoft.com/office/powerpoint/2010/main" val="347754989"/>
+      </p:ext>
+    </p:extLst>
+  </p:cSld>
+  <p:clrMapOvr>
+    <a:masterClrMapping/>
+  </p:clrMapOvr>
+</p:notes>
+</file>
+
+<file path=ppt/notesSlides/notesSlide31.xml><?xml version="1.0" encoding="utf-8"?>
+<p:notes xmlns:a="http://schemas.openxmlformats.org/drawingml/2006/main" xmlns:r="http://schemas.openxmlformats.org/officeDocument/2006/relationships" xmlns:p="http://schemas.openxmlformats.org/presentationml/2006/main">
+  <p:cSld>
+    <p:spTree>
+      <p:nvGrpSpPr>
+        <p:cNvPr id="1" name=""/>
+        <p:cNvGrpSpPr/>
+        <p:nvPr/>
+      </p:nvGrpSpPr>
+      <p:grpSpPr>
+        <a:xfrm>
+          <a:off x="0" y="0"/>
+          <a:ext cx="0" cy="0"/>
+          <a:chOff x="0" y="0"/>
+          <a:chExt cx="0" cy="0"/>
+        </a:xfrm>
+      </p:grpSpPr>
+      <p:sp>
+        <p:nvSpPr>
+          <p:cNvPr id="2" name="Slide Image Placeholder 1"/>
+          <p:cNvSpPr>
+            <a:spLocks noGrp="1" noRot="1" noChangeAspect="1"/>
+          </p:cNvSpPr>
+          <p:nvPr>
+            <p:ph type="sldImg"/>
+          </p:nvPr>
+        </p:nvSpPr>
+        <p:spPr>
+          <a:xfrm>
+            <a:off x="381000" y="685800"/>
+            <a:ext cx="6096000" cy="3429000"/>
+          </a:xfrm>
+        </p:spPr>
+      </p:sp>
+      <p:sp>
+        <p:nvSpPr>
+          <p:cNvPr id="3" name="Notes Placeholder 2"/>
+          <p:cNvSpPr>
+            <a:spLocks noGrp="1"/>
+          </p:cNvSpPr>
+          <p:nvPr>
+            <p:ph type="body" idx="1"/>
+          </p:nvPr>
+        </p:nvSpPr>
+        <p:spPr/>
+        <p:txBody>
+          <a:bodyPr>
+            <a:normAutofit/>
+          </a:bodyPr>
+          <a:lstStyle/>
+          <a:p>
+            <a:endParaRPr lang="en-US" dirty="0"/>
+          </a:p>
+        </p:txBody>
+      </p:sp>
+      <p:sp>
+        <p:nvSpPr>
+          <p:cNvPr id="4" name="Header Placeholder 3"/>
+          <p:cNvSpPr>
+            <a:spLocks noGrp="1"/>
+          </p:cNvSpPr>
+          <p:nvPr>
+            <p:ph type="hdr" sz="quarter" idx="10"/>
+          </p:nvPr>
+        </p:nvSpPr>
+        <p:spPr>
+          <a:xfrm>
+            <a:off x="0" y="0"/>
+            <a:ext cx="2971800" cy="457200"/>
+          </a:xfrm>
+          <a:prstGeom prst="rect">
+            <a:avLst/>
+          </a:prstGeom>
+        </p:spPr>
+        <p:txBody>
+          <a:bodyPr/>
+          <a:lstStyle/>
+          <a:p>
+            <a:endParaRPr lang="en-US" dirty="0">
+              <a:solidFill>
+                <a:prstClr val="black"/>
+              </a:solidFill>
+            </a:endParaRPr>
+          </a:p>
+        </p:txBody>
+      </p:sp>
+      <p:sp>
+        <p:nvSpPr>
+          <p:cNvPr id="5" name="Date Placeholder 4"/>
+          <p:cNvSpPr>
+            <a:spLocks noGrp="1"/>
+          </p:cNvSpPr>
+          <p:nvPr>
+            <p:ph type="dt" idx="11"/>
+          </p:nvPr>
+        </p:nvSpPr>
+        <p:spPr/>
+        <p:txBody>
+          <a:bodyPr/>
+          <a:lstStyle/>
+          <a:p>
+            <a:fld id="{8AB9A6D4-FB34-4BDB-BA1E-7271914431FC}" type="datetime8">
+              <a:rPr lang="en-US" smtClean="0">
+                <a:solidFill>
+                  <a:prstClr val="black"/>
+                </a:solidFill>
+              </a:rPr>
+              <a:t>6/24/20 1:04 PM</a:t>
+            </a:fld>
+            <a:endParaRPr lang="en-US" dirty="0">
+              <a:solidFill>
+                <a:prstClr val="black"/>
+              </a:solidFill>
+            </a:endParaRPr>
+          </a:p>
+        </p:txBody>
+      </p:sp>
+      <p:sp>
+        <p:nvSpPr>
+          <p:cNvPr id="7" name="Slide Number Placeholder 6"/>
+          <p:cNvSpPr>
+            <a:spLocks noGrp="1"/>
+          </p:cNvSpPr>
+          <p:nvPr>
+            <p:ph type="sldNum" sz="quarter" idx="13"/>
+          </p:nvPr>
+        </p:nvSpPr>
+        <p:spPr/>
+        <p:txBody>
+          <a:bodyPr/>
+          <a:lstStyle/>
+          <a:p>
+            <a:fld id="{EC87E0CF-87F6-4B58-B8B8-DCAB2DAAF3CA}" type="slidenum">
+              <a:rPr lang="en-US" smtClean="0">
+                <a:solidFill>
+                  <a:prstClr val="black"/>
+                </a:solidFill>
+              </a:rPr>
+              <a:pPr/>
+              <a:t>34</a:t>
+            </a:fld>
+            <a:endParaRPr lang="en-US" dirty="0">
+              <a:solidFill>
+                <a:prstClr val="black"/>
+              </a:solidFill>
+            </a:endParaRPr>
+          </a:p>
+        </p:txBody>
+      </p:sp>
+    </p:spTree>
+    <p:extLst>
+      <p:ext uri="{BB962C8B-B14F-4D97-AF65-F5344CB8AC3E}">
+        <p14:creationId xmlns:p14="http://schemas.microsoft.com/office/powerpoint/2010/main" val="4011344012"/>
       </p:ext>
     </p:extLst>
   </p:cSld>
@@ -3054,6 +3504,20 @@
           <a:p>
             <a:endParaRPr lang="en-US" dirty="0"/>
           </a:p>
+          <a:p>
+            <a:r>
+              <a:rPr lang="en-US" dirty="0"/>
+              <a:t>*** Move to California, CCPA (CA </a:t>
+            </a:r>
+            <a:r>
+              <a:rPr lang="en-US" dirty="0" err="1"/>
+              <a:t>equiv</a:t>
+            </a:r>
+            <a:r>
+              <a:rPr lang="en-US" dirty="0"/>
+              <a:t> of GDPR)</a:t>
+            </a:r>
+          </a:p>
         </p:txBody>
       </p:sp>
       <p:sp>
@@ -3343,6 +3807,31 @@
             </a:r>
           </a:p>
           <a:p>
+            <a:endParaRPr lang="en-US" sz="1200" b="0" i="0" kern="1200" dirty="0">
+              <a:solidFill>
+                <a:schemeClr val="tx1"/>
+              </a:solidFill>
+              <a:effectLst/>
+              <a:latin typeface="+mn-lt"/>
+              <a:ea typeface="+mn-ea"/>
+              <a:cs typeface="+mn-cs"/>
+            </a:endParaRPr>
+          </a:p>
+          <a:p>
+            <a:r>
+              <a:rPr lang="en-US" sz="1200" b="0" i="0" kern="1200" dirty="0">
+                <a:solidFill>
+                  <a:schemeClr val="tx1"/>
+                </a:solidFill>
+                <a:effectLst/>
+                <a:latin typeface="+mn-lt"/>
+                <a:ea typeface="+mn-ea"/>
+                <a:cs typeface="+mn-cs"/>
+              </a:rPr>
+              <a:t>*** 24x7 (drop 365)</a:t>
+            </a:r>
+          </a:p>
+          <a:p>
             <a:endParaRPr lang="en-IE" dirty="0"/>
           </a:p>
         </p:txBody>
@@ -3427,7 +3916,10 @@
           <a:bodyPr/>
           <a:lstStyle/>
           <a:p>
-            <a:endParaRPr lang="en-IE" dirty="0"/>
+            <a:r>
+              <a:rPr lang="en-IE" dirty="0"/>
+              <a:t>*** Legacy app</a:t>
+            </a:r>
           </a:p>
         </p:txBody>
       </p:sp>
@@ -18475,7 +18967,7 @@
           <a:p>
             <a:r>
               <a:rPr lang="en-US" sz="2800" dirty="0"/>
-              <a:t>Data encryption</a:t>
+              <a:t>Data security and encryption</a:t>
             </a:r>
           </a:p>
           <a:p>
@@ -19064,7 +19556,7 @@
           <p:nvPr/>
         </p:nvPicPr>
         <p:blipFill>
-          <a:blip r:embed="rId2">
+          <a:blip r:embed="rId3">
             <a:extLst>
               <a:ext uri="{28A0092B-C50C-407E-A947-70E740481C1C}">
                 <a14:useLocalDpi xmlns:a14="http://schemas.microsoft.com/office/drawing/2010/main" val="0"/>
@@ -22044,6 +22536,12 @@
 </file>
 
 <file path=customXml/item1.xml><?xml version="1.0" encoding="utf-8"?>
+<p:properties xmlns:p="http://schemas.microsoft.com/office/2006/metadata/properties" xmlns:xsi="http://www.w3.org/2001/XMLSchema-instance" xmlns:pc="http://schemas.microsoft.com/office/infopath/2007/PartnerControls">
+  <documentManagement/>
+</p:properties>
+</file>
+
+<file path=customXml/item2.xml><?xml version="1.0" encoding="utf-8"?>
 <ct:contentTypeSchema xmlns:ct="http://schemas.microsoft.com/office/2006/metadata/contentType" xmlns:ma="http://schemas.microsoft.com/office/2006/metadata/properties/metaAttributes" ct:_="" ma:_="" ma:contentTypeName="Document" ma:contentTypeID="0x010100BCA4EC527BF874469D7E5FECF7D9FB70" ma:contentTypeVersion="6" ma:contentTypeDescription="Create a new document." ma:contentTypeScope="" ma:versionID="63bcfb01198a5f4cc35071d76a13e973">
   <xsd:schema xmlns:xsd="http://www.w3.org/2001/XMLSchema" xmlns:xs="http://www.w3.org/2001/XMLSchema" xmlns:p="http://schemas.microsoft.com/office/2006/metadata/properties" xmlns:ns2="25b059c1-e0b1-4aae-b8e7-a9c1a20f7312" xmlns:ns3="24937d34-002f-4836-b77c-e21f12df0152" targetNamespace="http://schemas.microsoft.com/office/2006/metadata/properties" ma:root="true" ma:fieldsID="12b927a22a17d3f79cc59c0932bea1cb" ns2:_="" ns3:_="">
     <xsd:import namespace="25b059c1-e0b1-4aae-b8e7-a9c1a20f7312"/>
@@ -22222,12 +22720,6 @@
 </ct:contentTypeSchema>
 </file>
 
-<file path=customXml/item2.xml><?xml version="1.0" encoding="utf-8"?>
-<p:properties xmlns:p="http://schemas.microsoft.com/office/2006/metadata/properties" xmlns:xsi="http://www.w3.org/2001/XMLSchema-instance" xmlns:pc="http://schemas.microsoft.com/office/infopath/2007/PartnerControls">
-  <documentManagement/>
-</p:properties>
-</file>
-
 <file path=customXml/item3.xml><?xml version="1.0" encoding="utf-8"?>
 <?mso-contentType ?>
 <FormTemplates xmlns="http://schemas.microsoft.com/sharepoint/v3/contenttype/forms">
@@ -22238,6 +22730,23 @@
 </file>
 
 <file path=customXml/itemProps1.xml><?xml version="1.0" encoding="utf-8"?>
+<ds:datastoreItem xmlns:ds="http://schemas.openxmlformats.org/officeDocument/2006/customXml" ds:itemID="{2AC6E67E-42B4-40AF-80F4-D98253E4E21A}">
+  <ds:schemaRefs>
+    <ds:schemaRef ds:uri="24937d34-002f-4836-b77c-e21f12df0152"/>
+    <ds:schemaRef ds:uri="http://schemas.microsoft.com/office/2006/metadata/properties"/>
+    <ds:schemaRef ds:uri="25b059c1-e0b1-4aae-b8e7-a9c1a20f7312"/>
+    <ds:schemaRef ds:uri="http://schemas.microsoft.com/office/2006/documentManagement/types"/>
+    <ds:schemaRef ds:uri="http://www.w3.org/XML/1998/namespace"/>
+    <ds:schemaRef ds:uri="http://purl.org/dc/terms/"/>
+    <ds:schemaRef ds:uri="http://schemas.microsoft.com/office/infopath/2007/PartnerControls"/>
+    <ds:schemaRef ds:uri="http://schemas.openxmlformats.org/package/2006/metadata/core-properties"/>
+    <ds:schemaRef ds:uri="http://purl.org/dc/dcmitype/"/>
+    <ds:schemaRef ds:uri="http://purl.org/dc/elements/1.1/"/>
+  </ds:schemaRefs>
+</ds:datastoreItem>
+</file>
+
+<file path=customXml/itemProps2.xml><?xml version="1.0" encoding="utf-8"?>
 <ds:datastoreItem xmlns:ds="http://schemas.openxmlformats.org/officeDocument/2006/customXml" ds:itemID="{50B43756-F2F7-4341-9ED7-6CDCB2E9AC83}">
   <ds:schemaRefs>
     <ds:schemaRef ds:uri="http://schemas.microsoft.com/office/2006/metadata/contentType"/>
@@ -22256,23 +22765,6 @@
 </ds:datastoreItem>
 </file>
 
-<file path=customXml/itemProps2.xml><?xml version="1.0" encoding="utf-8"?>
-<ds:datastoreItem xmlns:ds="http://schemas.openxmlformats.org/officeDocument/2006/customXml" ds:itemID="{2AC6E67E-42B4-40AF-80F4-D98253E4E21A}">
-  <ds:schemaRefs>
-    <ds:schemaRef ds:uri="24937d34-002f-4836-b77c-e21f12df0152"/>
-    <ds:schemaRef ds:uri="http://schemas.microsoft.com/office/2006/metadata/properties"/>
-    <ds:schemaRef ds:uri="25b059c1-e0b1-4aae-b8e7-a9c1a20f7312"/>
-    <ds:schemaRef ds:uri="http://schemas.microsoft.com/office/2006/documentManagement/types"/>
-    <ds:schemaRef ds:uri="http://www.w3.org/XML/1998/namespace"/>
-    <ds:schemaRef ds:uri="http://purl.org/dc/terms/"/>
-    <ds:schemaRef ds:uri="http://schemas.microsoft.com/office/infopath/2007/PartnerControls"/>
-    <ds:schemaRef ds:uri="http://schemas.openxmlformats.org/package/2006/metadata/core-properties"/>
-    <ds:schemaRef ds:uri="http://purl.org/dc/dcmitype/"/>
-    <ds:schemaRef ds:uri="http://purl.org/dc/elements/1.1/"/>
-  </ds:schemaRefs>
-</ds:datastoreItem>
-</file>
-
 <file path=customXml/itemProps3.xml><?xml version="1.0" encoding="utf-8"?>
 <ds:datastoreItem xmlns:ds="http://schemas.openxmlformats.org/officeDocument/2006/customXml" ds:itemID="{FC7B288A-115F-4EDF-8326-05039CEE1DB1}">
   <ds:schemaRefs>

</xml_diff>

<commit_message>
August 7 2020 revisions
</commit_message>
<xml_diff>
--- a/Whiteboard-design-session/WDS trainer presentation - Windows Virtual Desktop.pptx
+++ b/Whiteboard-design-session/WDS trainer presentation - Windows Virtual Desktop.pptx
@@ -6,7 +6,7 @@
     <p:sldMasterId id="2147483665" r:id="rId5"/>
   </p:sldMasterIdLst>
   <p:notesMasterIdLst>
-    <p:notesMasterId r:id="rId40"/>
+    <p:notesMasterId r:id="rId41"/>
   </p:notesMasterIdLst>
   <p:sldIdLst>
     <p:sldId id="300" r:id="rId6"/>
@@ -16,33 +16,34 @@
     <p:sldId id="259" r:id="rId10"/>
     <p:sldId id="324" r:id="rId11"/>
     <p:sldId id="362" r:id="rId12"/>
-    <p:sldId id="363" r:id="rId13"/>
-    <p:sldId id="366" r:id="rId14"/>
-    <p:sldId id="305" r:id="rId15"/>
-    <p:sldId id="351" r:id="rId16"/>
-    <p:sldId id="360" r:id="rId17"/>
-    <p:sldId id="382" r:id="rId18"/>
-    <p:sldId id="332" r:id="rId19"/>
-    <p:sldId id="333" r:id="rId20"/>
-    <p:sldId id="361" r:id="rId21"/>
-    <p:sldId id="320" r:id="rId22"/>
-    <p:sldId id="322" r:id="rId23"/>
-    <p:sldId id="321" r:id="rId24"/>
-    <p:sldId id="374" r:id="rId25"/>
-    <p:sldId id="317" r:id="rId26"/>
-    <p:sldId id="316" r:id="rId27"/>
-    <p:sldId id="383" r:id="rId28"/>
-    <p:sldId id="375" r:id="rId29"/>
-    <p:sldId id="377" r:id="rId30"/>
-    <p:sldId id="376" r:id="rId31"/>
-    <p:sldId id="386" r:id="rId32"/>
-    <p:sldId id="319" r:id="rId33"/>
-    <p:sldId id="385" r:id="rId34"/>
-    <p:sldId id="355" r:id="rId35"/>
-    <p:sldId id="356" r:id="rId36"/>
-    <p:sldId id="381" r:id="rId37"/>
-    <p:sldId id="384" r:id="rId38"/>
-    <p:sldId id="315" r:id="rId39"/>
+    <p:sldId id="387" r:id="rId13"/>
+    <p:sldId id="363" r:id="rId14"/>
+    <p:sldId id="366" r:id="rId15"/>
+    <p:sldId id="305" r:id="rId16"/>
+    <p:sldId id="351" r:id="rId17"/>
+    <p:sldId id="360" r:id="rId18"/>
+    <p:sldId id="382" r:id="rId19"/>
+    <p:sldId id="332" r:id="rId20"/>
+    <p:sldId id="333" r:id="rId21"/>
+    <p:sldId id="361" r:id="rId22"/>
+    <p:sldId id="320" r:id="rId23"/>
+    <p:sldId id="322" r:id="rId24"/>
+    <p:sldId id="321" r:id="rId25"/>
+    <p:sldId id="374" r:id="rId26"/>
+    <p:sldId id="317" r:id="rId27"/>
+    <p:sldId id="316" r:id="rId28"/>
+    <p:sldId id="383" r:id="rId29"/>
+    <p:sldId id="375" r:id="rId30"/>
+    <p:sldId id="377" r:id="rId31"/>
+    <p:sldId id="376" r:id="rId32"/>
+    <p:sldId id="386" r:id="rId33"/>
+    <p:sldId id="319" r:id="rId34"/>
+    <p:sldId id="385" r:id="rId35"/>
+    <p:sldId id="355" r:id="rId36"/>
+    <p:sldId id="356" r:id="rId37"/>
+    <p:sldId id="381" r:id="rId38"/>
+    <p:sldId id="384" r:id="rId39"/>
+    <p:sldId id="315" r:id="rId40"/>
   </p:sldIdLst>
   <p:sldSz cx="12192000" cy="6858000"/>
   <p:notesSz cx="6858000" cy="9144000"/>
@@ -152,15 +153,6 @@
 </p:presentation>
 </file>
 
-<file path=ppt/revisionInfo.xml><?xml version="1.0" encoding="utf-8"?>
-<p1510:revInfo xmlns:a="http://schemas.openxmlformats.org/drawingml/2006/main" xmlns:r="http://schemas.openxmlformats.org/officeDocument/2006/relationships" xmlns:p1510="http://schemas.microsoft.com/office/powerpoint/2015/10/main">
-  <p1510:revLst>
-    <p1510:client id="{45DAC7FA-35A3-433A-B1DD-BD527FEE6E7D}" v="47" dt="2020-06-18T20:43:30.278"/>
-    <p1510:client id="{533E8348-C747-4E3C-A039-FC8951A33AF0}" v="21" dt="2020-06-18T15:16:43.100"/>
-  </p1510:revLst>
-</p1510:revInfo>
-</file>
-
 <file path=ppt/notesMasters/notesMaster1.xml><?xml version="1.0" encoding="utf-8"?>
 <p:notesMaster xmlns:a="http://schemas.openxmlformats.org/drawingml/2006/main" xmlns:r="http://schemas.openxmlformats.org/officeDocument/2006/relationships" xmlns:p="http://schemas.openxmlformats.org/presentationml/2006/main">
   <p:cSld>
@@ -243,7 +235,7 @@
           <a:p>
             <a:fld id="{52A13B17-C506-4D51-BB37-16B365906619}" type="datetimeFigureOut">
               <a:rPr lang="en-US" smtClean="0"/>
-              <a:t>6/24/20</a:t>
+              <a:t>8/7/2020</a:t>
             </a:fld>
             <a:endParaRPr lang="en-US" dirty="0"/>
           </a:p>
@@ -621,16 +613,12 @@
           </a:p>
           <a:p>
             <a:r>
-              <a:rPr lang="en-US" sz="950">
+              <a:rPr lang="en-US" sz="950" dirty="0">
                 <a:latin typeface="+mn-lt"/>
                 <a:cs typeface="Segoe UI" panose="020B0502040204020203" pitchFamily="34" charset="0"/>
               </a:rPr>
-              <a:t>August 2019</a:t>
-            </a:r>
-            <a:endParaRPr lang="en-US" sz="950" dirty="0">
-              <a:latin typeface="+mn-lt"/>
-              <a:cs typeface="Segoe UI" panose="020B0502040204020203" pitchFamily="34" charset="0"/>
-            </a:endParaRPr>
+              <a:t>August 2020</a:t>
+            </a:r>
           </a:p>
         </p:txBody>
       </p:sp>
@@ -774,7 +762,10 @@
           <a:bodyPr/>
           <a:lstStyle/>
           <a:p>
-            <a:endParaRPr lang="en-US" dirty="0"/>
+            <a:r>
+              <a:rPr lang="en-IE" dirty="0"/>
+              <a:t>*** Legacy app</a:t>
+            </a:r>
           </a:p>
         </p:txBody>
       </p:sp>
@@ -785,7 +776,7 @@
             <a:spLocks noGrp="1"/>
           </p:cNvSpPr>
           <p:nvPr>
-            <p:ph type="sldNum" sz="quarter" idx="10"/>
+            <p:ph type="sldNum" sz="quarter" idx="5"/>
           </p:nvPr>
         </p:nvSpPr>
         <p:spPr/>
@@ -804,7 +795,7 @@
     </p:spTree>
     <p:extLst>
       <p:ext uri="{BB962C8B-B14F-4D97-AF65-F5344CB8AC3E}">
-        <p14:creationId xmlns:p14="http://schemas.microsoft.com/office/powerpoint/2010/main" val="1267405105"/>
+        <p14:creationId xmlns:p14="http://schemas.microsoft.com/office/powerpoint/2010/main" val="1446545291"/>
       </p:ext>
     </p:extLst>
   </p:cSld>
@@ -888,7 +879,7 @@
     </p:spTree>
     <p:extLst>
       <p:ext uri="{BB962C8B-B14F-4D97-AF65-F5344CB8AC3E}">
-        <p14:creationId xmlns:p14="http://schemas.microsoft.com/office/powerpoint/2010/main" val="1275205587"/>
+        <p14:creationId xmlns:p14="http://schemas.microsoft.com/office/powerpoint/2010/main" val="1267405105"/>
       </p:ext>
     </p:extLst>
   </p:cSld>
@@ -963,7 +954,7 @@
           <a:p>
             <a:fld id="{0998D5BB-B127-481F-BC0A-2F77C576BB34}" type="slidenum">
               <a:rPr lang="en-US" smtClean="0"/>
-              <a:t>14</a:t>
+              <a:t>12</a:t>
             </a:fld>
             <a:endParaRPr lang="en-US" dirty="0"/>
           </a:p>
@@ -972,7 +963,7 @@
     </p:spTree>
     <p:extLst>
       <p:ext uri="{BB962C8B-B14F-4D97-AF65-F5344CB8AC3E}">
-        <p14:creationId xmlns:p14="http://schemas.microsoft.com/office/powerpoint/2010/main" val="127514326"/>
+        <p14:creationId xmlns:p14="http://schemas.microsoft.com/office/powerpoint/2010/main" val="1275205587"/>
       </p:ext>
     </p:extLst>
   </p:cSld>
@@ -1056,7 +1047,7 @@
     </p:spTree>
     <p:extLst>
       <p:ext uri="{BB962C8B-B14F-4D97-AF65-F5344CB8AC3E}">
-        <p14:creationId xmlns:p14="http://schemas.microsoft.com/office/powerpoint/2010/main" val="2026886986"/>
+        <p14:creationId xmlns:p14="http://schemas.microsoft.com/office/powerpoint/2010/main" val="127514326"/>
       </p:ext>
     </p:extLst>
   </p:cSld>
@@ -1140,7 +1131,7 @@
     </p:spTree>
     <p:extLst>
       <p:ext uri="{BB962C8B-B14F-4D97-AF65-F5344CB8AC3E}">
-        <p14:creationId xmlns:p14="http://schemas.microsoft.com/office/powerpoint/2010/main" val="2567213512"/>
+        <p14:creationId xmlns:p14="http://schemas.microsoft.com/office/powerpoint/2010/main" val="2026886986"/>
       </p:ext>
     </p:extLst>
   </p:cSld>
@@ -1224,7 +1215,7 @@
     </p:spTree>
     <p:extLst>
       <p:ext uri="{BB962C8B-B14F-4D97-AF65-F5344CB8AC3E}">
-        <p14:creationId xmlns:p14="http://schemas.microsoft.com/office/powerpoint/2010/main" val="3229744285"/>
+        <p14:creationId xmlns:p14="http://schemas.microsoft.com/office/powerpoint/2010/main" val="2567213512"/>
       </p:ext>
     </p:extLst>
   </p:cSld>
@@ -1308,7 +1299,7 @@
     </p:spTree>
     <p:extLst>
       <p:ext uri="{BB962C8B-B14F-4D97-AF65-F5344CB8AC3E}">
-        <p14:creationId xmlns:p14="http://schemas.microsoft.com/office/powerpoint/2010/main" val="251902611"/>
+        <p14:creationId xmlns:p14="http://schemas.microsoft.com/office/powerpoint/2010/main" val="3229744285"/>
       </p:ext>
     </p:extLst>
   </p:cSld>
@@ -1392,7 +1383,7 @@
     </p:spTree>
     <p:extLst>
       <p:ext uri="{BB962C8B-B14F-4D97-AF65-F5344CB8AC3E}">
-        <p14:creationId xmlns:p14="http://schemas.microsoft.com/office/powerpoint/2010/main" val="1579283386"/>
+        <p14:creationId xmlns:p14="http://schemas.microsoft.com/office/powerpoint/2010/main" val="251902611"/>
       </p:ext>
     </p:extLst>
   </p:cSld>
@@ -1476,7 +1467,7 @@
     </p:spTree>
     <p:extLst>
       <p:ext uri="{BB962C8B-B14F-4D97-AF65-F5344CB8AC3E}">
-        <p14:creationId xmlns:p14="http://schemas.microsoft.com/office/powerpoint/2010/main" val="958117686"/>
+        <p14:creationId xmlns:p14="http://schemas.microsoft.com/office/powerpoint/2010/main" val="1579283386"/>
       </p:ext>
     </p:extLst>
   </p:cSld>
@@ -1560,7 +1551,7 @@
     </p:spTree>
     <p:extLst>
       <p:ext uri="{BB962C8B-B14F-4D97-AF65-F5344CB8AC3E}">
-        <p14:creationId xmlns:p14="http://schemas.microsoft.com/office/powerpoint/2010/main" val="647674203"/>
+        <p14:creationId xmlns:p14="http://schemas.microsoft.com/office/powerpoint/2010/main" val="958117686"/>
       </p:ext>
     </p:extLst>
   </p:cSld>
@@ -1728,7 +1719,7 @@
     </p:spTree>
     <p:extLst>
       <p:ext uri="{BB962C8B-B14F-4D97-AF65-F5344CB8AC3E}">
-        <p14:creationId xmlns:p14="http://schemas.microsoft.com/office/powerpoint/2010/main" val="4179281765"/>
+        <p14:creationId xmlns:p14="http://schemas.microsoft.com/office/powerpoint/2010/main" val="647674203"/>
       </p:ext>
     </p:extLst>
   </p:cSld>
@@ -1782,18 +1773,7 @@
           <a:bodyPr/>
           <a:lstStyle/>
           <a:p>
-            <a:r>
-              <a:rPr lang="en-US" dirty="0"/>
-              <a:t>Add, cloud app sec, </a:t>
-            </a:r>
-            <a:r>
-              <a:rPr lang="en-US" dirty="0" err="1"/>
-              <a:t>sentinal</a:t>
-            </a:r>
-            <a:r>
-              <a:rPr lang="en-US" dirty="0"/>
-              <a:t> , ATP</a:t>
-            </a:r>
+            <a:endParaRPr lang="en-US" dirty="0"/>
           </a:p>
         </p:txBody>
       </p:sp>
@@ -1804,7 +1784,7 @@
             <a:spLocks noGrp="1"/>
           </p:cNvSpPr>
           <p:nvPr>
-            <p:ph type="sldNum" sz="quarter" idx="5"/>
+            <p:ph type="sldNum" sz="quarter" idx="10"/>
           </p:nvPr>
         </p:nvSpPr>
         <p:spPr/>
@@ -1823,7 +1803,7 @@
     </p:spTree>
     <p:extLst>
       <p:ext uri="{BB962C8B-B14F-4D97-AF65-F5344CB8AC3E}">
-        <p14:creationId xmlns:p14="http://schemas.microsoft.com/office/powerpoint/2010/main" val="3839677113"/>
+        <p14:creationId xmlns:p14="http://schemas.microsoft.com/office/powerpoint/2010/main" val="4179281765"/>
       </p:ext>
     </p:extLst>
   </p:cSld>
@@ -1879,21 +1859,15 @@
           <a:p>
             <a:r>
               <a:rPr lang="en-US" dirty="0"/>
-              <a:t>Change regions for CA</a:t>
-            </a:r>
-          </a:p>
-          <a:p>
+              <a:t>Add, cloud app sec, </a:t>
+            </a:r>
+            <a:r>
+              <a:rPr lang="en-US" dirty="0" err="1"/>
+              <a:t>sentinal</a:t>
+            </a:r>
             <a:r>
               <a:rPr lang="en-US" dirty="0"/>
-              <a:t>Add Service Map under </a:t>
-            </a:r>
-            <a:r>
-              <a:rPr lang="en-US" dirty="0" err="1"/>
-              <a:t>montioring</a:t>
-            </a:r>
-            <a:r>
-              <a:rPr lang="en-US" dirty="0"/>
-              <a:t> and alerting</a:t>
+              <a:t> , ATP</a:t>
             </a:r>
           </a:p>
         </p:txBody>
@@ -1905,7 +1879,7 @@
             <a:spLocks noGrp="1"/>
           </p:cNvSpPr>
           <p:nvPr>
-            <p:ph type="sldNum" sz="quarter" idx="10"/>
+            <p:ph type="sldNum" sz="quarter" idx="5"/>
           </p:nvPr>
         </p:nvSpPr>
         <p:spPr/>
@@ -1924,7 +1898,7 @@
     </p:spTree>
     <p:extLst>
       <p:ext uri="{BB962C8B-B14F-4D97-AF65-F5344CB8AC3E}">
-        <p14:creationId xmlns:p14="http://schemas.microsoft.com/office/powerpoint/2010/main" val="3608391534"/>
+        <p14:creationId xmlns:p14="http://schemas.microsoft.com/office/powerpoint/2010/main" val="3839677113"/>
       </p:ext>
     </p:extLst>
   </p:cSld>
@@ -1978,18 +1952,7 @@
           <a:bodyPr/>
           <a:lstStyle/>
           <a:p>
-            <a:r>
-              <a:rPr lang="en-US" dirty="0"/>
-              <a:t>Use managed image, use VHD as alternate, app delivery through </a:t>
-            </a:r>
-            <a:r>
-              <a:rPr lang="en-US" dirty="0" err="1"/>
-              <a:t>wvd</a:t>
-            </a:r>
-            <a:r>
-              <a:rPr lang="en-US" dirty="0"/>
-              <a:t>, </a:t>
-            </a:r>
+            <a:endParaRPr lang="en-US" dirty="0"/>
           </a:p>
         </p:txBody>
       </p:sp>
@@ -2019,7 +1982,7 @@
     </p:spTree>
     <p:extLst>
       <p:ext uri="{BB962C8B-B14F-4D97-AF65-F5344CB8AC3E}">
-        <p14:creationId xmlns:p14="http://schemas.microsoft.com/office/powerpoint/2010/main" val="3449361915"/>
+        <p14:creationId xmlns:p14="http://schemas.microsoft.com/office/powerpoint/2010/main" val="3608391534"/>
       </p:ext>
     </p:extLst>
   </p:cSld>
@@ -2075,25 +2038,15 @@
           <a:p>
             <a:r>
               <a:rPr lang="en-US" dirty="0"/>
-              <a:t>Change to 250 users per 25 VMs</a:t>
-            </a:r>
-          </a:p>
-          <a:p>
+              <a:t>Use managed image, use VHD as alternate, app delivery through </a:t>
+            </a:r>
+            <a:r>
+              <a:rPr lang="en-US" dirty="0" err="1"/>
+              <a:t>wvd</a:t>
+            </a:r>
             <a:r>
               <a:rPr lang="en-US" dirty="0"/>
-              <a:t>Call out workload scaling general guidelines/user personas </a:t>
-            </a:r>
-          </a:p>
-          <a:p>
-            <a:r>
-              <a:rPr lang="en-US" dirty="0"/>
-              <a:t>Published desktops (clinical) or published apps (non-clinical)? </a:t>
-            </a:r>
-          </a:p>
-          <a:p>
-            <a:r>
-              <a:rPr lang="en-US" dirty="0"/>
-              <a:t>Initial workload for non-clinical users (single host pool)</a:t>
+              <a:t>, </a:t>
             </a:r>
           </a:p>
         </p:txBody>
@@ -2124,7 +2077,7 @@
     </p:spTree>
     <p:extLst>
       <p:ext uri="{BB962C8B-B14F-4D97-AF65-F5344CB8AC3E}">
-        <p14:creationId xmlns:p14="http://schemas.microsoft.com/office/powerpoint/2010/main" val="2968351838"/>
+        <p14:creationId xmlns:p14="http://schemas.microsoft.com/office/powerpoint/2010/main" val="3449361915"/>
       </p:ext>
     </p:extLst>
   </p:cSld>
@@ -2180,25 +2133,25 @@
           <a:p>
             <a:r>
               <a:rPr lang="en-US" dirty="0"/>
-              <a:t>Update based on new icons </a:t>
+              <a:t>Change to 250 users per 25 VMs</a:t>
             </a:r>
           </a:p>
           <a:p>
             <a:r>
               <a:rPr lang="en-US" dirty="0"/>
-              <a:t>Both sites should connect to Azure</a:t>
+              <a:t>Call out workload scaling general guidelines/user personas </a:t>
             </a:r>
           </a:p>
           <a:p>
             <a:r>
               <a:rPr lang="en-US" dirty="0"/>
-              <a:t>More emphasis on peering</a:t>
+              <a:t>Published desktops (clinical) or published apps (non-clinical)? </a:t>
             </a:r>
           </a:p>
           <a:p>
             <a:r>
               <a:rPr lang="en-US" dirty="0"/>
-              <a:t>Need WVD control plane</a:t>
+              <a:t>Initial workload for non-clinical users (single host pool)</a:t>
             </a:r>
           </a:p>
         </p:txBody>
@@ -2210,7 +2163,7 @@
             <a:spLocks noGrp="1"/>
           </p:cNvSpPr>
           <p:nvPr>
-            <p:ph type="sldNum" sz="quarter" idx="5"/>
+            <p:ph type="sldNum" sz="quarter" idx="10"/>
           </p:nvPr>
         </p:nvSpPr>
         <p:spPr/>
@@ -2229,7 +2182,7 @@
     </p:spTree>
     <p:extLst>
       <p:ext uri="{BB962C8B-B14F-4D97-AF65-F5344CB8AC3E}">
-        <p14:creationId xmlns:p14="http://schemas.microsoft.com/office/powerpoint/2010/main" val="11525056"/>
+        <p14:creationId xmlns:p14="http://schemas.microsoft.com/office/powerpoint/2010/main" val="2968351838"/>
       </p:ext>
     </p:extLst>
   </p:cSld>
@@ -2284,107 +2237,27 @@
           <a:lstStyle/>
           <a:p>
             <a:r>
-              <a:rPr lang="en-US" sz="1200" b="1" kern="1200" dirty="0">
-                <a:solidFill>
-                  <a:schemeClr val="tx1"/>
-                </a:solidFill>
-                <a:effectLst/>
-                <a:latin typeface="+mn-lt"/>
-                <a:ea typeface="+mn-ea"/>
-                <a:cs typeface="+mn-cs"/>
-              </a:rPr>
-              <a:t>**Objection:**</a:t>
-            </a:r>
-          </a:p>
-          <a:p>
-            <a:br>
-              <a:rPr lang="en-US" sz="1200" b="0" kern="1200" dirty="0">
-                <a:solidFill>
-                  <a:schemeClr val="tx1"/>
-                </a:solidFill>
-                <a:effectLst/>
-                <a:latin typeface="+mn-lt"/>
-                <a:ea typeface="+mn-ea"/>
-                <a:cs typeface="+mn-cs"/>
-              </a:rPr>
-            </a:br>
-            <a:r>
-              <a:rPr lang="en-US" sz="1200" b="1" kern="1200" dirty="0">
-                <a:solidFill>
-                  <a:schemeClr val="tx1"/>
-                </a:solidFill>
-                <a:effectLst/>
-                <a:latin typeface="+mn-lt"/>
-                <a:ea typeface="+mn-ea"/>
-                <a:cs typeface="+mn-cs"/>
-              </a:rPr>
-              <a:t>**Answer:**</a:t>
-            </a:r>
-          </a:p>
-          <a:p>
-            <a:endParaRPr lang="en-US" sz="1200" b="1" kern="1200" dirty="0">
-              <a:solidFill>
-                <a:schemeClr val="tx1"/>
-              </a:solidFill>
-              <a:effectLst/>
-              <a:latin typeface="+mn-lt"/>
-              <a:ea typeface="+mn-ea"/>
-              <a:cs typeface="+mn-cs"/>
-            </a:endParaRPr>
-          </a:p>
-          <a:p>
-            <a:r>
-              <a:rPr lang="en-US" sz="1200" b="1" kern="1200" dirty="0">
-                <a:solidFill>
-                  <a:schemeClr val="tx1"/>
-                </a:solidFill>
-                <a:effectLst/>
-                <a:latin typeface="+mn-lt"/>
-                <a:ea typeface="+mn-ea"/>
-                <a:cs typeface="+mn-cs"/>
-              </a:rPr>
-              <a:t>Focus more on WVD native solution, then talk about how Citrix &amp; VMWare changes the solution. (note that Citrix &amp; VMWare brings shorter time to solution)</a:t>
-            </a:r>
-          </a:p>
-          <a:p>
-            <a:r>
-              <a:rPr lang="en-US" sz="1200" b="1" kern="1200" dirty="0">
-                <a:solidFill>
-                  <a:schemeClr val="tx1"/>
-                </a:solidFill>
-                <a:effectLst/>
-                <a:latin typeface="+mn-lt"/>
-                <a:ea typeface="+mn-ea"/>
-                <a:cs typeface="+mn-cs"/>
-              </a:rPr>
-              <a:t>Move this obj to the end</a:t>
-            </a:r>
-          </a:p>
-          <a:p>
-            <a:endParaRPr lang="en-US" sz="1200" b="1" kern="1200" dirty="0">
-              <a:solidFill>
-                <a:schemeClr val="tx1"/>
-              </a:solidFill>
-              <a:effectLst/>
-              <a:latin typeface="+mn-lt"/>
-              <a:ea typeface="+mn-ea"/>
-              <a:cs typeface="+mn-cs"/>
-            </a:endParaRPr>
-          </a:p>
-          <a:p>
-            <a:r>
-              <a:rPr lang="en-US" sz="1200" b="1" kern="1200" dirty="0">
-                <a:solidFill>
-                  <a:schemeClr val="tx1"/>
-                </a:solidFill>
-                <a:effectLst/>
-                <a:latin typeface="+mn-lt"/>
-                <a:ea typeface="+mn-ea"/>
-                <a:cs typeface="+mn-cs"/>
-              </a:rPr>
-              <a:t>Segway to AMP </a:t>
-            </a:r>
-            <a:endParaRPr lang="en-US" dirty="0"/>
+              <a:rPr lang="en-US" dirty="0"/>
+              <a:t>Update based on new icons </a:t>
+            </a:r>
+          </a:p>
+          <a:p>
+            <a:r>
+              <a:rPr lang="en-US" dirty="0"/>
+              <a:t>Both sites should connect to Azure</a:t>
+            </a:r>
+          </a:p>
+          <a:p>
+            <a:r>
+              <a:rPr lang="en-US" dirty="0"/>
+              <a:t>More emphasis on peering</a:t>
+            </a:r>
+          </a:p>
+          <a:p>
+            <a:r>
+              <a:rPr lang="en-US" dirty="0"/>
+              <a:t>Need WVD control plane</a:t>
+            </a:r>
           </a:p>
         </p:txBody>
       </p:sp>
@@ -2395,7 +2268,7 @@
             <a:spLocks noGrp="1"/>
           </p:cNvSpPr>
           <p:nvPr>
-            <p:ph type="sldNum" sz="quarter" idx="10"/>
+            <p:ph type="sldNum" sz="quarter" idx="5"/>
           </p:nvPr>
         </p:nvSpPr>
         <p:spPr/>
@@ -2414,7 +2287,7 @@
     </p:spTree>
     <p:extLst>
       <p:ext uri="{BB962C8B-B14F-4D97-AF65-F5344CB8AC3E}">
-        <p14:creationId xmlns:p14="http://schemas.microsoft.com/office/powerpoint/2010/main" val="4115832635"/>
+        <p14:creationId xmlns:p14="http://schemas.microsoft.com/office/powerpoint/2010/main" val="11525056"/>
       </p:ext>
     </p:extLst>
   </p:cSld>
@@ -2528,7 +2401,46 @@
                 <a:ea typeface="+mn-ea"/>
                 <a:cs typeface="+mn-cs"/>
               </a:rPr>
-              <a:t>Add non-windows OS scenario to this objection (macs and thin clients)</a:t>
+              <a:t>Focus more on WVD native solution, then talk about how Citrix &amp; VMWare changes the solution. (note that Citrix &amp; VMWare brings shorter time to solution)</a:t>
+            </a:r>
+          </a:p>
+          <a:p>
+            <a:r>
+              <a:rPr lang="en-US" sz="1200" b="1" kern="1200" dirty="0">
+                <a:solidFill>
+                  <a:schemeClr val="tx1"/>
+                </a:solidFill>
+                <a:effectLst/>
+                <a:latin typeface="+mn-lt"/>
+                <a:ea typeface="+mn-ea"/>
+                <a:cs typeface="+mn-cs"/>
+              </a:rPr>
+              <a:t>Move this obj to the end</a:t>
+            </a:r>
+          </a:p>
+          <a:p>
+            <a:endParaRPr lang="en-US" sz="1200" b="1" kern="1200" dirty="0">
+              <a:solidFill>
+                <a:schemeClr val="tx1"/>
+              </a:solidFill>
+              <a:effectLst/>
+              <a:latin typeface="+mn-lt"/>
+              <a:ea typeface="+mn-ea"/>
+              <a:cs typeface="+mn-cs"/>
+            </a:endParaRPr>
+          </a:p>
+          <a:p>
+            <a:r>
+              <a:rPr lang="en-US" sz="1200" b="1" kern="1200" dirty="0">
+                <a:solidFill>
+                  <a:schemeClr val="tx1"/>
+                </a:solidFill>
+                <a:effectLst/>
+                <a:latin typeface="+mn-lt"/>
+                <a:ea typeface="+mn-ea"/>
+                <a:cs typeface="+mn-cs"/>
+              </a:rPr>
+              <a:t>Segway to AMP </a:t>
             </a:r>
             <a:endParaRPr lang="en-US" dirty="0"/>
           </a:p>
@@ -2560,7 +2472,7 @@
     </p:spTree>
     <p:extLst>
       <p:ext uri="{BB962C8B-B14F-4D97-AF65-F5344CB8AC3E}">
-        <p14:creationId xmlns:p14="http://schemas.microsoft.com/office/powerpoint/2010/main" val="4041440512"/>
+        <p14:creationId xmlns:p14="http://schemas.microsoft.com/office/powerpoint/2010/main" val="4115832635"/>
       </p:ext>
     </p:extLst>
   </p:cSld>
@@ -2674,62 +2586,9 @@
                 <a:ea typeface="+mn-ea"/>
                 <a:cs typeface="+mn-cs"/>
               </a:rPr>
-              <a:t>Note that Cloud App Security requires additional license</a:t>
-            </a:r>
-          </a:p>
-          <a:p>
-            <a:endParaRPr lang="en-US" sz="1200" b="1" kern="1200" dirty="0">
-              <a:solidFill>
-                <a:schemeClr val="tx1"/>
-              </a:solidFill>
-              <a:effectLst/>
-              <a:latin typeface="+mn-lt"/>
-              <a:ea typeface="+mn-ea"/>
-              <a:cs typeface="+mn-cs"/>
-            </a:endParaRPr>
-          </a:p>
-          <a:p>
-            <a:r>
-              <a:rPr lang="en-US" sz="1200" b="1" kern="1200" dirty="0">
-                <a:solidFill>
-                  <a:schemeClr val="tx1"/>
-                </a:solidFill>
-                <a:effectLst/>
-                <a:latin typeface="+mn-lt"/>
-                <a:ea typeface="+mn-ea"/>
-                <a:cs typeface="+mn-cs"/>
-              </a:rPr>
-              <a:t>Callout </a:t>
-            </a:r>
-            <a:r>
-              <a:rPr lang="en-US" sz="1200" b="1" kern="1200" dirty="0" err="1">
-                <a:solidFill>
-                  <a:schemeClr val="tx1"/>
-                </a:solidFill>
-                <a:effectLst/>
-                <a:latin typeface="+mn-lt"/>
-                <a:ea typeface="+mn-ea"/>
-                <a:cs typeface="+mn-cs"/>
-              </a:rPr>
-              <a:t>Sentinal</a:t>
-            </a:r>
-            <a:r>
-              <a:rPr lang="en-US" sz="1200" b="1" kern="1200" dirty="0">
-                <a:solidFill>
-                  <a:schemeClr val="tx1"/>
-                </a:solidFill>
-                <a:effectLst/>
-                <a:latin typeface="+mn-lt"/>
-                <a:ea typeface="+mn-ea"/>
-                <a:cs typeface="+mn-cs"/>
-              </a:rPr>
-              <a:t>, Defender ATP, Security Center</a:t>
-            </a:r>
-            <a:endParaRPr lang="en-US" dirty="0">
-              <a:solidFill>
-                <a:schemeClr val="bg1"/>
-              </a:solidFill>
-            </a:endParaRPr>
+              <a:t>Add non-windows OS scenario to this objection (macs and thin clients)</a:t>
+            </a:r>
+            <a:endParaRPr lang="en-US" dirty="0"/>
           </a:p>
         </p:txBody>
       </p:sp>
@@ -2759,7 +2618,7 @@
     </p:spTree>
     <p:extLst>
       <p:ext uri="{BB962C8B-B14F-4D97-AF65-F5344CB8AC3E}">
-        <p14:creationId xmlns:p14="http://schemas.microsoft.com/office/powerpoint/2010/main" val="1067831621"/>
+        <p14:creationId xmlns:p14="http://schemas.microsoft.com/office/powerpoint/2010/main" val="4041440512"/>
       </p:ext>
     </p:extLst>
   </p:cSld>
@@ -2863,7 +2722,21 @@
             </a:endParaRPr>
           </a:p>
           <a:p>
-            <a:endParaRPr lang="en-US" sz="1200" b="0" kern="1200" dirty="0">
+            <a:r>
+              <a:rPr lang="en-US" sz="1200" b="1" kern="1200" dirty="0">
+                <a:solidFill>
+                  <a:schemeClr val="tx1"/>
+                </a:solidFill>
+                <a:effectLst/>
+                <a:latin typeface="+mn-lt"/>
+                <a:ea typeface="+mn-ea"/>
+                <a:cs typeface="+mn-cs"/>
+              </a:rPr>
+              <a:t>Note that Cloud App Security requires additional license</a:t>
+            </a:r>
+          </a:p>
+          <a:p>
+            <a:endParaRPr lang="en-US" sz="1200" b="1" kern="1200" dirty="0">
               <a:solidFill>
                 <a:schemeClr val="tx1"/>
               </a:solidFill>
@@ -2871,6 +2744,49 @@
               <a:latin typeface="+mn-lt"/>
               <a:ea typeface="+mn-ea"/>
               <a:cs typeface="+mn-cs"/>
+            </a:endParaRPr>
+          </a:p>
+          <a:p>
+            <a:r>
+              <a:rPr lang="en-US" sz="1200" b="1" kern="1200" dirty="0">
+                <a:solidFill>
+                  <a:schemeClr val="tx1"/>
+                </a:solidFill>
+                <a:effectLst/>
+                <a:latin typeface="+mn-lt"/>
+                <a:ea typeface="+mn-ea"/>
+                <a:cs typeface="+mn-cs"/>
+              </a:rPr>
+              <a:t>Callout </a:t>
+            </a:r>
+            <a:r>
+              <a:rPr lang="en-US" sz="1200" b="1" kern="1200" dirty="0" err="1">
+                <a:solidFill>
+                  <a:schemeClr val="tx1"/>
+                </a:solidFill>
+                <a:effectLst/>
+                <a:latin typeface="+mn-lt"/>
+                <a:ea typeface="+mn-ea"/>
+                <a:cs typeface="+mn-cs"/>
+              </a:rPr>
+              <a:t>Sentinal</a:t>
+            </a:r>
+            <a:r>
+              <a:rPr lang="en-US" sz="1200" b="1" kern="1200" dirty="0">
+                <a:solidFill>
+                  <a:schemeClr val="tx1"/>
+                </a:solidFill>
+                <a:effectLst/>
+                <a:latin typeface="+mn-lt"/>
+                <a:ea typeface="+mn-ea"/>
+                <a:cs typeface="+mn-cs"/>
+              </a:rPr>
+              <a:t>, Defender ATP, Security Center</a:t>
+            </a:r>
+            <a:endParaRPr lang="en-US" dirty="0">
+              <a:solidFill>
+                <a:schemeClr val="bg1"/>
+              </a:solidFill>
             </a:endParaRPr>
           </a:p>
         </p:txBody>
@@ -2901,7 +2817,7 @@
     </p:spTree>
     <p:extLst>
       <p:ext uri="{BB962C8B-B14F-4D97-AF65-F5344CB8AC3E}">
-        <p14:creationId xmlns:p14="http://schemas.microsoft.com/office/powerpoint/2010/main" val="4205639758"/>
+        <p14:creationId xmlns:p14="http://schemas.microsoft.com/office/powerpoint/2010/main" val="1067831621"/>
       </p:ext>
     </p:extLst>
   </p:cSld>
@@ -2966,7 +2882,7 @@
           <a:p>
             <a:r>
               <a:rPr lang="en-US" sz="1200" dirty="0"/>
-              <a:t>Your solution will consider the necessary Microsoft 365 subscription required for Windows 10 multi-user licensing, as well as the Azure Active Directory and security needs for a healthcare provider. You will need to determine how to connect Azure to the current VMware and Citrix on-premises infrastructure and the connections needed to connect this infrastructure to Azure for application access. Finally, you will need to design the Windows Virtual Desktop solution utilizing Azure virtual machines with availability and scalability to handle 24x7x365 operations without performance degradation.</a:t>
+              <a:t>Your solution will consider the necessary Microsoft 365 subscription required for Windows 10 multi-user licensing, as well as the Azure Active Directory and security needs for a healthcare provider. You will need to determine how to connect Azure to the current VMware and Citrix on-premises infrastructure and the connections needed to connect this infrastructure to Azure for application access. Finally, you will need to design the Windows Virtual Desktop solution utilizing Azure virtual machines with availability and scalability to handle 24x7 operations without performance degradation.</a:t>
             </a:r>
           </a:p>
           <a:p>
@@ -2974,7 +2890,7 @@
           </a:p>
           <a:p>
             <a:r>
-              <a:rPr lang="en-US" sz="1200"/>
+              <a:rPr lang="en-US" sz="1200" dirty="0"/>
               <a:t>At the end of the whiteboard design session, you will be better able to design a solution that leverages Microsoft 365 and Azure technologies together to build a secure and robust Windows Virtual Desktop infrastructure.</a:t>
             </a:r>
           </a:p>
@@ -3113,18 +3029,6 @@
             </a:endParaRPr>
           </a:p>
           <a:p>
-            <a:r>
-              <a:rPr lang="en-US" sz="1200" b="1" kern="1200" dirty="0" err="1">
-                <a:solidFill>
-                  <a:schemeClr val="tx1"/>
-                </a:solidFill>
-                <a:effectLst/>
-                <a:latin typeface="+mn-lt"/>
-                <a:ea typeface="+mn-ea"/>
-                <a:cs typeface="+mn-cs"/>
-              </a:rPr>
-              <a:t>Sentinal</a:t>
-            </a:r>
             <a:endParaRPr lang="en-US" sz="1200" b="0" kern="1200" dirty="0">
               <a:solidFill>
                 <a:schemeClr val="tx1"/>
@@ -3163,6 +3067,160 @@
     </p:spTree>
     <p:extLst>
       <p:ext uri="{BB962C8B-B14F-4D97-AF65-F5344CB8AC3E}">
+        <p14:creationId xmlns:p14="http://schemas.microsoft.com/office/powerpoint/2010/main" val="4205639758"/>
+      </p:ext>
+    </p:extLst>
+  </p:cSld>
+  <p:clrMapOvr>
+    <a:masterClrMapping/>
+  </p:clrMapOvr>
+</p:notes>
+</file>
+
+<file path=ppt/notesSlides/notesSlide31.xml><?xml version="1.0" encoding="utf-8"?>
+<p:notes xmlns:a="http://schemas.openxmlformats.org/drawingml/2006/main" xmlns:r="http://schemas.openxmlformats.org/officeDocument/2006/relationships" xmlns:p="http://schemas.openxmlformats.org/presentationml/2006/main">
+  <p:cSld>
+    <p:spTree>
+      <p:nvGrpSpPr>
+        <p:cNvPr id="1" name=""/>
+        <p:cNvGrpSpPr/>
+        <p:nvPr/>
+      </p:nvGrpSpPr>
+      <p:grpSpPr>
+        <a:xfrm>
+          <a:off x="0" y="0"/>
+          <a:ext cx="0" cy="0"/>
+          <a:chOff x="0" y="0"/>
+          <a:chExt cx="0" cy="0"/>
+        </a:xfrm>
+      </p:grpSpPr>
+      <p:sp>
+        <p:nvSpPr>
+          <p:cNvPr id="2" name="Slide Image Placeholder 1"/>
+          <p:cNvSpPr>
+            <a:spLocks noGrp="1" noRot="1" noChangeAspect="1"/>
+          </p:cNvSpPr>
+          <p:nvPr>
+            <p:ph type="sldImg"/>
+          </p:nvPr>
+        </p:nvSpPr>
+        <p:spPr/>
+      </p:sp>
+      <p:sp>
+        <p:nvSpPr>
+          <p:cNvPr id="3" name="Notes Placeholder 2"/>
+          <p:cNvSpPr>
+            <a:spLocks noGrp="1"/>
+          </p:cNvSpPr>
+          <p:nvPr>
+            <p:ph type="body" idx="1"/>
+          </p:nvPr>
+        </p:nvSpPr>
+        <p:spPr/>
+        <p:txBody>
+          <a:bodyPr/>
+          <a:lstStyle/>
+          <a:p>
+            <a:r>
+              <a:rPr lang="en-US" sz="1200" b="1" kern="1200" dirty="0">
+                <a:solidFill>
+                  <a:schemeClr val="tx1"/>
+                </a:solidFill>
+                <a:effectLst/>
+                <a:latin typeface="+mn-lt"/>
+                <a:ea typeface="+mn-ea"/>
+                <a:cs typeface="+mn-cs"/>
+              </a:rPr>
+              <a:t>**Objection:**</a:t>
+            </a:r>
+          </a:p>
+          <a:p>
+            <a:br>
+              <a:rPr lang="en-US" sz="1200" b="0" kern="1200" dirty="0">
+                <a:solidFill>
+                  <a:schemeClr val="tx1"/>
+                </a:solidFill>
+                <a:effectLst/>
+                <a:latin typeface="+mn-lt"/>
+                <a:ea typeface="+mn-ea"/>
+                <a:cs typeface="+mn-cs"/>
+              </a:rPr>
+            </a:br>
+            <a:r>
+              <a:rPr lang="en-US" sz="1200" b="1" kern="1200" dirty="0">
+                <a:solidFill>
+                  <a:schemeClr val="tx1"/>
+                </a:solidFill>
+                <a:effectLst/>
+                <a:latin typeface="+mn-lt"/>
+                <a:ea typeface="+mn-ea"/>
+                <a:cs typeface="+mn-cs"/>
+              </a:rPr>
+              <a:t>**Answer:**</a:t>
+            </a:r>
+          </a:p>
+          <a:p>
+            <a:endParaRPr lang="en-US" sz="1200" b="1" kern="1200" dirty="0">
+              <a:solidFill>
+                <a:schemeClr val="tx1"/>
+              </a:solidFill>
+              <a:effectLst/>
+              <a:latin typeface="+mn-lt"/>
+              <a:ea typeface="+mn-ea"/>
+              <a:cs typeface="+mn-cs"/>
+            </a:endParaRPr>
+          </a:p>
+          <a:p>
+            <a:r>
+              <a:rPr lang="en-US" sz="1200" b="1" kern="1200" dirty="0" err="1">
+                <a:solidFill>
+                  <a:schemeClr val="tx1"/>
+                </a:solidFill>
+                <a:effectLst/>
+                <a:latin typeface="+mn-lt"/>
+                <a:ea typeface="+mn-ea"/>
+                <a:cs typeface="+mn-cs"/>
+              </a:rPr>
+              <a:t>Sentinal</a:t>
+            </a:r>
+            <a:endParaRPr lang="en-US" sz="1200" b="0" kern="1200" dirty="0">
+              <a:solidFill>
+                <a:schemeClr val="tx1"/>
+              </a:solidFill>
+              <a:effectLst/>
+              <a:latin typeface="+mn-lt"/>
+              <a:ea typeface="+mn-ea"/>
+              <a:cs typeface="+mn-cs"/>
+            </a:endParaRPr>
+          </a:p>
+        </p:txBody>
+      </p:sp>
+      <p:sp>
+        <p:nvSpPr>
+          <p:cNvPr id="4" name="Slide Number Placeholder 3"/>
+          <p:cNvSpPr>
+            <a:spLocks noGrp="1"/>
+          </p:cNvSpPr>
+          <p:nvPr>
+            <p:ph type="sldNum" sz="quarter" idx="10"/>
+          </p:nvPr>
+        </p:nvSpPr>
+        <p:spPr/>
+        <p:txBody>
+          <a:bodyPr/>
+          <a:lstStyle/>
+          <a:p>
+            <a:fld id="{0998D5BB-B127-481F-BC0A-2F77C576BB34}" type="slidenum">
+              <a:rPr lang="en-US" smtClean="0"/>
+              <a:t>33</a:t>
+            </a:fld>
+            <a:endParaRPr lang="en-US" dirty="0"/>
+          </a:p>
+        </p:txBody>
+      </p:sp>
+    </p:spTree>
+    <p:extLst>
+      <p:ext uri="{BB962C8B-B14F-4D97-AF65-F5344CB8AC3E}">
         <p14:creationId xmlns:p14="http://schemas.microsoft.com/office/powerpoint/2010/main" val="347754989"/>
       </p:ext>
     </p:extLst>
@@ -3173,7 +3231,7 @@
 </p:notes>
 </file>
 
-<file path=ppt/notesSlides/notesSlide31.xml><?xml version="1.0" encoding="utf-8"?>
+<file path=ppt/notesSlides/notesSlide32.xml><?xml version="1.0" encoding="utf-8"?>
 <p:notes xmlns:a="http://schemas.openxmlformats.org/drawingml/2006/main" xmlns:r="http://schemas.openxmlformats.org/officeDocument/2006/relationships" xmlns:p="http://schemas.openxmlformats.org/presentationml/2006/main">
   <p:cSld>
     <p:spTree>
@@ -3280,7 +3338,7 @@
                   <a:prstClr val="black"/>
                 </a:solidFill>
               </a:rPr>
-              <a:t>6/24/20 1:04 PM</a:t>
+              <a:t>8/7/2020 1:26 PM</a:t>
             </a:fld>
             <a:endParaRPr lang="en-US" dirty="0">
               <a:solidFill>
@@ -3312,7 +3370,7 @@
                 </a:solidFill>
               </a:rPr>
               <a:pPr/>
-              <a:t>34</a:t>
+              <a:t>35</a:t>
             </a:fld>
             <a:endParaRPr lang="en-US" dirty="0">
               <a:solidFill>
@@ -3473,7 +3531,7 @@
                 <a:ea typeface="+mn-ea"/>
                 <a:cs typeface="+mn-cs"/>
               </a:rPr>
-              <a:t>Contoso Healthcare, headquartered in Detroit, Michigan, is a national healthcare provider with a network of affiliate hospitals and doctor’s offices located throughout North America. These locations continue to grow through acquisition.  The nature of their business requires a high level of security of personal health information (PHI) of patients, and personal identifiable information (PII) for their employees.</a:t>
+              <a:t>Contoso Healthcare, headquartered in Los Angeles, California, is a national healthcare provider with a network of affiliate hospitals and doctor’s offices located throughout North America. These locations continue to grow through acquisition.  The nature of their business requires a high level of security of personal identifiable information (PII) for their employees.</a:t>
             </a:r>
           </a:p>
           <a:p>
@@ -3498,7 +3556,7 @@
                 <a:ea typeface="+mn-ea"/>
                 <a:cs typeface="+mn-cs"/>
               </a:rPr>
-              <a:t>Contoso currently has approximately 500 workstations within their environment with a number of healthcare practice applications, insurance applications, and business applications. Contoso is currently supporting existing data centers in Detroit, MI and Dallas, Texas with VMware for the server control plane and a partial deployment of Citrix virtual desktop infrastructure.</a:t>
+              <a:t>Contoso currently has approximately 250 workstations within their environment with business applications for non-clinical users from the Developer, Finance, and Knowledge departments. Contoso is currently supporting existing data centers in California and Northern Virginia with VMware for the server control plane and a partial deployment of Citrix virtual desktop infrastructure.</a:t>
             </a:r>
           </a:p>
           <a:p>
@@ -3684,31 +3742,6 @@
           <a:bodyPr/>
           <a:lstStyle/>
           <a:p>
-            <a:r>
-              <a:rPr lang="en-US" sz="1200" b="0" i="0" kern="1200" dirty="0">
-                <a:solidFill>
-                  <a:schemeClr val="tx1"/>
-                </a:solidFill>
-                <a:effectLst/>
-                <a:latin typeface="+mn-lt"/>
-                <a:ea typeface="+mn-ea"/>
-                <a:cs typeface="+mn-cs"/>
-              </a:rPr>
-              <a:t>The business of healthcare has become more reliant on mobile devices to access patient health records, which has created a concern over theft and data exposure. Contoso would like to eliminate the possibility of any PHI or PII being located on a local device through use of a virtual desktop infrastructure.</a:t>
-            </a:r>
-          </a:p>
-          <a:p>
-            <a:endParaRPr lang="en-US" sz="1200" b="0" i="0" kern="1200" dirty="0">
-              <a:solidFill>
-                <a:schemeClr val="tx1"/>
-              </a:solidFill>
-              <a:effectLst/>
-              <a:latin typeface="+mn-lt"/>
-              <a:ea typeface="+mn-ea"/>
-              <a:cs typeface="+mn-cs"/>
-            </a:endParaRPr>
-          </a:p>
-          <a:p>
             <a:endParaRPr lang="en-IE" dirty="0"/>
           </a:p>
         </p:txBody>
@@ -3803,7 +3836,7 @@
                 <a:ea typeface="+mn-ea"/>
                 <a:cs typeface="+mn-cs"/>
               </a:rPr>
-              <a:t>Being a healthcare provider, Contoso has a requirement for applications to be accessible 24x7x365, so any infrastructure should be designed with high availability and scalability in mind.</a:t>
+              <a:t>The business of healthcare has become more reliant on mobile devices to access patient health records, which has created a concern over theft and data exposure. Contoso would like to eliminate the possibility of any PII being located on a local device through use of a virtual desktop infrastructure.</a:t>
             </a:r>
           </a:p>
           <a:p>
@@ -3819,20 +3852,12 @@
           </a:p>
           <a:p>
             <a:r>
-              <a:rPr lang="en-US" sz="1200" b="0" i="0" kern="1200" dirty="0">
-                <a:solidFill>
-                  <a:schemeClr val="tx1"/>
-                </a:solidFill>
-                <a:effectLst/>
-                <a:latin typeface="+mn-lt"/>
-                <a:ea typeface="+mn-ea"/>
-                <a:cs typeface="+mn-cs"/>
-              </a:rPr>
-              <a:t>*** 24x7 (drop 365)</a:t>
-            </a:r>
-          </a:p>
-          <a:p>
-            <a:endParaRPr lang="en-IE" dirty="0"/>
+              <a:rPr lang="en-IE" dirty="0"/>
+              <a:t>Since Contoso Healthcare is headquartered in California, they are required to comply to the California Personal Protection Act, which is very similar to GDPR requirements.</a:t>
+            </a:r>
+          </a:p>
+          <a:p>
+            <a:endParaRPr lang="en-US" dirty="0"/>
           </a:p>
         </p:txBody>
       </p:sp>
@@ -3862,7 +3887,7 @@
     </p:spTree>
     <p:extLst>
       <p:ext uri="{BB962C8B-B14F-4D97-AF65-F5344CB8AC3E}">
-        <p14:creationId xmlns:p14="http://schemas.microsoft.com/office/powerpoint/2010/main" val="3628956631"/>
+        <p14:creationId xmlns:p14="http://schemas.microsoft.com/office/powerpoint/2010/main" val="1328010214"/>
       </p:ext>
     </p:extLst>
   </p:cSld>
@@ -3917,9 +3942,31 @@
           <a:lstStyle/>
           <a:p>
             <a:r>
-              <a:rPr lang="en-IE" dirty="0"/>
-              <a:t>*** Legacy app</a:t>
-            </a:r>
+              <a:rPr lang="en-US" sz="1200" b="0" i="0" kern="1200" dirty="0">
+                <a:solidFill>
+                  <a:schemeClr val="tx1"/>
+                </a:solidFill>
+                <a:effectLst/>
+                <a:latin typeface="+mn-lt"/>
+                <a:ea typeface="+mn-ea"/>
+                <a:cs typeface="+mn-cs"/>
+              </a:rPr>
+              <a:t>Being a healthcare provider, Contoso has a requirement for applications to be accessible 24x7, so any infrastructure should be designed with high availability and scalability in mind.</a:t>
+            </a:r>
+          </a:p>
+          <a:p>
+            <a:endParaRPr lang="en-US" sz="1200" b="0" i="0" kern="1200" dirty="0">
+              <a:solidFill>
+                <a:schemeClr val="tx1"/>
+              </a:solidFill>
+              <a:effectLst/>
+              <a:latin typeface="+mn-lt"/>
+              <a:ea typeface="+mn-ea"/>
+              <a:cs typeface="+mn-cs"/>
+            </a:endParaRPr>
+          </a:p>
+          <a:p>
+            <a:endParaRPr lang="en-IE" dirty="0"/>
           </a:p>
         </p:txBody>
       </p:sp>
@@ -3949,7 +3996,7 @@
     </p:spTree>
     <p:extLst>
       <p:ext uri="{BB962C8B-B14F-4D97-AF65-F5344CB8AC3E}">
-        <p14:creationId xmlns:p14="http://schemas.microsoft.com/office/powerpoint/2010/main" val="1446545291"/>
+        <p14:creationId xmlns:p14="http://schemas.microsoft.com/office/powerpoint/2010/main" val="3628956631"/>
       </p:ext>
     </p:extLst>
   </p:cSld>
@@ -16108,6 +16155,143 @@
       </p:grpSpPr>
       <p:sp>
         <p:nvSpPr>
+          <p:cNvPr id="2" name="Text Placeholder 1">
+            <a:extLst>
+              <a:ext uri="{FF2B5EF4-FFF2-40B4-BE49-F238E27FC236}">
+                <a16:creationId xmlns:a16="http://schemas.microsoft.com/office/drawing/2014/main" id="{94B1CFD0-EE96-4D8C-9380-EEE6C6A42E87}"/>
+              </a:ext>
+            </a:extLst>
+          </p:cNvPr>
+          <p:cNvSpPr>
+            <a:spLocks noGrp="1"/>
+          </p:cNvSpPr>
+          <p:nvPr>
+            <p:ph type="body" sz="quarter" idx="10"/>
+          </p:nvPr>
+        </p:nvSpPr>
+        <p:spPr>
+          <a:xfrm>
+            <a:off x="269239" y="1189177"/>
+            <a:ext cx="11653523" cy="4653582"/>
+          </a:xfrm>
+        </p:spPr>
+        <p:txBody>
+          <a:bodyPr/>
+          <a:lstStyle/>
+          <a:p>
+            <a:pPr>
+              <a:spcBef>
+                <a:spcPts val="1800"/>
+              </a:spcBef>
+            </a:pPr>
+            <a:r>
+              <a:rPr lang="en-US" sz="3200" dirty="0"/>
+              <a:t>Eliminate the need to update and manage local devices</a:t>
+            </a:r>
+          </a:p>
+          <a:p>
+            <a:pPr>
+              <a:spcBef>
+                <a:spcPts val="1800"/>
+              </a:spcBef>
+            </a:pPr>
+            <a:endParaRPr lang="en-US" sz="3200" dirty="0"/>
+          </a:p>
+          <a:p>
+            <a:pPr>
+              <a:spcBef>
+                <a:spcPts val="1800"/>
+              </a:spcBef>
+            </a:pPr>
+            <a:r>
+              <a:rPr lang="en-US" sz="3200" dirty="0"/>
+              <a:t>Utilize the current VMware and Citrix virtual desktop infrastructure for the control plane for application access and delivery</a:t>
+            </a:r>
+          </a:p>
+          <a:p>
+            <a:pPr>
+              <a:spcBef>
+                <a:spcPts val="1800"/>
+              </a:spcBef>
+            </a:pPr>
+            <a:endParaRPr lang="en-US" sz="3200" dirty="0"/>
+          </a:p>
+          <a:p>
+            <a:pPr>
+              <a:spcBef>
+                <a:spcPts val="1800"/>
+              </a:spcBef>
+            </a:pPr>
+            <a:r>
+              <a:rPr lang="en-US" sz="3200" dirty="0"/>
+              <a:t>Create a standardized desktop image for users to access Microsoft 365 and legacy on-premises applications</a:t>
+            </a:r>
+          </a:p>
+        </p:txBody>
+      </p:sp>
+      <p:sp>
+        <p:nvSpPr>
+          <p:cNvPr id="3" name="Title 2">
+            <a:extLst>
+              <a:ext uri="{FF2B5EF4-FFF2-40B4-BE49-F238E27FC236}">
+                <a16:creationId xmlns:a16="http://schemas.microsoft.com/office/drawing/2014/main" id="{AB41BA66-A1EC-46C7-833C-D6C0E7B2B745}"/>
+              </a:ext>
+            </a:extLst>
+          </p:cNvPr>
+          <p:cNvSpPr>
+            <a:spLocks noGrp="1"/>
+          </p:cNvSpPr>
+          <p:nvPr>
+            <p:ph type="title"/>
+          </p:nvPr>
+        </p:nvSpPr>
+        <p:spPr/>
+        <p:txBody>
+          <a:bodyPr/>
+          <a:lstStyle/>
+          <a:p>
+            <a:r>
+              <a:rPr lang="en-IE" dirty="0"/>
+              <a:t>Customer Needs—Deployment Acceleration</a:t>
+            </a:r>
+          </a:p>
+        </p:txBody>
+      </p:sp>
+    </p:spTree>
+    <p:extLst>
+      <p:ext uri="{BB962C8B-B14F-4D97-AF65-F5344CB8AC3E}">
+        <p14:creationId xmlns:p14="http://schemas.microsoft.com/office/powerpoint/2010/main" val="2119545179"/>
+      </p:ext>
+    </p:extLst>
+  </p:cSld>
+  <p:clrMapOvr>
+    <a:masterClrMapping/>
+  </p:clrMapOvr>
+  <p:transition>
+    <p:fade/>
+  </p:transition>
+</p:sld>
+</file>
+
+<file path=ppt/slides/slide11.xml><?xml version="1.0" encoding="utf-8"?>
+<p:sld xmlns:a="http://schemas.openxmlformats.org/drawingml/2006/main" xmlns:r="http://schemas.openxmlformats.org/officeDocument/2006/relationships" xmlns:p="http://schemas.openxmlformats.org/presentationml/2006/main">
+  <p:cSld>
+    <p:spTree>
+      <p:nvGrpSpPr>
+        <p:cNvPr id="1" name=""/>
+        <p:cNvGrpSpPr/>
+        <p:nvPr/>
+      </p:nvGrpSpPr>
+      <p:grpSpPr>
+        <a:xfrm>
+          <a:off x="0" y="0"/>
+          <a:ext cx="0" cy="0"/>
+          <a:chOff x="0" y="0"/>
+          <a:chExt cx="0" cy="0"/>
+        </a:xfrm>
+      </p:grpSpPr>
+      <p:sp>
+        <p:nvSpPr>
           <p:cNvPr id="3" name="Content Placeholder 2"/>
           <p:cNvSpPr>
             <a:spLocks noGrp="1"/>
@@ -16119,7 +16303,7 @@
         <p:spPr>
           <a:xfrm>
             <a:off x="269239" y="1189177"/>
-            <a:ext cx="11653523" cy="5090624"/>
+            <a:ext cx="11653523" cy="6284797"/>
           </a:xfrm>
         </p:spPr>
         <p:txBody>
@@ -16128,13 +16312,18 @@
           <a:p>
             <a:r>
               <a:rPr lang="en-US" sz="3600" dirty="0"/>
-              <a:t>Contoso has made a substantial capital investment in their current data centers that they do not want to decommission. How can the infrastructure be architected to support the current data centers?</a:t>
-            </a:r>
-          </a:p>
-          <a:p>
+              <a:t>The CTO at Contoso does not want to invest in new workstations and mobile devices to support the standardized desktop image. This includes non-OS, Macs, Android, and thin clients.  Can these devices support the new image?</a:t>
+            </a:r>
+          </a:p>
+          <a:p>
+            <a:pPr>
+              <a:spcBef>
+                <a:spcPts val="2400"/>
+              </a:spcBef>
+            </a:pPr>
             <a:r>
               <a:rPr lang="en-US" sz="3600" dirty="0"/>
-              <a:t>The CTO at Contoso does not want to invest in new workstations and mobile devices to support the standardized desktop image. Can these devices support the new image?</a:t>
+              <a:t>Contoso has made a substantial capital investment in their current data centers that they do not want to decommission. How can the infrastructure be architected to utilize the current Citrix virtual desktop infrastructure and control plane?</a:t>
             </a:r>
           </a:p>
           <a:p>
@@ -16194,7 +16383,7 @@
 </p:sld>
 </file>
 
-<file path=ppt/slides/slide11.xml><?xml version="1.0" encoding="utf-8"?>
+<file path=ppt/slides/slide12.xml><?xml version="1.0" encoding="utf-8"?>
 <p:sld xmlns:a="http://schemas.openxmlformats.org/drawingml/2006/main" xmlns:r="http://schemas.openxmlformats.org/officeDocument/2006/relationships" xmlns:p="http://schemas.openxmlformats.org/presentationml/2006/main">
   <p:cSld>
     <p:spTree>
@@ -16304,7 +16493,7 @@
 </p:sld>
 </file>
 
-<file path=ppt/slides/slide12.xml><?xml version="1.0" encoding="utf-8"?>
+<file path=ppt/slides/slide13.xml><?xml version="1.0" encoding="utf-8"?>
 <p:sld xmlns:a="http://schemas.openxmlformats.org/drawingml/2006/main" xmlns:r="http://schemas.openxmlformats.org/officeDocument/2006/relationships" xmlns:p="http://schemas.openxmlformats.org/presentationml/2006/main">
   <p:cSld>
     <p:spTree>
@@ -16516,7 +16705,7 @@
 </p:sld>
 </file>
 
-<file path=ppt/slides/slide13.xml><?xml version="1.0" encoding="utf-8"?>
+<file path=ppt/slides/slide14.xml><?xml version="1.0" encoding="utf-8"?>
 <p:sld xmlns:a="http://schemas.openxmlformats.org/drawingml/2006/main" xmlns:r="http://schemas.openxmlformats.org/officeDocument/2006/relationships" xmlns:p="http://schemas.openxmlformats.org/presentationml/2006/main">
   <p:cSld>
     <p:spTree>
@@ -16645,7 +16834,7 @@
           <p:nvPr/>
         </p:nvPicPr>
         <p:blipFill>
-          <a:blip r:embed="rId2">
+          <a:blip r:embed="rId2" cstate="print">
             <a:extLst>
               <a:ext uri="{28A0092B-C50C-407E-A947-70E740481C1C}">
                 <a14:useLocalDpi xmlns:a14="http://schemas.microsoft.com/office/drawing/2010/main" val="0"/>
@@ -16682,7 +16871,7 @@
 </p:sld>
 </file>
 
-<file path=ppt/slides/slide14.xml><?xml version="1.0" encoding="utf-8"?>
+<file path=ppt/slides/slide15.xml><?xml version="1.0" encoding="utf-8"?>
 <p:sld xmlns:a="http://schemas.openxmlformats.org/drawingml/2006/main" xmlns:r="http://schemas.openxmlformats.org/officeDocument/2006/relationships" xmlns:p="http://schemas.openxmlformats.org/presentationml/2006/main">
   <p:cSld>
     <p:spTree>
@@ -16805,7 +16994,7 @@
           <p:nvPr/>
         </p:nvPicPr>
         <p:blipFill>
-          <a:blip r:embed="rId3">
+          <a:blip r:embed="rId3" cstate="print">
             <a:extLst>
               <a:ext uri="{28A0092B-C50C-407E-A947-70E740481C1C}">
                 <a14:useLocalDpi xmlns:a14="http://schemas.microsoft.com/office/drawing/2010/main" val="0"/>
@@ -16830,156 +17019,6 @@
     <p:extLst>
       <p:ext uri="{BB962C8B-B14F-4D97-AF65-F5344CB8AC3E}">
         <p14:creationId xmlns:p14="http://schemas.microsoft.com/office/powerpoint/2010/main" val="2062267681"/>
-      </p:ext>
-    </p:extLst>
-  </p:cSld>
-  <p:clrMapOvr>
-    <a:masterClrMapping/>
-  </p:clrMapOvr>
-  <mc:AlternateContent xmlns:mc="http://schemas.openxmlformats.org/markup-compatibility/2006" xmlns:p14="http://schemas.microsoft.com/office/powerpoint/2010/main">
-    <mc:Choice Requires="p14">
-      <p:transition p14:dur="0"/>
-    </mc:Choice>
-    <mc:Fallback xmlns="">
-      <p:transition/>
-    </mc:Fallback>
-  </mc:AlternateContent>
-</p:sld>
-</file>
-
-<file path=ppt/slides/slide15.xml><?xml version="1.0" encoding="utf-8"?>
-<p:sld xmlns:a="http://schemas.openxmlformats.org/drawingml/2006/main" xmlns:r="http://schemas.openxmlformats.org/officeDocument/2006/relationships" xmlns:p="http://schemas.openxmlformats.org/presentationml/2006/main">
-  <p:cSld>
-    <p:spTree>
-      <p:nvGrpSpPr>
-        <p:cNvPr id="1" name=""/>
-        <p:cNvGrpSpPr/>
-        <p:nvPr/>
-      </p:nvGrpSpPr>
-      <p:grpSpPr>
-        <a:xfrm>
-          <a:off x="0" y="0"/>
-          <a:ext cx="0" cy="0"/>
-          <a:chOff x="0" y="0"/>
-          <a:chExt cx="0" cy="0"/>
-        </a:xfrm>
-      </p:grpSpPr>
-      <p:sp>
-        <p:nvSpPr>
-          <p:cNvPr id="18" name="Content Placeholder 2">
-            <a:extLst>
-              <a:ext uri="{FF2B5EF4-FFF2-40B4-BE49-F238E27FC236}">
-                <a16:creationId xmlns:a16="http://schemas.microsoft.com/office/drawing/2014/main" id="{0EBB5226-FC08-476B-82AB-FFBEA7FE4620}"/>
-              </a:ext>
-            </a:extLst>
-          </p:cNvPr>
-          <p:cNvSpPr>
-            <a:spLocks noGrp="1"/>
-          </p:cNvSpPr>
-          <p:nvPr>
-            <p:ph type="body" sz="quarter" idx="10"/>
-          </p:nvPr>
-        </p:nvSpPr>
-        <p:spPr>
-          <a:xfrm>
-            <a:off x="269239" y="1189177"/>
-            <a:ext cx="11653523" cy="2105192"/>
-          </a:xfrm>
-        </p:spPr>
-        <p:txBody>
-          <a:bodyPr/>
-          <a:lstStyle/>
-          <a:p>
-            <a:pPr marL="0" indent="0">
-              <a:buNone/>
-            </a:pPr>
-            <a:r>
-              <a:rPr lang="en-US" sz="3600" dirty="0"/>
-              <a:t>Windows Desktop image</a:t>
-            </a:r>
-          </a:p>
-          <a:p>
-            <a:r>
-              <a:rPr lang="en-US" sz="2800" dirty="0"/>
-              <a:t>New Windows 10 multi-user workspace</a:t>
-            </a:r>
-          </a:p>
-          <a:p>
-            <a:r>
-              <a:rPr lang="en-US" sz="2800" dirty="0"/>
-              <a:t>VHD image of existing workspace</a:t>
-            </a:r>
-          </a:p>
-          <a:p>
-            <a:r>
-              <a:rPr lang="en-US" sz="2800" dirty="0"/>
-              <a:t>Application delivery through the current VMware and Citrix environment</a:t>
-            </a:r>
-          </a:p>
-        </p:txBody>
-      </p:sp>
-      <p:sp>
-        <p:nvSpPr>
-          <p:cNvPr id="2" name="Title 1"/>
-          <p:cNvSpPr>
-            <a:spLocks noGrp="1"/>
-          </p:cNvSpPr>
-          <p:nvPr>
-            <p:ph type="title"/>
-          </p:nvPr>
-        </p:nvSpPr>
-        <p:spPr/>
-        <p:txBody>
-          <a:bodyPr/>
-          <a:lstStyle/>
-          <a:p>
-            <a:r>
-              <a:rPr lang="en-US" dirty="0"/>
-              <a:t>Common scenarios</a:t>
-            </a:r>
-          </a:p>
-        </p:txBody>
-      </p:sp>
-      <p:pic>
-        <p:nvPicPr>
-          <p:cNvPr id="4" name="Picture 3">
-            <a:extLst>
-              <a:ext uri="{FF2B5EF4-FFF2-40B4-BE49-F238E27FC236}">
-                <a16:creationId xmlns:a16="http://schemas.microsoft.com/office/drawing/2014/main" id="{9C06C5E8-DE9F-47D7-9798-99F4D2F84BCE}"/>
-              </a:ext>
-            </a:extLst>
-          </p:cNvPr>
-          <p:cNvPicPr>
-            <a:picLocks noChangeAspect="1"/>
-          </p:cNvPicPr>
-          <p:nvPr/>
-        </p:nvPicPr>
-        <p:blipFill>
-          <a:blip r:embed="rId3">
-            <a:extLst>
-              <a:ext uri="{28A0092B-C50C-407E-A947-70E740481C1C}">
-                <a14:useLocalDpi xmlns:a14="http://schemas.microsoft.com/office/drawing/2010/main" val="0"/>
-              </a:ext>
-            </a:extLst>
-          </a:blip>
-          <a:stretch>
-            <a:fillRect/>
-          </a:stretch>
-        </p:blipFill>
-        <p:spPr>
-          <a:xfrm>
-            <a:off x="3107778" y="3294369"/>
-            <a:ext cx="5976444" cy="3294001"/>
-          </a:xfrm>
-          <a:prstGeom prst="rect">
-            <a:avLst/>
-          </a:prstGeom>
-        </p:spPr>
-      </p:pic>
-    </p:spTree>
-    <p:extLst>
-      <p:ext uri="{BB962C8B-B14F-4D97-AF65-F5344CB8AC3E}">
-        <p14:creationId xmlns:p14="http://schemas.microsoft.com/office/powerpoint/2010/main" val="1077527279"/>
       </p:ext>
     </p:extLst>
   </p:cSld>
@@ -17033,6 +17072,156 @@
         <p:spPr>
           <a:xfrm>
             <a:off x="269239" y="1189177"/>
+            <a:ext cx="11653523" cy="2105192"/>
+          </a:xfrm>
+        </p:spPr>
+        <p:txBody>
+          <a:bodyPr/>
+          <a:lstStyle/>
+          <a:p>
+            <a:pPr marL="0" indent="0">
+              <a:buNone/>
+            </a:pPr>
+            <a:r>
+              <a:rPr lang="en-US" sz="3600" dirty="0"/>
+              <a:t>Windows Desktop image</a:t>
+            </a:r>
+          </a:p>
+          <a:p>
+            <a:r>
+              <a:rPr lang="en-US" sz="2800" dirty="0"/>
+              <a:t>New Windows 10 multi-user workspace</a:t>
+            </a:r>
+          </a:p>
+          <a:p>
+            <a:r>
+              <a:rPr lang="en-US" sz="2800" dirty="0"/>
+              <a:t>VHD image of existing workspace</a:t>
+            </a:r>
+          </a:p>
+          <a:p>
+            <a:r>
+              <a:rPr lang="en-US" sz="2800" dirty="0"/>
+              <a:t>Application delivery through the current VMware and Citrix environment</a:t>
+            </a:r>
+          </a:p>
+        </p:txBody>
+      </p:sp>
+      <p:sp>
+        <p:nvSpPr>
+          <p:cNvPr id="2" name="Title 1"/>
+          <p:cNvSpPr>
+            <a:spLocks noGrp="1"/>
+          </p:cNvSpPr>
+          <p:nvPr>
+            <p:ph type="title"/>
+          </p:nvPr>
+        </p:nvSpPr>
+        <p:spPr/>
+        <p:txBody>
+          <a:bodyPr/>
+          <a:lstStyle/>
+          <a:p>
+            <a:r>
+              <a:rPr lang="en-US" dirty="0"/>
+              <a:t>Common scenarios</a:t>
+            </a:r>
+          </a:p>
+        </p:txBody>
+      </p:sp>
+      <p:pic>
+        <p:nvPicPr>
+          <p:cNvPr id="4" name="Picture 3">
+            <a:extLst>
+              <a:ext uri="{FF2B5EF4-FFF2-40B4-BE49-F238E27FC236}">
+                <a16:creationId xmlns:a16="http://schemas.microsoft.com/office/drawing/2014/main" id="{9C06C5E8-DE9F-47D7-9798-99F4D2F84BCE}"/>
+              </a:ext>
+            </a:extLst>
+          </p:cNvPr>
+          <p:cNvPicPr>
+            <a:picLocks noChangeAspect="1"/>
+          </p:cNvPicPr>
+          <p:nvPr/>
+        </p:nvPicPr>
+        <p:blipFill>
+          <a:blip r:embed="rId3" cstate="print">
+            <a:extLst>
+              <a:ext uri="{28A0092B-C50C-407E-A947-70E740481C1C}">
+                <a14:useLocalDpi xmlns:a14="http://schemas.microsoft.com/office/drawing/2010/main" val="0"/>
+              </a:ext>
+            </a:extLst>
+          </a:blip>
+          <a:stretch>
+            <a:fillRect/>
+          </a:stretch>
+        </p:blipFill>
+        <p:spPr>
+          <a:xfrm>
+            <a:off x="3107778" y="3294369"/>
+            <a:ext cx="5976444" cy="3294001"/>
+          </a:xfrm>
+          <a:prstGeom prst="rect">
+            <a:avLst/>
+          </a:prstGeom>
+        </p:spPr>
+      </p:pic>
+    </p:spTree>
+    <p:extLst>
+      <p:ext uri="{BB962C8B-B14F-4D97-AF65-F5344CB8AC3E}">
+        <p14:creationId xmlns:p14="http://schemas.microsoft.com/office/powerpoint/2010/main" val="1077527279"/>
+      </p:ext>
+    </p:extLst>
+  </p:cSld>
+  <p:clrMapOvr>
+    <a:masterClrMapping/>
+  </p:clrMapOvr>
+  <mc:AlternateContent xmlns:mc="http://schemas.openxmlformats.org/markup-compatibility/2006" xmlns:p14="http://schemas.microsoft.com/office/powerpoint/2010/main">
+    <mc:Choice Requires="p14">
+      <p:transition p14:dur="0"/>
+    </mc:Choice>
+    <mc:Fallback xmlns="">
+      <p:transition/>
+    </mc:Fallback>
+  </mc:AlternateContent>
+</p:sld>
+</file>
+
+<file path=ppt/slides/slide17.xml><?xml version="1.0" encoding="utf-8"?>
+<p:sld xmlns:a="http://schemas.openxmlformats.org/drawingml/2006/main" xmlns:r="http://schemas.openxmlformats.org/officeDocument/2006/relationships" xmlns:p="http://schemas.openxmlformats.org/presentationml/2006/main">
+  <p:cSld>
+    <p:spTree>
+      <p:nvGrpSpPr>
+        <p:cNvPr id="1" name=""/>
+        <p:cNvGrpSpPr/>
+        <p:nvPr/>
+      </p:nvGrpSpPr>
+      <p:grpSpPr>
+        <a:xfrm>
+          <a:off x="0" y="0"/>
+          <a:ext cx="0" cy="0"/>
+          <a:chOff x="0" y="0"/>
+          <a:chExt cx="0" cy="0"/>
+        </a:xfrm>
+      </p:grpSpPr>
+      <p:sp>
+        <p:nvSpPr>
+          <p:cNvPr id="18" name="Content Placeholder 2">
+            <a:extLst>
+              <a:ext uri="{FF2B5EF4-FFF2-40B4-BE49-F238E27FC236}">
+                <a16:creationId xmlns:a16="http://schemas.microsoft.com/office/drawing/2014/main" id="{0EBB5226-FC08-476B-82AB-FFBEA7FE4620}"/>
+              </a:ext>
+            </a:extLst>
+          </p:cNvPr>
+          <p:cNvSpPr>
+            <a:spLocks noGrp="1"/>
+          </p:cNvSpPr>
+          <p:nvPr>
+            <p:ph type="body" sz="quarter" idx="10"/>
+          </p:nvPr>
+        </p:nvSpPr>
+        <p:spPr>
+          <a:xfrm>
+            <a:off x="269239" y="1189177"/>
             <a:ext cx="8178075" cy="4043094"/>
           </a:xfrm>
         </p:spPr>
@@ -17114,7 +17303,7 @@
 </p:sld>
 </file>
 
-<file path=ppt/slides/slide17.xml><?xml version="1.0" encoding="utf-8"?>
+<file path=ppt/slides/slide18.xml><?xml version="1.0" encoding="utf-8"?>
 <p:sld xmlns:a="http://schemas.openxmlformats.org/drawingml/2006/main" xmlns:r="http://schemas.openxmlformats.org/officeDocument/2006/relationships" xmlns:p="http://schemas.openxmlformats.org/presentationml/2006/main">
   <p:cSld>
     <p:spTree>
@@ -17664,310 +17853,6 @@
 </p:sld>
 </file>
 
-<file path=ppt/slides/slide18.xml><?xml version="1.0" encoding="utf-8"?>
-<p:sld xmlns:a="http://schemas.openxmlformats.org/drawingml/2006/main" xmlns:r="http://schemas.openxmlformats.org/officeDocument/2006/relationships" xmlns:p="http://schemas.openxmlformats.org/presentationml/2006/main">
-  <p:cSld>
-    <p:spTree>
-      <p:nvGrpSpPr>
-        <p:cNvPr id="1" name=""/>
-        <p:cNvGrpSpPr/>
-        <p:nvPr/>
-      </p:nvGrpSpPr>
-      <p:grpSpPr>
-        <a:xfrm>
-          <a:off x="0" y="0"/>
-          <a:ext cx="0" cy="0"/>
-          <a:chOff x="0" y="0"/>
-          <a:chExt cx="0" cy="0"/>
-        </a:xfrm>
-      </p:grpSpPr>
-      <p:sp>
-        <p:nvSpPr>
-          <p:cNvPr id="2" name="Title 1"/>
-          <p:cNvSpPr>
-            <a:spLocks noGrp="1"/>
-          </p:cNvSpPr>
-          <p:nvPr>
-            <p:ph type="title"/>
-          </p:nvPr>
-        </p:nvSpPr>
-        <p:spPr/>
-        <p:txBody>
-          <a:bodyPr>
-            <a:normAutofit/>
-          </a:bodyPr>
-          <a:lstStyle/>
-          <a:p>
-            <a:r>
-              <a:rPr lang="en-US" sz="4400" dirty="0">
-                <a:solidFill>
-                  <a:schemeClr val="tx1"/>
-                </a:solidFill>
-                <a:latin typeface="Segoe UI Light" panose="020B0502040204020203" pitchFamily="34" charset="0"/>
-                <a:cs typeface="Segoe UI Light" panose="020B0502040204020203" pitchFamily="34" charset="0"/>
-              </a:rPr>
-              <a:t>Step 3: Present the solution</a:t>
-            </a:r>
-          </a:p>
-        </p:txBody>
-      </p:sp>
-      <p:sp>
-        <p:nvSpPr>
-          <p:cNvPr id="9" name="TextBox 8">
-            <a:extLst>
-              <a:ext uri="{FF2B5EF4-FFF2-40B4-BE49-F238E27FC236}">
-                <a16:creationId xmlns:a16="http://schemas.microsoft.com/office/drawing/2014/main" id="{0F86F9F9-39B5-4CE6-AF48-9ADAE40EA728}"/>
-              </a:ext>
-            </a:extLst>
-          </p:cNvPr>
-          <p:cNvSpPr txBox="1"/>
-          <p:nvPr/>
-        </p:nvSpPr>
-        <p:spPr>
-          <a:xfrm>
-            <a:off x="340285" y="1062166"/>
-            <a:ext cx="10229103" cy="5727722"/>
-          </a:xfrm>
-          <a:prstGeom prst="rect">
-            <a:avLst/>
-          </a:prstGeom>
-          <a:noFill/>
-        </p:spPr>
-        <p:txBody>
-          <a:bodyPr wrap="square" lIns="182880" tIns="146304" rIns="182880" bIns="146304" rtlCol="0">
-            <a:spAutoFit/>
-          </a:bodyPr>
-          <a:lstStyle/>
-          <a:p>
-            <a:pPr>
-              <a:lnSpc>
-                <a:spcPct val="90000"/>
-              </a:lnSpc>
-              <a:spcAft>
-                <a:spcPts val="600"/>
-              </a:spcAft>
-            </a:pPr>
-            <a:r>
-              <a:rPr lang="en-US" sz="3600" dirty="0">
-                <a:latin typeface="+mj-lt"/>
-              </a:rPr>
-              <a:t>Outcome</a:t>
-            </a:r>
-          </a:p>
-          <a:p>
-            <a:pPr>
-              <a:lnSpc>
-                <a:spcPct val="90000"/>
-              </a:lnSpc>
-              <a:spcAft>
-                <a:spcPts val="600"/>
-              </a:spcAft>
-            </a:pPr>
-            <a:r>
-              <a:rPr lang="en-US" sz="2400" dirty="0">
-                <a:latin typeface="Segoe UI Semilight" panose="020B0402040204020203" pitchFamily="34" charset="0"/>
-                <a:cs typeface="Segoe UI Semilight" panose="020B0402040204020203" pitchFamily="34" charset="0"/>
-              </a:rPr>
-              <a:t>Present a solution to the target customer in a 15-minute chalk-talk format. </a:t>
-            </a:r>
-            <a:endParaRPr lang="en-US" sz="3600" dirty="0">
-              <a:latin typeface="+mj-lt"/>
-            </a:endParaRPr>
-          </a:p>
-          <a:p>
-            <a:pPr>
-              <a:lnSpc>
-                <a:spcPct val="90000"/>
-              </a:lnSpc>
-              <a:spcAft>
-                <a:spcPts val="600"/>
-              </a:spcAft>
-            </a:pPr>
-            <a:endParaRPr lang="en-US" sz="2000" dirty="0">
-              <a:latin typeface="+mj-lt"/>
-            </a:endParaRPr>
-          </a:p>
-          <a:p>
-            <a:pPr>
-              <a:lnSpc>
-                <a:spcPct val="90000"/>
-              </a:lnSpc>
-              <a:spcAft>
-                <a:spcPts val="600"/>
-              </a:spcAft>
-            </a:pPr>
-            <a:r>
-              <a:rPr lang="en-US" sz="3600" dirty="0">
-                <a:latin typeface="+mj-lt"/>
-              </a:rPr>
-              <a:t>Timeframe</a:t>
-            </a:r>
-          </a:p>
-          <a:p>
-            <a:pPr>
-              <a:lnSpc>
-                <a:spcPct val="90000"/>
-              </a:lnSpc>
-              <a:spcAft>
-                <a:spcPts val="600"/>
-              </a:spcAft>
-            </a:pPr>
-            <a:r>
-              <a:rPr lang="en-US" sz="2400" dirty="0">
-                <a:latin typeface="Segoe UI Semilight" panose="020B0402040204020203" pitchFamily="34" charset="0"/>
-                <a:cs typeface="Segoe UI Semilight" panose="020B0402040204020203" pitchFamily="34" charset="0"/>
-              </a:rPr>
-              <a:t>30 minutes (15 minutes for each team to present and receive feedback) </a:t>
-            </a:r>
-          </a:p>
-          <a:p>
-            <a:pPr>
-              <a:lnSpc>
-                <a:spcPct val="90000"/>
-              </a:lnSpc>
-              <a:spcAft>
-                <a:spcPts val="600"/>
-              </a:spcAft>
-            </a:pPr>
-            <a:endParaRPr lang="en-US" sz="2000" dirty="0">
-              <a:latin typeface="+mj-lt"/>
-            </a:endParaRPr>
-          </a:p>
-          <a:p>
-            <a:pPr>
-              <a:lnSpc>
-                <a:spcPct val="90000"/>
-              </a:lnSpc>
-              <a:spcAft>
-                <a:spcPts val="600"/>
-              </a:spcAft>
-            </a:pPr>
-            <a:r>
-              <a:rPr lang="en-US" sz="3600" dirty="0">
-                <a:latin typeface="+mj-lt"/>
-              </a:rPr>
-              <a:t>Directions</a:t>
-            </a:r>
-          </a:p>
-          <a:p>
-            <a:pPr marL="342900" lvl="0" indent="-342900">
-              <a:buFont typeface="Arial" panose="020B0604020202020204" pitchFamily="34" charset="0"/>
-              <a:buChar char="•"/>
-            </a:pPr>
-            <a:r>
-              <a:rPr lang="en-US" sz="2000" dirty="0">
-                <a:latin typeface="Segoe UI Semilight" panose="020B0402040204020203" pitchFamily="34" charset="0"/>
-                <a:cs typeface="Segoe UI Semilight" panose="020B0402040204020203" pitchFamily="34" charset="0"/>
-              </a:rPr>
-              <a:t>Pair with another table.</a:t>
-            </a:r>
-          </a:p>
-          <a:p>
-            <a:pPr marL="342900" lvl="0" indent="-342900">
-              <a:buFont typeface="Arial" panose="020B0604020202020204" pitchFamily="34" charset="0"/>
-              <a:buChar char="•"/>
-            </a:pPr>
-            <a:r>
-              <a:rPr lang="en-US" sz="2000" dirty="0">
-                <a:latin typeface="Segoe UI Semilight" panose="020B0402040204020203" pitchFamily="34" charset="0"/>
-                <a:cs typeface="Segoe UI Semilight" panose="020B0402040204020203" pitchFamily="34" charset="0"/>
-              </a:rPr>
-              <a:t>One table is the Microsoft team and the other table is the customer.</a:t>
-            </a:r>
-          </a:p>
-          <a:p>
-            <a:pPr marL="342900" lvl="0" indent="-342900">
-              <a:buFont typeface="Arial" panose="020B0604020202020204" pitchFamily="34" charset="0"/>
-              <a:buChar char="•"/>
-            </a:pPr>
-            <a:r>
-              <a:rPr lang="en-US" sz="2000" dirty="0">
-                <a:latin typeface="Segoe UI Semilight" panose="020B0402040204020203" pitchFamily="34" charset="0"/>
-                <a:cs typeface="Segoe UI Semilight" panose="020B0402040204020203" pitchFamily="34" charset="0"/>
-              </a:rPr>
-              <a:t>The Microsoft team presents their proposed solution to the customer.</a:t>
-            </a:r>
-          </a:p>
-          <a:p>
-            <a:pPr marL="342900" lvl="0" indent="-342900">
-              <a:buFont typeface="Arial" panose="020B0604020202020204" pitchFamily="34" charset="0"/>
-              <a:buChar char="•"/>
-            </a:pPr>
-            <a:r>
-              <a:rPr lang="en-US" sz="2000" dirty="0">
-                <a:latin typeface="Segoe UI Semilight" panose="020B0402040204020203" pitchFamily="34" charset="0"/>
-                <a:cs typeface="Segoe UI Semilight" panose="020B0402040204020203" pitchFamily="34" charset="0"/>
-              </a:rPr>
-              <a:t>The customer asks one of the objections from the list of objections in the case study.</a:t>
-            </a:r>
-          </a:p>
-          <a:p>
-            <a:pPr marL="342900" lvl="0" indent="-342900">
-              <a:buFont typeface="Arial" panose="020B0604020202020204" pitchFamily="34" charset="0"/>
-              <a:buChar char="•"/>
-            </a:pPr>
-            <a:r>
-              <a:rPr lang="en-US" sz="2000" dirty="0">
-                <a:latin typeface="Segoe UI Semilight" panose="020B0402040204020203" pitchFamily="34" charset="0"/>
-                <a:cs typeface="Segoe UI Semilight" panose="020B0402040204020203" pitchFamily="34" charset="0"/>
-              </a:rPr>
-              <a:t>The Microsoft team responds to the objection.</a:t>
-            </a:r>
-          </a:p>
-          <a:p>
-            <a:pPr marL="342900" lvl="0" indent="-342900">
-              <a:buFont typeface="Arial" panose="020B0604020202020204" pitchFamily="34" charset="0"/>
-              <a:buChar char="•"/>
-            </a:pPr>
-            <a:r>
-              <a:rPr lang="en-US" sz="2000" dirty="0">
-                <a:latin typeface="Segoe UI Semilight" panose="020B0402040204020203" pitchFamily="34" charset="0"/>
-                <a:cs typeface="Segoe UI Semilight" panose="020B0402040204020203" pitchFamily="34" charset="0"/>
-              </a:rPr>
-              <a:t>The customer team gives feedback to the Microsoft team.</a:t>
-            </a:r>
-            <a:endParaRPr lang="en-US" sz="2000" strike="sngStrike" dirty="0">
-              <a:latin typeface="Segoe UI Semilight" panose="020B0402040204020203" pitchFamily="34" charset="0"/>
-              <a:cs typeface="Segoe UI Semilight" panose="020B0402040204020203" pitchFamily="34" charset="0"/>
-            </a:endParaRPr>
-          </a:p>
-          <a:p>
-            <a:pPr>
-              <a:lnSpc>
-                <a:spcPct val="90000"/>
-              </a:lnSpc>
-              <a:spcAft>
-                <a:spcPts val="600"/>
-              </a:spcAft>
-            </a:pPr>
-            <a:endParaRPr lang="en-US" sz="2400" dirty="0">
-              <a:latin typeface="Segoe UI Semilight" panose="020B0402040204020203" pitchFamily="34" charset="0"/>
-              <a:cs typeface="Segoe UI Semilight" panose="020B0402040204020203" pitchFamily="34" charset="0"/>
-            </a:endParaRPr>
-          </a:p>
-        </p:txBody>
-      </p:sp>
-    </p:spTree>
-    <p:extLst>
-      <p:ext uri="{BB962C8B-B14F-4D97-AF65-F5344CB8AC3E}">
-        <p14:creationId xmlns:p14="http://schemas.microsoft.com/office/powerpoint/2010/main" val="3717261927"/>
-      </p:ext>
-    </p:extLst>
-  </p:cSld>
-  <p:clrMapOvr>
-    <a:masterClrMapping/>
-  </p:clrMapOvr>
-  <mc:AlternateContent xmlns:mc="http://schemas.openxmlformats.org/markup-compatibility/2006" xmlns:p14="http://schemas.microsoft.com/office/powerpoint/2010/main">
-    <mc:Choice Requires="p14">
-      <p:transition p14:dur="0"/>
-    </mc:Choice>
-    <mc:Fallback xmlns="">
-      <p:transition/>
-    </mc:Fallback>
-  </mc:AlternateContent>
-</p:sld>
-</file>
-
 <file path=ppt/slides/slide19.xml><?xml version="1.0" encoding="utf-8"?>
 <p:sld xmlns:a="http://schemas.openxmlformats.org/drawingml/2006/main" xmlns:r="http://schemas.openxmlformats.org/officeDocument/2006/relationships" xmlns:p="http://schemas.openxmlformats.org/presentationml/2006/main">
   <p:cSld>
@@ -18010,7 +17895,7 @@
                 <a:latin typeface="Segoe UI Light" panose="020B0502040204020203" pitchFamily="34" charset="0"/>
                 <a:cs typeface="Segoe UI Light" panose="020B0502040204020203" pitchFamily="34" charset="0"/>
               </a:rPr>
-              <a:t>Wrap-up</a:t>
+              <a:t>Step 3: Present the solution</a:t>
             </a:r>
           </a:p>
         </p:txBody>
@@ -18029,8 +17914,8 @@
         </p:nvSpPr>
         <p:spPr>
           <a:xfrm>
-            <a:off x="340285" y="1741246"/>
-            <a:ext cx="7247965" cy="3006977"/>
+            <a:off x="340285" y="1062166"/>
+            <a:ext cx="10229103" cy="5727722"/>
           </a:xfrm>
           <a:prstGeom prst="rect">
             <a:avLst/>
@@ -18072,8 +17957,11 @@
                 <a:latin typeface="Segoe UI Semilight" panose="020B0402040204020203" pitchFamily="34" charset="0"/>
                 <a:cs typeface="Segoe UI Semilight" panose="020B0402040204020203" pitchFamily="34" charset="0"/>
               </a:rPr>
-              <a:t>Identify the preferred solution for the case study.</a:t>
-            </a:r>
+              <a:t>Present a solution to the target customer in a 15-minute chalk-talk format. </a:t>
+            </a:r>
+            <a:endParaRPr lang="en-US" sz="3600" dirty="0">
+              <a:latin typeface="+mj-lt"/>
+            </a:endParaRPr>
           </a:p>
           <a:p>
             <a:pPr>
@@ -18084,13 +17972,9 @@
                 <a:spcPts val="600"/>
               </a:spcAft>
             </a:pPr>
-            <a:r>
-              <a:rPr lang="en-US" sz="2400" dirty="0">
-                <a:latin typeface="Segoe UI Semilight" panose="020B0402040204020203" pitchFamily="34" charset="0"/>
-                <a:cs typeface="Segoe UI Semilight" panose="020B0402040204020203" pitchFamily="34" charset="0"/>
-              </a:rPr>
-              <a:t>Identify solutions designed by other teams.</a:t>
-            </a:r>
+            <a:endParaRPr lang="en-US" sz="2000" dirty="0">
+              <a:latin typeface="+mj-lt"/>
+            </a:endParaRPr>
           </a:p>
           <a:p>
             <a:pPr>
@@ -18101,7 +17985,12 @@
                 <a:spcPts val="600"/>
               </a:spcAft>
             </a:pPr>
-            <a:endParaRPr lang="en-US" sz="2400" dirty="0"/>
+            <a:r>
+              <a:rPr lang="en-US" sz="3600" dirty="0">
+                <a:latin typeface="+mj-lt"/>
+              </a:rPr>
+              <a:t>Timeframe</a:t>
+            </a:r>
           </a:p>
           <a:p>
             <a:pPr>
@@ -18113,10 +18002,11 @@
               </a:spcAft>
             </a:pPr>
             <a:r>
-              <a:rPr lang="en-US" sz="3600" dirty="0">
-                <a:latin typeface="+mj-lt"/>
+              <a:rPr lang="en-US" sz="2400" dirty="0">
+                <a:latin typeface="Segoe UI Semilight" panose="020B0402040204020203" pitchFamily="34" charset="0"/>
+                <a:cs typeface="Segoe UI Semilight" panose="020B0402040204020203" pitchFamily="34" charset="0"/>
               </a:rPr>
-              <a:t>Timeframe</a:t>
+              <a:t>30 minutes (15 minutes for each team to present and receive feedback) </a:t>
             </a:r>
           </a:p>
           <a:p>
@@ -18128,20 +18018,128 @@
                 <a:spcPts val="600"/>
               </a:spcAft>
             </a:pPr>
-            <a:r>
-              <a:rPr lang="en-US" sz="2400" dirty="0">
+            <a:endParaRPr lang="en-US" sz="2000" dirty="0">
+              <a:latin typeface="+mj-lt"/>
+            </a:endParaRPr>
+          </a:p>
+          <a:p>
+            <a:pPr>
+              <a:lnSpc>
+                <a:spcPct val="90000"/>
+              </a:lnSpc>
+              <a:spcAft>
+                <a:spcPts val="600"/>
+              </a:spcAft>
+            </a:pPr>
+            <a:r>
+              <a:rPr lang="en-US" sz="3600" dirty="0">
+                <a:latin typeface="+mj-lt"/>
+              </a:rPr>
+              <a:t>Directions</a:t>
+            </a:r>
+          </a:p>
+          <a:p>
+            <a:pPr marL="342900" lvl="0" indent="-342900">
+              <a:buFont typeface="Arial" panose="020B0604020202020204" pitchFamily="34" charset="0"/>
+              <a:buChar char="•"/>
+            </a:pPr>
+            <a:r>
+              <a:rPr lang="en-US" sz="2000" dirty="0">
                 <a:latin typeface="Segoe UI Semilight" panose="020B0402040204020203" pitchFamily="34" charset="0"/>
                 <a:cs typeface="Segoe UI Semilight" panose="020B0402040204020203" pitchFamily="34" charset="0"/>
               </a:rPr>
-              <a:t>15 minutes</a:t>
-            </a:r>
+              <a:t>Pair with another table.</a:t>
+            </a:r>
+          </a:p>
+          <a:p>
+            <a:pPr marL="342900" lvl="0" indent="-342900">
+              <a:buFont typeface="Arial" panose="020B0604020202020204" pitchFamily="34" charset="0"/>
+              <a:buChar char="•"/>
+            </a:pPr>
+            <a:r>
+              <a:rPr lang="en-US" sz="2000" dirty="0">
+                <a:latin typeface="Segoe UI Semilight" panose="020B0402040204020203" pitchFamily="34" charset="0"/>
+                <a:cs typeface="Segoe UI Semilight" panose="020B0402040204020203" pitchFamily="34" charset="0"/>
+              </a:rPr>
+              <a:t>One table is the Microsoft team and the other table is the customer.</a:t>
+            </a:r>
+          </a:p>
+          <a:p>
+            <a:pPr marL="342900" lvl="0" indent="-342900">
+              <a:buFont typeface="Arial" panose="020B0604020202020204" pitchFamily="34" charset="0"/>
+              <a:buChar char="•"/>
+            </a:pPr>
+            <a:r>
+              <a:rPr lang="en-US" sz="2000" dirty="0">
+                <a:latin typeface="Segoe UI Semilight" panose="020B0402040204020203" pitchFamily="34" charset="0"/>
+                <a:cs typeface="Segoe UI Semilight" panose="020B0402040204020203" pitchFamily="34" charset="0"/>
+              </a:rPr>
+              <a:t>The Microsoft team presents their proposed solution to the customer.</a:t>
+            </a:r>
+          </a:p>
+          <a:p>
+            <a:pPr marL="342900" lvl="0" indent="-342900">
+              <a:buFont typeface="Arial" panose="020B0604020202020204" pitchFamily="34" charset="0"/>
+              <a:buChar char="•"/>
+            </a:pPr>
+            <a:r>
+              <a:rPr lang="en-US" sz="2000" dirty="0">
+                <a:latin typeface="Segoe UI Semilight" panose="020B0402040204020203" pitchFamily="34" charset="0"/>
+                <a:cs typeface="Segoe UI Semilight" panose="020B0402040204020203" pitchFamily="34" charset="0"/>
+              </a:rPr>
+              <a:t>The customer asks one of the objections from the list of objections in the case study.</a:t>
+            </a:r>
+          </a:p>
+          <a:p>
+            <a:pPr marL="342900" lvl="0" indent="-342900">
+              <a:buFont typeface="Arial" panose="020B0604020202020204" pitchFamily="34" charset="0"/>
+              <a:buChar char="•"/>
+            </a:pPr>
+            <a:r>
+              <a:rPr lang="en-US" sz="2000" dirty="0">
+                <a:latin typeface="Segoe UI Semilight" panose="020B0402040204020203" pitchFamily="34" charset="0"/>
+                <a:cs typeface="Segoe UI Semilight" panose="020B0402040204020203" pitchFamily="34" charset="0"/>
+              </a:rPr>
+              <a:t>The Microsoft team responds to the objection.</a:t>
+            </a:r>
+          </a:p>
+          <a:p>
+            <a:pPr marL="342900" lvl="0" indent="-342900">
+              <a:buFont typeface="Arial" panose="020B0604020202020204" pitchFamily="34" charset="0"/>
+              <a:buChar char="•"/>
+            </a:pPr>
+            <a:r>
+              <a:rPr lang="en-US" sz="2000" dirty="0">
+                <a:latin typeface="Segoe UI Semilight" panose="020B0402040204020203" pitchFamily="34" charset="0"/>
+                <a:cs typeface="Segoe UI Semilight" panose="020B0402040204020203" pitchFamily="34" charset="0"/>
+              </a:rPr>
+              <a:t>The customer team gives feedback to the Microsoft team.</a:t>
+            </a:r>
+            <a:endParaRPr lang="en-US" sz="2000" strike="sngStrike" dirty="0">
+              <a:latin typeface="Segoe UI Semilight" panose="020B0402040204020203" pitchFamily="34" charset="0"/>
+              <a:cs typeface="Segoe UI Semilight" panose="020B0402040204020203" pitchFamily="34" charset="0"/>
+            </a:endParaRPr>
+          </a:p>
+          <a:p>
+            <a:pPr>
+              <a:lnSpc>
+                <a:spcPct val="90000"/>
+              </a:lnSpc>
+              <a:spcAft>
+                <a:spcPts val="600"/>
+              </a:spcAft>
+            </a:pPr>
+            <a:endParaRPr lang="en-US" sz="2400" dirty="0">
+              <a:latin typeface="Segoe UI Semilight" panose="020B0402040204020203" pitchFamily="34" charset="0"/>
+              <a:cs typeface="Segoe UI Semilight" panose="020B0402040204020203" pitchFamily="34" charset="0"/>
+            </a:endParaRPr>
           </a:p>
         </p:txBody>
       </p:sp>
     </p:spTree>
     <p:extLst>
       <p:ext uri="{BB962C8B-B14F-4D97-AF65-F5344CB8AC3E}">
-        <p14:creationId xmlns:p14="http://schemas.microsoft.com/office/powerpoint/2010/main" val="4239998353"/>
+        <p14:creationId xmlns:p14="http://schemas.microsoft.com/office/powerpoint/2010/main" val="3717261927"/>
       </p:ext>
     </p:extLst>
   </p:cSld>
@@ -18286,6 +18284,197 @@
         </p:nvSpPr>
         <p:spPr/>
         <p:txBody>
+          <a:bodyPr>
+            <a:normAutofit/>
+          </a:bodyPr>
+          <a:lstStyle/>
+          <a:p>
+            <a:r>
+              <a:rPr lang="en-US" sz="4400" dirty="0">
+                <a:solidFill>
+                  <a:schemeClr val="tx1"/>
+                </a:solidFill>
+                <a:latin typeface="Segoe UI Light" panose="020B0502040204020203" pitchFamily="34" charset="0"/>
+                <a:cs typeface="Segoe UI Light" panose="020B0502040204020203" pitchFamily="34" charset="0"/>
+              </a:rPr>
+              <a:t>Wrap-up</a:t>
+            </a:r>
+          </a:p>
+        </p:txBody>
+      </p:sp>
+      <p:sp>
+        <p:nvSpPr>
+          <p:cNvPr id="9" name="TextBox 8">
+            <a:extLst>
+              <a:ext uri="{FF2B5EF4-FFF2-40B4-BE49-F238E27FC236}">
+                <a16:creationId xmlns:a16="http://schemas.microsoft.com/office/drawing/2014/main" id="{0F86F9F9-39B5-4CE6-AF48-9ADAE40EA728}"/>
+              </a:ext>
+            </a:extLst>
+          </p:cNvPr>
+          <p:cNvSpPr txBox="1"/>
+          <p:nvPr/>
+        </p:nvSpPr>
+        <p:spPr>
+          <a:xfrm>
+            <a:off x="340285" y="1741246"/>
+            <a:ext cx="7247965" cy="3006977"/>
+          </a:xfrm>
+          <a:prstGeom prst="rect">
+            <a:avLst/>
+          </a:prstGeom>
+          <a:noFill/>
+        </p:spPr>
+        <p:txBody>
+          <a:bodyPr wrap="square" lIns="182880" tIns="146304" rIns="182880" bIns="146304" rtlCol="0">
+            <a:spAutoFit/>
+          </a:bodyPr>
+          <a:lstStyle/>
+          <a:p>
+            <a:pPr>
+              <a:lnSpc>
+                <a:spcPct val="90000"/>
+              </a:lnSpc>
+              <a:spcAft>
+                <a:spcPts val="600"/>
+              </a:spcAft>
+            </a:pPr>
+            <a:r>
+              <a:rPr lang="en-US" sz="3600" dirty="0">
+                <a:latin typeface="+mj-lt"/>
+              </a:rPr>
+              <a:t>Outcome</a:t>
+            </a:r>
+          </a:p>
+          <a:p>
+            <a:pPr>
+              <a:lnSpc>
+                <a:spcPct val="90000"/>
+              </a:lnSpc>
+              <a:spcAft>
+                <a:spcPts val="600"/>
+              </a:spcAft>
+            </a:pPr>
+            <a:r>
+              <a:rPr lang="en-US" sz="2400" dirty="0">
+                <a:latin typeface="Segoe UI Semilight" panose="020B0402040204020203" pitchFamily="34" charset="0"/>
+                <a:cs typeface="Segoe UI Semilight" panose="020B0402040204020203" pitchFamily="34" charset="0"/>
+              </a:rPr>
+              <a:t>Identify the preferred solution for the case study.</a:t>
+            </a:r>
+          </a:p>
+          <a:p>
+            <a:pPr>
+              <a:lnSpc>
+                <a:spcPct val="90000"/>
+              </a:lnSpc>
+              <a:spcAft>
+                <a:spcPts val="600"/>
+              </a:spcAft>
+            </a:pPr>
+            <a:r>
+              <a:rPr lang="en-US" sz="2400" dirty="0">
+                <a:latin typeface="Segoe UI Semilight" panose="020B0402040204020203" pitchFamily="34" charset="0"/>
+                <a:cs typeface="Segoe UI Semilight" panose="020B0402040204020203" pitchFamily="34" charset="0"/>
+              </a:rPr>
+              <a:t>Identify solutions designed by other teams.</a:t>
+            </a:r>
+          </a:p>
+          <a:p>
+            <a:pPr>
+              <a:lnSpc>
+                <a:spcPct val="90000"/>
+              </a:lnSpc>
+              <a:spcAft>
+                <a:spcPts val="600"/>
+              </a:spcAft>
+            </a:pPr>
+            <a:endParaRPr lang="en-US" sz="2400" dirty="0"/>
+          </a:p>
+          <a:p>
+            <a:pPr>
+              <a:lnSpc>
+                <a:spcPct val="90000"/>
+              </a:lnSpc>
+              <a:spcAft>
+                <a:spcPts val="600"/>
+              </a:spcAft>
+            </a:pPr>
+            <a:r>
+              <a:rPr lang="en-US" sz="3600" dirty="0">
+                <a:latin typeface="+mj-lt"/>
+              </a:rPr>
+              <a:t>Timeframe</a:t>
+            </a:r>
+          </a:p>
+          <a:p>
+            <a:pPr>
+              <a:lnSpc>
+                <a:spcPct val="90000"/>
+              </a:lnSpc>
+              <a:spcAft>
+                <a:spcPts val="600"/>
+              </a:spcAft>
+            </a:pPr>
+            <a:r>
+              <a:rPr lang="en-US" sz="2400" dirty="0">
+                <a:latin typeface="Segoe UI Semilight" panose="020B0402040204020203" pitchFamily="34" charset="0"/>
+                <a:cs typeface="Segoe UI Semilight" panose="020B0402040204020203" pitchFamily="34" charset="0"/>
+              </a:rPr>
+              <a:t>15 minutes</a:t>
+            </a:r>
+          </a:p>
+        </p:txBody>
+      </p:sp>
+    </p:spTree>
+    <p:extLst>
+      <p:ext uri="{BB962C8B-B14F-4D97-AF65-F5344CB8AC3E}">
+        <p14:creationId xmlns:p14="http://schemas.microsoft.com/office/powerpoint/2010/main" val="4239998353"/>
+      </p:ext>
+    </p:extLst>
+  </p:cSld>
+  <p:clrMapOvr>
+    <a:masterClrMapping/>
+  </p:clrMapOvr>
+  <mc:AlternateContent xmlns:mc="http://schemas.openxmlformats.org/markup-compatibility/2006" xmlns:p14="http://schemas.microsoft.com/office/powerpoint/2010/main">
+    <mc:Choice Requires="p14">
+      <p:transition p14:dur="0"/>
+    </mc:Choice>
+    <mc:Fallback xmlns="">
+      <p:transition/>
+    </mc:Fallback>
+  </mc:AlternateContent>
+</p:sld>
+</file>
+
+<file path=ppt/slides/slide21.xml><?xml version="1.0" encoding="utf-8"?>
+<p:sld xmlns:a="http://schemas.openxmlformats.org/drawingml/2006/main" xmlns:r="http://schemas.openxmlformats.org/officeDocument/2006/relationships" xmlns:p="http://schemas.openxmlformats.org/presentationml/2006/main">
+  <p:cSld>
+    <p:spTree>
+      <p:nvGrpSpPr>
+        <p:cNvPr id="1" name=""/>
+        <p:cNvGrpSpPr/>
+        <p:nvPr/>
+      </p:nvGrpSpPr>
+      <p:grpSpPr>
+        <a:xfrm>
+          <a:off x="0" y="0"/>
+          <a:ext cx="0" cy="0"/>
+          <a:chOff x="0" y="0"/>
+          <a:chExt cx="0" cy="0"/>
+        </a:xfrm>
+      </p:grpSpPr>
+      <p:sp>
+        <p:nvSpPr>
+          <p:cNvPr id="2" name="Title 1"/>
+          <p:cNvSpPr>
+            <a:spLocks noGrp="1"/>
+          </p:cNvSpPr>
+          <p:nvPr>
+            <p:ph type="title"/>
+          </p:nvPr>
+        </p:nvSpPr>
+        <p:spPr/>
+        <p:txBody>
           <a:bodyPr/>
           <a:lstStyle/>
           <a:p>
@@ -18342,7 +18531,7 @@
 </p:sld>
 </file>
 
-<file path=ppt/slides/slide21.xml><?xml version="1.0" encoding="utf-8"?>
+<file path=ppt/slides/slide22.xml><?xml version="1.0" encoding="utf-8"?>
 <p:sld xmlns:a="http://schemas.openxmlformats.org/drawingml/2006/main" xmlns:r="http://schemas.openxmlformats.org/officeDocument/2006/relationships" xmlns:p="http://schemas.openxmlformats.org/presentationml/2006/main">
   <p:cSld>
     <p:bg>
@@ -18467,7 +18656,7 @@
 </p:sld>
 </file>
 
-<file path=ppt/slides/slide22.xml><?xml version="1.0" encoding="utf-8"?>
+<file path=ppt/slides/slide23.xml><?xml version="1.0" encoding="utf-8"?>
 <p:sld xmlns:a="http://schemas.openxmlformats.org/drawingml/2006/main" xmlns:r="http://schemas.openxmlformats.org/officeDocument/2006/relationships" xmlns:p="http://schemas.openxmlformats.org/presentationml/2006/main">
   <p:cSld>
     <p:spTree>
@@ -18896,7 +19085,7 @@
 </p:sld>
 </file>
 
-<file path=ppt/slides/slide23.xml><?xml version="1.0" encoding="utf-8"?>
+<file path=ppt/slides/slide24.xml><?xml version="1.0" encoding="utf-8"?>
 <p:sld xmlns:a="http://schemas.openxmlformats.org/drawingml/2006/main" xmlns:r="http://schemas.openxmlformats.org/officeDocument/2006/relationships" xmlns:p="http://schemas.openxmlformats.org/presentationml/2006/main">
   <p:cSld>
     <p:spTree>
@@ -18932,7 +19121,7 @@
         <p:spPr>
           <a:xfrm>
             <a:off x="269239" y="1189177"/>
-            <a:ext cx="11653523" cy="5601533"/>
+            <a:ext cx="11653523" cy="6275564"/>
           </a:xfrm>
         </p:spPr>
         <p:txBody>
@@ -18940,71 +19129,98 @@
           <a:lstStyle/>
           <a:p>
             <a:r>
-              <a:rPr lang="en-US" sz="2800" dirty="0"/>
+              <a:rPr lang="en-US" sz="2400" dirty="0"/>
               <a:t>ISO 27001 and HIPAA requirements</a:t>
             </a:r>
           </a:p>
           <a:p>
             <a:pPr lvl="1"/>
             <a:r>
-              <a:rPr lang="en-US" sz="2000" dirty="0"/>
+              <a:rPr lang="en-US" sz="1800" dirty="0"/>
               <a:t>Azure Security Center Standard Tier and Azure Policy initiatives for HIPAA and ISO 27001 controls</a:t>
             </a:r>
           </a:p>
           <a:p>
             <a:r>
-              <a:rPr lang="en-US" sz="2800" dirty="0"/>
+              <a:rPr lang="en-US" sz="2400" dirty="0"/>
+              <a:t>California Personal Protection Act (similar to GDPR)</a:t>
+            </a:r>
+          </a:p>
+          <a:p>
+            <a:r>
+              <a:rPr lang="en-US" sz="2400" dirty="0"/>
               <a:t>Monitoring and alerting</a:t>
             </a:r>
           </a:p>
           <a:p>
             <a:pPr lvl="1"/>
             <a:r>
-              <a:rPr lang="en-US" sz="2000" dirty="0"/>
-              <a:t>Azure Monitor agents installed on all Azure and on-premises virtual machines</a:t>
-            </a:r>
-          </a:p>
-          <a:p>
-            <a:r>
-              <a:rPr lang="en-US" sz="2800" dirty="0"/>
+              <a:rPr lang="en-US" sz="1800" dirty="0"/>
+              <a:t>Azure Monitor agents installed on all Azure and on-premises virtual machines. </a:t>
+            </a:r>
+          </a:p>
+          <a:p>
+            <a:pPr lvl="1"/>
+            <a:r>
+              <a:rPr lang="en-US" sz="1800" dirty="0"/>
+              <a:t>ATP should be used to monitor threats.  </a:t>
+            </a:r>
+          </a:p>
+          <a:p>
+            <a:pPr lvl="1"/>
+            <a:r>
+              <a:rPr lang="en-US" sz="1800" dirty="0"/>
+              <a:t>Azure Sentinel should be used for incident response and investigation</a:t>
+            </a:r>
+          </a:p>
+          <a:p>
+            <a:r>
+              <a:rPr lang="en-US" sz="2400" dirty="0"/>
               <a:t>Data security and encryption</a:t>
             </a:r>
           </a:p>
           <a:p>
             <a:pPr lvl="1"/>
             <a:r>
-              <a:rPr lang="en-US" sz="2000" dirty="0"/>
+              <a:rPr lang="en-US" sz="1800" dirty="0"/>
+              <a:t>Cloud App Security for managing authorized applications. </a:t>
+            </a:r>
+          </a:p>
+          <a:p>
+            <a:pPr lvl="1"/>
+            <a:r>
+              <a:rPr lang="en-US" sz="1800" dirty="0"/>
               <a:t>All data in-transit will be sent across an encrypted SSL connection. Data at-rest will be encrypted in Azure file storage</a:t>
             </a:r>
           </a:p>
           <a:p>
             <a:r>
-              <a:rPr lang="en-US" sz="2800" dirty="0"/>
+              <a:rPr lang="en-US" sz="2400" dirty="0"/>
               <a:t>Identity and access management</a:t>
             </a:r>
           </a:p>
           <a:p>
             <a:pPr lvl="1"/>
             <a:r>
-              <a:rPr lang="en-US" sz="2000" dirty="0"/>
+              <a:rPr lang="en-US" sz="1800" dirty="0"/>
               <a:t>Azure Active Directory service with Azure AD Connect hash synchronization to on-premises Active Directory domain</a:t>
             </a:r>
           </a:p>
           <a:p>
             <a:r>
-              <a:rPr lang="en-US" sz="2800" dirty="0"/>
+              <a:rPr lang="en-US" sz="2400" dirty="0"/>
               <a:t>Secure and Centralize file storage</a:t>
             </a:r>
           </a:p>
           <a:p>
             <a:pPr lvl="1"/>
             <a:r>
-              <a:rPr lang="en-US" sz="2000" dirty="0"/>
+              <a:rPr lang="en-US" sz="1800" dirty="0"/>
               <a:t>Azure files will be used as the centralized file storage and share.  File access will be controlled through Azure Active Directory roles</a:t>
             </a:r>
           </a:p>
           <a:p>
-            <a:endParaRPr lang="en-US" sz="3600" dirty="0"/>
+            <a:endParaRPr lang="en-US" sz="3200" dirty="0"/>
           </a:p>
         </p:txBody>
       </p:sp>
@@ -19052,7 +19268,7 @@
 </p:sld>
 </file>
 
-<file path=ppt/slides/slide24.xml><?xml version="1.0" encoding="utf-8"?>
+<file path=ppt/slides/slide25.xml><?xml version="1.0" encoding="utf-8"?>
 <p:sld xmlns:a="http://schemas.openxmlformats.org/drawingml/2006/main" xmlns:r="http://schemas.openxmlformats.org/officeDocument/2006/relationships" xmlns:p="http://schemas.openxmlformats.org/presentationml/2006/main">
   <p:cSld>
     <p:spTree>
@@ -19081,8 +19297,8 @@
         </p:nvSpPr>
         <p:spPr>
           <a:xfrm>
-            <a:off x="266920" y="993304"/>
-            <a:ext cx="10956251" cy="6340197"/>
+            <a:off x="266920" y="967154"/>
+            <a:ext cx="10956251" cy="6392942"/>
           </a:xfrm>
         </p:spPr>
         <p:txBody>
@@ -19090,96 +19306,121 @@
           <a:lstStyle/>
           <a:p>
             <a:r>
-              <a:rPr lang="en-US" sz="3200" dirty="0"/>
+              <a:rPr lang="en-US" sz="2800" dirty="0"/>
               <a:t>Regions and Resource Groups</a:t>
             </a:r>
           </a:p>
           <a:p>
             <a:pPr lvl="1"/>
             <a:r>
-              <a:rPr lang="en-US" sz="2000" dirty="0"/>
-              <a:t>Central US or North Central US to decrease latency to Detroit and/or Dallas</a:t>
+              <a:rPr lang="en-US" sz="1800" dirty="0"/>
+              <a:t>West US and East US regions should be peered in Azure to decrease latency to California and Northern Virginia</a:t>
             </a:r>
           </a:p>
           <a:p>
             <a:pPr lvl="1"/>
             <a:r>
-              <a:rPr lang="en-US" sz="2000" dirty="0"/>
+              <a:rPr lang="en-US" sz="1800" dirty="0"/>
               <a:t>Single resource group for the Window Virtual Desktop infrastructure</a:t>
             </a:r>
           </a:p>
           <a:p>
             <a:r>
-              <a:rPr lang="en-US" sz="3200" dirty="0"/>
+              <a:rPr lang="en-US" sz="2800" dirty="0"/>
               <a:t>Virtual Network</a:t>
             </a:r>
           </a:p>
           <a:p>
             <a:pPr lvl="1"/>
             <a:r>
-              <a:rPr lang="en-US" sz="1800" dirty="0"/>
+              <a:rPr lang="en-US" sz="1600" dirty="0"/>
               <a:t>Three peered VNETs: Virtual desktop host pool network, VPN to on-premises network, and Bastion host network</a:t>
             </a:r>
           </a:p>
           <a:p>
             <a:pPr lvl="1"/>
             <a:r>
-              <a:rPr lang="en-US" sz="1800" dirty="0"/>
+              <a:rPr lang="en-US" sz="1600" dirty="0"/>
               <a:t>Load balancer will be used in front of the host pool virtual machines to decrease the public IP attack surface</a:t>
             </a:r>
           </a:p>
           <a:p>
             <a:r>
-              <a:rPr lang="en-US" sz="3200" dirty="0"/>
+              <a:rPr lang="en-US" sz="2800" dirty="0"/>
               <a:t>Azure to on-premises network</a:t>
             </a:r>
           </a:p>
           <a:p>
             <a:pPr lvl="1"/>
             <a:r>
-              <a:rPr lang="en-US" sz="1800" dirty="0"/>
+              <a:rPr lang="en-US" sz="1600" dirty="0"/>
               <a:t>Minimum requirement is Azure Firewall with Site-to-Site VPN</a:t>
             </a:r>
           </a:p>
           <a:p>
             <a:pPr lvl="1"/>
             <a:r>
-              <a:rPr lang="en-US" sz="1800" dirty="0"/>
-              <a:t>Ideal solution would be ExpressRoute to one or both data centers</a:t>
-            </a:r>
-          </a:p>
-          <a:p>
-            <a:r>
-              <a:rPr lang="en-US" sz="3200" dirty="0"/>
+              <a:rPr lang="en-US" sz="1600" dirty="0"/>
+              <a:t>Ideal solution would be ExpressRoute to headquarters in CA and Northern VA.</a:t>
+            </a:r>
+          </a:p>
+          <a:p>
+            <a:r>
+              <a:rPr lang="en-US" sz="2800" dirty="0"/>
               <a:t>Monitoring and alerting</a:t>
             </a:r>
           </a:p>
           <a:p>
             <a:pPr lvl="1"/>
             <a:r>
-              <a:rPr lang="en-US" sz="1800" dirty="0"/>
-              <a:t>Azure Monitor, Azure Log Analytics, and Advance Threat Protection</a:t>
+              <a:rPr lang="en-US" sz="1600" dirty="0"/>
+              <a:t>Azure Monitor</a:t>
             </a:r>
           </a:p>
           <a:p>
             <a:pPr lvl="1"/>
             <a:r>
-              <a:rPr lang="en-US" sz="1800" dirty="0"/>
+              <a:rPr lang="en-US" sz="1600" dirty="0"/>
+              <a:t>Azure Log Analytics</a:t>
+            </a:r>
+          </a:p>
+          <a:p>
+            <a:pPr lvl="1"/>
+            <a:r>
+              <a:rPr lang="en-US" sz="1600" dirty="0"/>
+              <a:t>Advance Threat Protection (ATP)</a:t>
+            </a:r>
+          </a:p>
+          <a:p>
+            <a:pPr lvl="1"/>
+            <a:r>
+              <a:rPr lang="en-US" sz="1600" dirty="0"/>
               <a:t>Network Watcher</a:t>
             </a:r>
           </a:p>
           <a:p>
             <a:pPr lvl="1"/>
             <a:r>
-              <a:rPr lang="en-US" sz="1800" dirty="0"/>
+              <a:rPr lang="en-US" sz="1600" dirty="0"/>
+              <a:t>Service Map</a:t>
+            </a:r>
+          </a:p>
+          <a:p>
+            <a:pPr lvl="1"/>
+            <a:r>
+              <a:rPr lang="en-US" sz="1600" dirty="0"/>
               <a:t>Azure Security Center</a:t>
             </a:r>
           </a:p>
           <a:p>
-            <a:endParaRPr lang="en-US" sz="1800" dirty="0"/>
-          </a:p>
-          <a:p>
-            <a:endParaRPr lang="en-US" sz="2400" dirty="0"/>
+            <a:pPr lvl="1"/>
+            <a:r>
+              <a:rPr lang="en-US" sz="1600" dirty="0"/>
+              <a:t>Azure Sentinel</a:t>
+            </a:r>
+          </a:p>
+          <a:p>
+            <a:endParaRPr lang="en-US" sz="2000" dirty="0"/>
           </a:p>
         </p:txBody>
       </p:sp>
@@ -19209,152 +19450,6 @@
     <p:extLst>
       <p:ext uri="{BB962C8B-B14F-4D97-AF65-F5344CB8AC3E}">
         <p14:creationId xmlns:p14="http://schemas.microsoft.com/office/powerpoint/2010/main" val="122569210"/>
-      </p:ext>
-    </p:extLst>
-  </p:cSld>
-  <p:clrMapOvr>
-    <a:masterClrMapping/>
-  </p:clrMapOvr>
-  <mc:AlternateContent xmlns:mc="http://schemas.openxmlformats.org/markup-compatibility/2006" xmlns:p14="http://schemas.microsoft.com/office/powerpoint/2010/main">
-    <mc:Choice Requires="p14">
-      <p:transition p14:dur="0"/>
-    </mc:Choice>
-    <mc:Fallback xmlns="">
-      <p:transition/>
-    </mc:Fallback>
-  </mc:AlternateContent>
-</p:sld>
-</file>
-
-<file path=ppt/slides/slide25.xml><?xml version="1.0" encoding="utf-8"?>
-<p:sld xmlns:a="http://schemas.openxmlformats.org/drawingml/2006/main" xmlns:r="http://schemas.openxmlformats.org/officeDocument/2006/relationships" xmlns:p="http://schemas.openxmlformats.org/presentationml/2006/main">
-  <p:cSld>
-    <p:spTree>
-      <p:nvGrpSpPr>
-        <p:cNvPr id="1" name=""/>
-        <p:cNvGrpSpPr/>
-        <p:nvPr/>
-      </p:nvGrpSpPr>
-      <p:grpSpPr>
-        <a:xfrm>
-          <a:off x="0" y="0"/>
-          <a:ext cx="0" cy="0"/>
-          <a:chOff x="0" y="0"/>
-          <a:chExt cx="0" cy="0"/>
-        </a:xfrm>
-      </p:grpSpPr>
-      <p:sp>
-        <p:nvSpPr>
-          <p:cNvPr id="18" name="Content Placeholder 2">
-            <a:extLst>
-              <a:ext uri="{FF2B5EF4-FFF2-40B4-BE49-F238E27FC236}">
-                <a16:creationId xmlns:a16="http://schemas.microsoft.com/office/drawing/2014/main" id="{0EBB5226-FC08-476B-82AB-FFBEA7FE4620}"/>
-              </a:ext>
-            </a:extLst>
-          </p:cNvPr>
-          <p:cNvSpPr>
-            <a:spLocks noGrp="1"/>
-          </p:cNvSpPr>
-          <p:nvPr>
-            <p:ph type="body" sz="quarter" idx="10"/>
-          </p:nvPr>
-        </p:nvSpPr>
-        <p:spPr>
-          <a:xfrm>
-            <a:off x="269239" y="1189177"/>
-            <a:ext cx="10202818" cy="3991862"/>
-          </a:xfrm>
-        </p:spPr>
-        <p:txBody>
-          <a:bodyPr/>
-          <a:lstStyle/>
-          <a:p>
-            <a:r>
-              <a:rPr lang="en-US" sz="2800" dirty="0"/>
-              <a:t>New Windows 10 multi-user workspace with Office 365 </a:t>
-            </a:r>
-            <a:r>
-              <a:rPr lang="en-US" sz="2800" dirty="0" err="1"/>
-              <a:t>ProPlus</a:t>
-            </a:r>
-            <a:endParaRPr lang="en-US" sz="2800" dirty="0"/>
-          </a:p>
-          <a:p>
-            <a:r>
-              <a:rPr lang="en-US" sz="2800" dirty="0"/>
-              <a:t>VHD image of existing workspace with current applications</a:t>
-            </a:r>
-          </a:p>
-          <a:p>
-            <a:r>
-              <a:rPr lang="en-US" sz="2800" dirty="0"/>
-              <a:t>Application delivery through current Citrix app marketplace</a:t>
-            </a:r>
-          </a:p>
-          <a:p>
-            <a:r>
-              <a:rPr lang="en-US" sz="3600" dirty="0"/>
-              <a:t>User connection</a:t>
-            </a:r>
-          </a:p>
-          <a:p>
-            <a:r>
-              <a:rPr lang="en-US" sz="2800" dirty="0"/>
-              <a:t>Any of these are viable options</a:t>
-            </a:r>
-          </a:p>
-          <a:p>
-            <a:pPr lvl="1"/>
-            <a:r>
-              <a:rPr lang="en-US" sz="1800" dirty="0"/>
-              <a:t>Remote Desktop Client</a:t>
-            </a:r>
-          </a:p>
-          <a:p>
-            <a:pPr lvl="1"/>
-            <a:r>
-              <a:rPr lang="en-US" sz="1800" dirty="0"/>
-              <a:t>Web Client</a:t>
-            </a:r>
-          </a:p>
-          <a:p>
-            <a:pPr lvl="1"/>
-            <a:r>
-              <a:rPr lang="en-US" sz="1800" dirty="0"/>
-              <a:t>Apple iOS or Android Remote Desktop app</a:t>
-            </a:r>
-          </a:p>
-          <a:p>
-            <a:endParaRPr lang="en-US" sz="2800" dirty="0"/>
-          </a:p>
-        </p:txBody>
-      </p:sp>
-      <p:sp>
-        <p:nvSpPr>
-          <p:cNvPr id="2" name="Title 1"/>
-          <p:cNvSpPr>
-            <a:spLocks noGrp="1"/>
-          </p:cNvSpPr>
-          <p:nvPr>
-            <p:ph type="title"/>
-          </p:nvPr>
-        </p:nvSpPr>
-        <p:spPr/>
-        <p:txBody>
-          <a:bodyPr/>
-          <a:lstStyle/>
-          <a:p>
-            <a:r>
-              <a:rPr lang="en-US" sz="4800" dirty="0"/>
-              <a:t>Windows Desktop image</a:t>
-            </a:r>
-          </a:p>
-        </p:txBody>
-      </p:sp>
-    </p:spTree>
-    <p:extLst>
-      <p:ext uri="{BB962C8B-B14F-4D97-AF65-F5344CB8AC3E}">
-        <p14:creationId xmlns:p14="http://schemas.microsoft.com/office/powerpoint/2010/main" val="2799319501"/>
       </p:ext>
     </p:extLst>
   </p:cSld>
@@ -19408,7 +19503,7 @@
         <p:spPr>
           <a:xfrm>
             <a:off x="269239" y="1189177"/>
-            <a:ext cx="9691190" cy="2725811"/>
+            <a:ext cx="10202818" cy="5327612"/>
           </a:xfrm>
         </p:spPr>
         <p:txBody>
@@ -19417,39 +19512,70 @@
           <a:p>
             <a:r>
               <a:rPr lang="en-US" sz="2800" dirty="0"/>
-              <a:t>Define the number of con-current sessions – </a:t>
+              <a:t>New Windows 10 multi-user workspace with Office 365 </a:t>
+            </a:r>
+            <a:r>
+              <a:rPr lang="en-US" sz="2800" dirty="0" err="1"/>
+              <a:t>ProPlus</a:t>
+            </a:r>
+            <a:endParaRPr lang="en-US" sz="2800" dirty="0"/>
+          </a:p>
+          <a:p>
+            <a:r>
+              <a:rPr lang="en-US" sz="2800" dirty="0"/>
+              <a:t>Application delivery through current Citrix app marketplace</a:t>
+            </a:r>
+          </a:p>
+          <a:p>
+            <a:r>
+              <a:rPr lang="en-US" sz="2800" dirty="0"/>
+              <a:t>Authorized applications managed through Cloud App Security</a:t>
+            </a:r>
+          </a:p>
+          <a:p>
+            <a:r>
+              <a:rPr lang="en-US" sz="2800" dirty="0"/>
+              <a:t>Managed image through WVD with creating a VHD image as an alternative option</a:t>
+            </a:r>
+          </a:p>
+          <a:p>
+            <a:endParaRPr lang="en-US" sz="2800" dirty="0"/>
+          </a:p>
+          <a:p>
+            <a:r>
+              <a:rPr lang="en-US" sz="3600" dirty="0"/>
+              <a:t>User connection</a:t>
+            </a:r>
+          </a:p>
+          <a:p>
+            <a:r>
+              <a:rPr lang="en-US" sz="2800" dirty="0"/>
+              <a:t>Any of these are viable options</a:t>
             </a:r>
           </a:p>
           <a:p>
             <a:pPr lvl="1"/>
             <a:r>
-              <a:rPr lang="en-US" sz="2000" dirty="0"/>
-              <a:t>500 users</a:t>
-            </a:r>
-            <a:endParaRPr lang="en-US" sz="1232" dirty="0"/>
-          </a:p>
-          <a:p>
-            <a:r>
-              <a:rPr lang="en-US" sz="2800" dirty="0"/>
-              <a:t>Create virtual machine availability set – </a:t>
+              <a:rPr lang="en-US" sz="1800" dirty="0"/>
+              <a:t>Remote Desktop Client</a:t>
             </a:r>
           </a:p>
           <a:p>
             <a:pPr lvl="1"/>
             <a:r>
-              <a:rPr lang="en-US" sz="2000" dirty="0"/>
-              <a:t>2 DS4s v3 virtual machines </a:t>
+              <a:rPr lang="en-US" sz="1800" dirty="0"/>
+              <a:t>Web Client</a:t>
             </a:r>
           </a:p>
           <a:p>
             <a:pPr lvl="1"/>
             <a:r>
-              <a:rPr lang="en-US" sz="2000" dirty="0"/>
-              <a:t>scaling to an additional 29 virtual machines</a:t>
-            </a:r>
-          </a:p>
-          <a:p>
-            <a:endParaRPr lang="en-US" dirty="0"/>
+              <a:rPr lang="en-US" sz="1800" dirty="0"/>
+              <a:t>Apple iOS or Android Remote Desktop app</a:t>
+            </a:r>
+          </a:p>
+          <a:p>
+            <a:endParaRPr lang="en-US" sz="2800" dirty="0"/>
           </a:p>
         </p:txBody>
       </p:sp>
@@ -19470,7 +19596,7 @@
           <a:p>
             <a:r>
               <a:rPr lang="en-US" sz="4800" dirty="0"/>
-              <a:t>Windows Virtual Desktop host pool</a:t>
+              <a:t>Windows Desktop image</a:t>
             </a:r>
           </a:p>
         </p:txBody>
@@ -19478,7 +19604,7 @@
     </p:spTree>
     <p:extLst>
       <p:ext uri="{BB962C8B-B14F-4D97-AF65-F5344CB8AC3E}">
-        <p14:creationId xmlns:p14="http://schemas.microsoft.com/office/powerpoint/2010/main" val="3475086089"/>
+        <p14:creationId xmlns:p14="http://schemas.microsoft.com/office/powerpoint/2010/main" val="2799319501"/>
       </p:ext>
     </p:extLst>
   </p:cSld>
@@ -19515,6 +19641,136 @@
       </p:grpSpPr>
       <p:sp>
         <p:nvSpPr>
+          <p:cNvPr id="18" name="Content Placeholder 2">
+            <a:extLst>
+              <a:ext uri="{FF2B5EF4-FFF2-40B4-BE49-F238E27FC236}">
+                <a16:creationId xmlns:a16="http://schemas.microsoft.com/office/drawing/2014/main" id="{0EBB5226-FC08-476B-82AB-FFBEA7FE4620}"/>
+              </a:ext>
+            </a:extLst>
+          </p:cNvPr>
+          <p:cNvSpPr>
+            <a:spLocks noGrp="1"/>
+          </p:cNvSpPr>
+          <p:nvPr>
+            <p:ph type="body" sz="quarter" idx="10"/>
+          </p:nvPr>
+        </p:nvSpPr>
+        <p:spPr>
+          <a:xfrm>
+            <a:off x="269239" y="1189177"/>
+            <a:ext cx="9691190" cy="4036939"/>
+          </a:xfrm>
+        </p:spPr>
+        <p:txBody>
+          <a:bodyPr/>
+          <a:lstStyle/>
+          <a:p>
+            <a:r>
+              <a:rPr lang="en-US" sz="3200" dirty="0"/>
+              <a:t>Define the number of con-current sessions – </a:t>
+            </a:r>
+          </a:p>
+          <a:p>
+            <a:pPr lvl="1"/>
+            <a:r>
+              <a:rPr lang="en-US" sz="2400" dirty="0"/>
+              <a:t>250 users</a:t>
+            </a:r>
+            <a:endParaRPr lang="en-US" sz="1400" dirty="0"/>
+          </a:p>
+          <a:p>
+            <a:r>
+              <a:rPr lang="en-US" sz="3200" dirty="0"/>
+              <a:t>Single host pool for Knowledge, Developer, and Finance users</a:t>
+            </a:r>
+          </a:p>
+          <a:p>
+            <a:r>
+              <a:rPr lang="en-US" sz="3200" dirty="0"/>
+              <a:t>Create virtual machine availability set – </a:t>
+            </a:r>
+          </a:p>
+          <a:p>
+            <a:pPr lvl="1"/>
+            <a:r>
+              <a:rPr lang="en-US" sz="2400" dirty="0"/>
+              <a:t>25 DS4s v3 virtual machines </a:t>
+            </a:r>
+          </a:p>
+          <a:p>
+            <a:pPr lvl="1"/>
+            <a:r>
+              <a:rPr lang="en-US" sz="2400" dirty="0"/>
+              <a:t>10 users per virtual machine</a:t>
+            </a:r>
+          </a:p>
+          <a:p>
+            <a:endParaRPr lang="en-US" sz="4000" dirty="0"/>
+          </a:p>
+        </p:txBody>
+      </p:sp>
+      <p:sp>
+        <p:nvSpPr>
+          <p:cNvPr id="2" name="Title 1"/>
+          <p:cNvSpPr>
+            <a:spLocks noGrp="1"/>
+          </p:cNvSpPr>
+          <p:nvPr>
+            <p:ph type="title"/>
+          </p:nvPr>
+        </p:nvSpPr>
+        <p:spPr/>
+        <p:txBody>
+          <a:bodyPr/>
+          <a:lstStyle/>
+          <a:p>
+            <a:r>
+              <a:rPr lang="en-US" sz="4800" dirty="0"/>
+              <a:t>Windows Virtual Desktop host pool</a:t>
+            </a:r>
+          </a:p>
+        </p:txBody>
+      </p:sp>
+    </p:spTree>
+    <p:extLst>
+      <p:ext uri="{BB962C8B-B14F-4D97-AF65-F5344CB8AC3E}">
+        <p14:creationId xmlns:p14="http://schemas.microsoft.com/office/powerpoint/2010/main" val="3475086089"/>
+      </p:ext>
+    </p:extLst>
+  </p:cSld>
+  <p:clrMapOvr>
+    <a:masterClrMapping/>
+  </p:clrMapOvr>
+  <mc:AlternateContent xmlns:mc="http://schemas.openxmlformats.org/markup-compatibility/2006" xmlns:p14="http://schemas.microsoft.com/office/powerpoint/2010/main">
+    <mc:Choice Requires="p14">
+      <p:transition p14:dur="0"/>
+    </mc:Choice>
+    <mc:Fallback xmlns="">
+      <p:transition/>
+    </mc:Fallback>
+  </mc:AlternateContent>
+</p:sld>
+</file>
+
+<file path=ppt/slides/slide28.xml><?xml version="1.0" encoding="utf-8"?>
+<p:sld xmlns:a="http://schemas.openxmlformats.org/drawingml/2006/main" xmlns:r="http://schemas.openxmlformats.org/officeDocument/2006/relationships" xmlns:p="http://schemas.openxmlformats.org/presentationml/2006/main">
+  <p:cSld>
+    <p:spTree>
+      <p:nvGrpSpPr>
+        <p:cNvPr id="1" name=""/>
+        <p:cNvGrpSpPr/>
+        <p:nvPr/>
+      </p:nvGrpSpPr>
+      <p:grpSpPr>
+        <a:xfrm>
+          <a:off x="0" y="0"/>
+          <a:ext cx="0" cy="0"/>
+          <a:chOff x="0" y="0"/>
+          <a:chExt cx="0" cy="0"/>
+        </a:xfrm>
+      </p:grpSpPr>
+      <p:sp>
+        <p:nvSpPr>
           <p:cNvPr id="3" name="Title 2">
             <a:extLst>
               <a:ext uri="{FF2B5EF4-FFF2-40B4-BE49-F238E27FC236}">
@@ -19543,10 +19799,10 @@
       </p:sp>
       <p:pic>
         <p:nvPicPr>
-          <p:cNvPr id="5" name="Picture 4">
+          <p:cNvPr id="3579" name="Picture 3578" descr="A close up of a map&#10;&#10;Description automatically generated">
             <a:extLst>
               <a:ext uri="{FF2B5EF4-FFF2-40B4-BE49-F238E27FC236}">
-                <a16:creationId xmlns:a16="http://schemas.microsoft.com/office/drawing/2014/main" id="{8863C94C-E1E8-4CDC-B724-1580DA261A1B}"/>
+                <a16:creationId xmlns:a16="http://schemas.microsoft.com/office/drawing/2014/main" id="{AD73B531-2241-4E90-9EAF-C5E292AEF89C}"/>
               </a:ext>
             </a:extLst>
           </p:cNvPr>
@@ -19569,8 +19825,8 @@
         </p:blipFill>
         <p:spPr>
           <a:xfrm>
-            <a:off x="2123378" y="1189176"/>
-            <a:ext cx="7945244" cy="4993074"/>
+            <a:off x="133460" y="1141140"/>
+            <a:ext cx="11925080" cy="4988984"/>
           </a:xfrm>
           <a:prstGeom prst="rect">
             <a:avLst/>
@@ -19590,181 +19846,6 @@
   <p:transition>
     <p:fade/>
   </p:transition>
-</p:sld>
-</file>
-
-<file path=ppt/slides/slide28.xml><?xml version="1.0" encoding="utf-8"?>
-<p:sld xmlns:a="http://schemas.openxmlformats.org/drawingml/2006/main" xmlns:r="http://schemas.openxmlformats.org/officeDocument/2006/relationships" xmlns:p="http://schemas.openxmlformats.org/presentationml/2006/main">
-  <p:cSld>
-    <p:spTree>
-      <p:nvGrpSpPr>
-        <p:cNvPr id="1" name=""/>
-        <p:cNvGrpSpPr/>
-        <p:nvPr/>
-      </p:nvGrpSpPr>
-      <p:grpSpPr>
-        <a:xfrm>
-          <a:off x="0" y="0"/>
-          <a:ext cx="0" cy="0"/>
-          <a:chOff x="0" y="0"/>
-          <a:chExt cx="0" cy="0"/>
-        </a:xfrm>
-      </p:grpSpPr>
-      <p:sp>
-        <p:nvSpPr>
-          <p:cNvPr id="2" name="Title 1"/>
-          <p:cNvSpPr>
-            <a:spLocks noGrp="1"/>
-          </p:cNvSpPr>
-          <p:nvPr>
-            <p:ph type="title"/>
-          </p:nvPr>
-        </p:nvSpPr>
-        <p:spPr/>
-        <p:txBody>
-          <a:bodyPr>
-            <a:normAutofit fontScale="90000"/>
-          </a:bodyPr>
-          <a:lstStyle/>
-          <a:p>
-            <a:r>
-              <a:rPr lang="en-US" sz="4900" dirty="0">
-                <a:solidFill>
-                  <a:schemeClr val="tx1"/>
-                </a:solidFill>
-                <a:cs typeface="Segoe UI" panose="020B0502040204020203" pitchFamily="34" charset="0"/>
-              </a:rPr>
-              <a:t>Preferred objections handling</a:t>
-            </a:r>
-            <a:br>
-              <a:rPr lang="en-US" dirty="0">
-                <a:solidFill>
-                  <a:schemeClr val="tx1"/>
-                </a:solidFill>
-                <a:latin typeface="Segoe UI" panose="020B0502040204020203" pitchFamily="34" charset="0"/>
-              </a:rPr>
-            </a:br>
-            <a:endParaRPr lang="en-US" sz="3236" dirty="0">
-              <a:solidFill>
-                <a:schemeClr val="tx1"/>
-              </a:solidFill>
-              <a:latin typeface="Segoe UI" panose="020B0502040204020203" pitchFamily="34" charset="0"/>
-            </a:endParaRPr>
-          </a:p>
-        </p:txBody>
-      </p:sp>
-      <p:sp>
-        <p:nvSpPr>
-          <p:cNvPr id="3" name="Content Placeholder 2"/>
-          <p:cNvSpPr>
-            <a:spLocks noGrp="1"/>
-          </p:cNvSpPr>
-          <p:nvPr>
-            <p:ph type="body" sz="quarter" idx="10"/>
-          </p:nvPr>
-        </p:nvSpPr>
-        <p:spPr>
-          <a:xfrm>
-            <a:off x="271557" y="976233"/>
-            <a:ext cx="11452357" cy="1779491"/>
-          </a:xfrm>
-        </p:spPr>
-        <p:txBody>
-          <a:bodyPr>
-            <a:noAutofit/>
-          </a:bodyPr>
-          <a:lstStyle/>
-          <a:p>
-            <a:pPr marL="0" lvl="0" indent="0">
-              <a:buNone/>
-            </a:pPr>
-            <a:r>
-              <a:rPr lang="en-US" sz="2800" dirty="0">
-                <a:solidFill>
-                  <a:schemeClr val="tx1"/>
-                </a:solidFill>
-              </a:rPr>
-              <a:t>Objection</a:t>
-            </a:r>
-          </a:p>
-          <a:p>
-            <a:pPr marL="0" indent="0">
-              <a:buNone/>
-            </a:pPr>
-            <a:endParaRPr lang="en-US" sz="2000" dirty="0"/>
-          </a:p>
-          <a:p>
-            <a:pPr marL="0" indent="0">
-              <a:buNone/>
-            </a:pPr>
-            <a:r>
-              <a:rPr lang="en-US" sz="2000" dirty="0"/>
-              <a:t>Contoso has made a substantial capital investment in their current data centers that they do not want to decommission. How can the infrastructure be architected to support the current data centers?</a:t>
-            </a:r>
-            <a:endParaRPr lang="en-US" sz="2000" dirty="0">
-              <a:solidFill>
-                <a:schemeClr val="tx1"/>
-              </a:solidFill>
-            </a:endParaRPr>
-          </a:p>
-          <a:p>
-            <a:pPr marL="0" indent="0">
-              <a:buNone/>
-            </a:pPr>
-            <a:endParaRPr lang="en-US" sz="2800" dirty="0">
-              <a:solidFill>
-                <a:schemeClr val="tx1"/>
-              </a:solidFill>
-            </a:endParaRPr>
-          </a:p>
-          <a:p>
-            <a:pPr marL="0" indent="0">
-              <a:buNone/>
-            </a:pPr>
-            <a:r>
-              <a:rPr lang="en-US" sz="2800" dirty="0">
-                <a:solidFill>
-                  <a:schemeClr val="tx1"/>
-                </a:solidFill>
-              </a:rPr>
-              <a:t>Potential answer</a:t>
-            </a:r>
-          </a:p>
-          <a:p>
-            <a:pPr marL="0" indent="0">
-              <a:buNone/>
-            </a:pPr>
-            <a:endParaRPr lang="en-US" sz="2000" dirty="0"/>
-          </a:p>
-          <a:p>
-            <a:pPr marL="0" indent="0">
-              <a:buNone/>
-            </a:pPr>
-            <a:r>
-              <a:rPr lang="en-US" sz="2000" dirty="0"/>
-              <a:t>The designed solution has been architected to integrate the current application delivery configuration through Citrix into the standardized Windows Virtual Desktop image. In addition, Azure AD Connect will be used with hash synchronization to provide a single sign-on environment between the Azure Active Directory identity management and the existing on-premises Active Directory domain. As hardware is depreciated within the current data centers, application servers can be migrated to Azure and the Windows Virtual Desktop image can be updated for the new location of these servers.</a:t>
-            </a:r>
-          </a:p>
-        </p:txBody>
-      </p:sp>
-    </p:spTree>
-    <p:extLst>
-      <p:ext uri="{BB962C8B-B14F-4D97-AF65-F5344CB8AC3E}">
-        <p14:creationId xmlns:p14="http://schemas.microsoft.com/office/powerpoint/2010/main" val="2371438961"/>
-      </p:ext>
-    </p:extLst>
-  </p:cSld>
-  <p:clrMapOvr>
-    <a:masterClrMapping/>
-  </p:clrMapOvr>
-  <mc:AlternateContent xmlns:mc="http://schemas.openxmlformats.org/markup-compatibility/2006" xmlns:p14="http://schemas.microsoft.com/office/powerpoint/2010/main">
-    <mc:Choice Requires="p14">
-      <p:transition p14:dur="0"/>
-    </mc:Choice>
-    <mc:Fallback xmlns="">
-      <p:transition/>
-    </mc:Fallback>
-  </mc:AlternateContent>
 </p:sld>
 </file>
 
@@ -19840,8 +19921,8 @@
         </p:nvSpPr>
         <p:spPr>
           <a:xfrm>
-            <a:off x="269239" y="1189177"/>
-            <a:ext cx="11653523" cy="3894452"/>
+            <a:off x="271557" y="976233"/>
+            <a:ext cx="11452357" cy="1779491"/>
           </a:xfrm>
         </p:spPr>
         <p:txBody>
@@ -19864,14 +19945,17 @@
           </a:p>
           <a:p>
             <a:pPr marL="0" indent="0">
-              <a:spcBef>
-                <a:spcPts val="2400"/>
-              </a:spcBef>
               <a:buNone/>
             </a:pPr>
+            <a:endParaRPr lang="en-US" sz="2000" dirty="0"/>
+          </a:p>
+          <a:p>
+            <a:pPr marL="0" indent="0">
+              <a:buNone/>
+            </a:pPr>
             <a:r>
               <a:rPr lang="en-US" sz="2000" dirty="0"/>
-              <a:t>The CTO at Contoso does not want to invest in new workstations and mobile devices to support the standardized desktop image. Can these devices support the new image?</a:t>
+              <a:t>Contoso has made a substantial capital investment in their current data centers that they do not want to decommission. How can the infrastructure be architected to support the current data centers?</a:t>
             </a:r>
             <a:endParaRPr lang="en-US" sz="2000" dirty="0">
               <a:solidFill>
@@ -19906,23 +19990,23 @@
             <a:pPr marL="0" indent="0">
               <a:buNone/>
             </a:pPr>
+            <a:endParaRPr lang="en-US" sz="2000" dirty="0"/>
+          </a:p>
+          <a:p>
+            <a:pPr marL="0" indent="0">
+              <a:buNone/>
+            </a:pPr>
             <a:r>
               <a:rPr lang="en-US" sz="2000" dirty="0"/>
-              <a:t>Windows Virtual Desktop is flexible in the way that users can access their virtual desktop. The design will utilize web browser access to the virtual desktop on workstations, and the remote desktop app on mobile devices.</a:t>
-            </a:r>
-            <a:endParaRPr lang="en-US" sz="2000" dirty="0">
-              <a:solidFill>
-                <a:schemeClr val="tx1"/>
-              </a:solidFill>
-              <a:latin typeface="+mn-lt"/>
-            </a:endParaRPr>
+              <a:t>The designed solution has been architected to integrate the current application delivery configuration through Citrix into the standardized Windows Virtual Desktop image. In addition, Azure AD Connect will be used with hash synchronization to provide a single sign-on environment between the Azure Active Directory identity management and the existing on-premises Active Directory domain. As hardware is depreciated within the current data centers, application servers can be migrated to Azure and the Windows Virtual Desktop image can be updated for the new location of these servers.</a:t>
+            </a:r>
           </a:p>
         </p:txBody>
       </p:sp>
     </p:spTree>
     <p:extLst>
       <p:ext uri="{BB962C8B-B14F-4D97-AF65-F5344CB8AC3E}">
-        <p14:creationId xmlns:p14="http://schemas.microsoft.com/office/powerpoint/2010/main" val="2227663834"/>
+        <p14:creationId xmlns:p14="http://schemas.microsoft.com/office/powerpoint/2010/main" val="2371438961"/>
       </p:ext>
     </p:extLst>
   </p:cSld>
@@ -20142,7 +20226,7 @@
         <p:spPr>
           <a:xfrm>
             <a:off x="269239" y="1189177"/>
-            <a:ext cx="11653523" cy="2052030"/>
+            <a:ext cx="11653523" cy="3894452"/>
           </a:xfrm>
         </p:spPr>
         <p:txBody>
@@ -20155,18 +20239,13 @@
               <a:buNone/>
             </a:pPr>
             <a:r>
-              <a:rPr lang="en-US" sz="3600" dirty="0">
+              <a:rPr lang="en-US" sz="2800" dirty="0">
                 <a:solidFill>
                   <a:schemeClr val="tx1"/>
                 </a:solidFill>
               </a:rPr>
               <a:t>Objection</a:t>
             </a:r>
-            <a:endParaRPr lang="en-US" sz="2400" dirty="0">
-              <a:solidFill>
-                <a:schemeClr val="tx1"/>
-              </a:solidFill>
-            </a:endParaRPr>
           </a:p>
           <a:p>
             <a:pPr marL="0" indent="0">
@@ -20177,21 +20256,8 @@
             </a:pPr>
             <a:r>
               <a:rPr lang="en-US" sz="2000" dirty="0"/>
-              <a:t>The CISO at Contoso needs to be convinced that data will not be exposed. How would Microsoft handle data protection?</a:t>
-            </a:r>
-            <a:r>
-              <a:rPr lang="en-US" sz="2000" b="1" dirty="0">
-                <a:solidFill>
-                  <a:schemeClr val="tx1"/>
-                </a:solidFill>
-              </a:rPr>
-              <a:t> </a:t>
-            </a:r>
-          </a:p>
-          <a:p>
-            <a:pPr marL="0" lvl="0" indent="0">
-              <a:buNone/>
-            </a:pPr>
+              <a:t>The CTO at Contoso does not want to invest in new workstations and mobile devices to support the standardized desktop image. Can these devices support the new image?</a:t>
+            </a:r>
             <a:endParaRPr lang="en-US" sz="2000" dirty="0">
               <a:solidFill>
                 <a:schemeClr val="tx1"/>
@@ -20199,11 +20265,21 @@
             </a:endParaRPr>
           </a:p>
           <a:p>
-            <a:pPr marL="0" lvl="0" indent="0">
+            <a:pPr marL="0" indent="0">
               <a:buNone/>
             </a:pPr>
-            <a:r>
-              <a:rPr lang="en-US" sz="3600" dirty="0">
+            <a:endParaRPr lang="en-US" sz="2800" dirty="0">
+              <a:solidFill>
+                <a:schemeClr val="tx1"/>
+              </a:solidFill>
+            </a:endParaRPr>
+          </a:p>
+          <a:p>
+            <a:pPr marL="0" indent="0">
+              <a:buNone/>
+            </a:pPr>
+            <a:r>
+              <a:rPr lang="en-US" sz="2800" dirty="0">
                 <a:solidFill>
                   <a:schemeClr val="tx1"/>
                 </a:solidFill>
@@ -20212,18 +20288,12 @@
             </a:r>
           </a:p>
           <a:p>
-            <a:pPr marL="0" lvl="0" indent="0">
+            <a:pPr marL="0" indent="0">
               <a:buNone/>
             </a:pPr>
-            <a:endParaRPr lang="en-US" sz="2000" dirty="0"/>
-          </a:p>
-          <a:p>
-            <a:pPr marL="0" lvl="0" indent="0">
-              <a:buNone/>
-            </a:pPr>
             <a:r>
               <a:rPr lang="en-US" sz="2000" dirty="0"/>
-              <a:t>The designed solution for Contoso Healthcare includes Microsoft 365 E5 with Enterprise Mobility + Security (EMS) E5. This provides a full suite of data and information protection to classify sensitive data and audit activity. Cloud App Security can also be used to block access to unauthorized file sharing services to avoid users from copying files to unprotected locations. Data protection controls can be monitored through Microsoft 365 security adviser, and Azure Security Center.</a:t>
+              <a:t>Windows Virtual Desktop is flexible in the way that users can access their virtual desktop. The design will utilize web browser access to the virtual desktop on workstations, and the remote desktop app on mobile devices.</a:t>
             </a:r>
             <a:endParaRPr lang="en-US" sz="2000" dirty="0">
               <a:solidFill>
@@ -20237,7 +20307,7 @@
     </p:spTree>
     <p:extLst>
       <p:ext uri="{BB962C8B-B14F-4D97-AF65-F5344CB8AC3E}">
-        <p14:creationId xmlns:p14="http://schemas.microsoft.com/office/powerpoint/2010/main" val="3181487484"/>
+        <p14:creationId xmlns:p14="http://schemas.microsoft.com/office/powerpoint/2010/main" val="2227663834"/>
       </p:ext>
     </p:extLst>
   </p:cSld>
@@ -20325,7 +20395,12 @@
             <p:ph type="body" sz="quarter" idx="10"/>
           </p:nvPr>
         </p:nvSpPr>
-        <p:spPr/>
+        <p:spPr>
+          <a:xfrm>
+            <a:off x="269239" y="1189177"/>
+            <a:ext cx="11653523" cy="2052030"/>
+          </a:xfrm>
+        </p:spPr>
         <p:txBody>
           <a:bodyPr>
             <a:noAutofit/>
@@ -20343,6 +20418,11 @@
               </a:rPr>
               <a:t>Objection</a:t>
             </a:r>
+            <a:endParaRPr lang="en-US" sz="2400" dirty="0">
+              <a:solidFill>
+                <a:schemeClr val="tx1"/>
+              </a:solidFill>
+            </a:endParaRPr>
           </a:p>
           <a:p>
             <a:pPr marL="0" indent="0">
@@ -20353,7 +20433,7 @@
             </a:pPr>
             <a:r>
               <a:rPr lang="en-US" sz="2000" dirty="0"/>
-              <a:t>Contoso must be able to log and audit all activity on the desktop image. How will this be handled within the cloud and on-premises environments?</a:t>
+              <a:t>The CISO at Contoso needs to be convinced that data will not be exposed. How would Microsoft handle data protection?</a:t>
             </a:r>
             <a:r>
               <a:rPr lang="en-US" sz="2000" b="1" dirty="0">
@@ -20365,13 +20445,10 @@
             </a:r>
           </a:p>
           <a:p>
-            <a:pPr marL="0" indent="0">
-              <a:spcBef>
-                <a:spcPts val="2400"/>
-              </a:spcBef>
+            <a:pPr marL="0" lvl="0" indent="0">
               <a:buNone/>
             </a:pPr>
-            <a:endParaRPr lang="en-US" sz="2000" b="1" dirty="0">
+            <a:endParaRPr lang="en-US" sz="2000" dirty="0">
               <a:solidFill>
                 <a:schemeClr val="tx1"/>
               </a:solidFill>
@@ -20402,7 +20479,7 @@
             </a:pPr>
             <a:r>
               <a:rPr lang="en-US" sz="2000" dirty="0"/>
-              <a:t>Azure Monitor and Azure Log Analytics will be activated within the Azure environment. Azure Monitor agents will be deployed to the on-premises virtual machines to monitor activity across the entire infrastructure.</a:t>
+              <a:t>The designed solution for Contoso Healthcare includes Microsoft 365 E5 with Enterprise Mobility + Security (EMS) E5. This provides a full suite of data and information protection to classify sensitive data and audit activity. Cloud App Security can also be used to block access to unauthorized file sharing services to avoid users from copying files to unprotected locations. Data protection controls can be monitored through Microsoft 365 security adviser, and Azure Security Center.</a:t>
             </a:r>
             <a:endParaRPr lang="en-US" sz="2000" dirty="0">
               <a:solidFill>
@@ -20416,7 +20493,7 @@
     </p:spTree>
     <p:extLst>
       <p:ext uri="{BB962C8B-B14F-4D97-AF65-F5344CB8AC3E}">
-        <p14:creationId xmlns:p14="http://schemas.microsoft.com/office/powerpoint/2010/main" val="3234287497"/>
+        <p14:creationId xmlns:p14="http://schemas.microsoft.com/office/powerpoint/2010/main" val="3181487484"/>
       </p:ext>
     </p:extLst>
   </p:cSld>
@@ -20532,6 +20609,185 @@
             </a:pPr>
             <a:r>
               <a:rPr lang="en-US" sz="2000" dirty="0"/>
+              <a:t>Contoso must be able to log and audit all activity on the desktop image. How will this be handled within the cloud and on-premises environments?</a:t>
+            </a:r>
+            <a:r>
+              <a:rPr lang="en-US" sz="2000" b="1" dirty="0">
+                <a:solidFill>
+                  <a:schemeClr val="tx1"/>
+                </a:solidFill>
+              </a:rPr>
+              <a:t> </a:t>
+            </a:r>
+          </a:p>
+          <a:p>
+            <a:pPr marL="0" indent="0">
+              <a:spcBef>
+                <a:spcPts val="2400"/>
+              </a:spcBef>
+              <a:buNone/>
+            </a:pPr>
+            <a:endParaRPr lang="en-US" sz="2000" b="1" dirty="0">
+              <a:solidFill>
+                <a:schemeClr val="tx1"/>
+              </a:solidFill>
+            </a:endParaRPr>
+          </a:p>
+          <a:p>
+            <a:pPr marL="0" lvl="0" indent="0">
+              <a:buNone/>
+            </a:pPr>
+            <a:r>
+              <a:rPr lang="en-US" sz="3600" dirty="0">
+                <a:solidFill>
+                  <a:schemeClr val="tx1"/>
+                </a:solidFill>
+              </a:rPr>
+              <a:t>Potential answer</a:t>
+            </a:r>
+          </a:p>
+          <a:p>
+            <a:pPr marL="0" lvl="0" indent="0">
+              <a:buNone/>
+            </a:pPr>
+            <a:endParaRPr lang="en-US" sz="2000" dirty="0"/>
+          </a:p>
+          <a:p>
+            <a:pPr marL="0" lvl="0" indent="0">
+              <a:buNone/>
+            </a:pPr>
+            <a:r>
+              <a:rPr lang="en-US" sz="2000" dirty="0"/>
+              <a:t>Azure Monitor and Azure Log Analytics will be activated within the Azure environment. Azure Monitor agents will be deployed to the on-premises virtual machines to monitor activity across the entire infrastructure.</a:t>
+            </a:r>
+            <a:endParaRPr lang="en-US" sz="2000" dirty="0">
+              <a:solidFill>
+                <a:schemeClr val="tx1"/>
+              </a:solidFill>
+              <a:latin typeface="+mn-lt"/>
+            </a:endParaRPr>
+          </a:p>
+        </p:txBody>
+      </p:sp>
+    </p:spTree>
+    <p:extLst>
+      <p:ext uri="{BB962C8B-B14F-4D97-AF65-F5344CB8AC3E}">
+        <p14:creationId xmlns:p14="http://schemas.microsoft.com/office/powerpoint/2010/main" val="3234287497"/>
+      </p:ext>
+    </p:extLst>
+  </p:cSld>
+  <p:clrMapOvr>
+    <a:masterClrMapping/>
+  </p:clrMapOvr>
+  <mc:AlternateContent xmlns:mc="http://schemas.openxmlformats.org/markup-compatibility/2006" xmlns:p14="http://schemas.microsoft.com/office/powerpoint/2010/main">
+    <mc:Choice Requires="p14">
+      <p:transition p14:dur="0"/>
+    </mc:Choice>
+    <mc:Fallback xmlns="">
+      <p:transition/>
+    </mc:Fallback>
+  </mc:AlternateContent>
+</p:sld>
+</file>
+
+<file path=ppt/slides/slide33.xml><?xml version="1.0" encoding="utf-8"?>
+<p:sld xmlns:a="http://schemas.openxmlformats.org/drawingml/2006/main" xmlns:r="http://schemas.openxmlformats.org/officeDocument/2006/relationships" xmlns:p="http://schemas.openxmlformats.org/presentationml/2006/main">
+  <p:cSld>
+    <p:spTree>
+      <p:nvGrpSpPr>
+        <p:cNvPr id="1" name=""/>
+        <p:cNvGrpSpPr/>
+        <p:nvPr/>
+      </p:nvGrpSpPr>
+      <p:grpSpPr>
+        <a:xfrm>
+          <a:off x="0" y="0"/>
+          <a:ext cx="0" cy="0"/>
+          <a:chOff x="0" y="0"/>
+          <a:chExt cx="0" cy="0"/>
+        </a:xfrm>
+      </p:grpSpPr>
+      <p:sp>
+        <p:nvSpPr>
+          <p:cNvPr id="2" name="Title 1"/>
+          <p:cNvSpPr>
+            <a:spLocks noGrp="1"/>
+          </p:cNvSpPr>
+          <p:nvPr>
+            <p:ph type="title"/>
+          </p:nvPr>
+        </p:nvSpPr>
+        <p:spPr/>
+        <p:txBody>
+          <a:bodyPr>
+            <a:normAutofit fontScale="90000"/>
+          </a:bodyPr>
+          <a:lstStyle/>
+          <a:p>
+            <a:r>
+              <a:rPr lang="en-US" sz="4900" dirty="0">
+                <a:solidFill>
+                  <a:schemeClr val="tx1"/>
+                </a:solidFill>
+                <a:cs typeface="Segoe UI" panose="020B0502040204020203" pitchFamily="34" charset="0"/>
+              </a:rPr>
+              <a:t>Preferred objections handling</a:t>
+            </a:r>
+            <a:br>
+              <a:rPr lang="en-US" dirty="0">
+                <a:solidFill>
+                  <a:schemeClr val="tx1"/>
+                </a:solidFill>
+                <a:latin typeface="Segoe UI" panose="020B0502040204020203" pitchFamily="34" charset="0"/>
+              </a:rPr>
+            </a:br>
+            <a:endParaRPr lang="en-US" sz="3236" dirty="0">
+              <a:solidFill>
+                <a:schemeClr val="tx1"/>
+              </a:solidFill>
+              <a:latin typeface="Segoe UI" panose="020B0502040204020203" pitchFamily="34" charset="0"/>
+            </a:endParaRPr>
+          </a:p>
+        </p:txBody>
+      </p:sp>
+      <p:sp>
+        <p:nvSpPr>
+          <p:cNvPr id="3" name="Content Placeholder 2"/>
+          <p:cNvSpPr>
+            <a:spLocks noGrp="1"/>
+          </p:cNvSpPr>
+          <p:nvPr>
+            <p:ph type="body" sz="quarter" idx="10"/>
+          </p:nvPr>
+        </p:nvSpPr>
+        <p:spPr/>
+        <p:txBody>
+          <a:bodyPr>
+            <a:noAutofit/>
+          </a:bodyPr>
+          <a:lstStyle/>
+          <a:p>
+            <a:pPr marL="0" lvl="0" indent="0">
+              <a:buNone/>
+            </a:pPr>
+            <a:r>
+              <a:rPr lang="en-US" sz="3600" dirty="0">
+                <a:solidFill>
+                  <a:schemeClr val="tx1"/>
+                </a:solidFill>
+              </a:rPr>
+              <a:t>Objection</a:t>
+            </a:r>
+          </a:p>
+          <a:p>
+            <a:pPr marL="0" indent="0">
+              <a:spcBef>
+                <a:spcPts val="2400"/>
+              </a:spcBef>
+              <a:buNone/>
+            </a:pPr>
+            <a:r>
+              <a:rPr lang="en-US" sz="2000" dirty="0"/>
               <a:t>Connections between the cloud and existing data centers must be secure and reliable to support their requirements. How will this be addressed and monitored?</a:t>
             </a:r>
             <a:r>
@@ -20613,7 +20869,7 @@
 </p:sld>
 </file>
 
-<file path=ppt/slides/slide33.xml><?xml version="1.0" encoding="utf-8"?>
+<file path=ppt/slides/slide34.xml><?xml version="1.0" encoding="utf-8"?>
 <p:sld xmlns:a="http://schemas.openxmlformats.org/drawingml/2006/main" xmlns:r="http://schemas.openxmlformats.org/officeDocument/2006/relationships" xmlns:p="http://schemas.openxmlformats.org/presentationml/2006/main">
   <p:cSld>
     <p:spTree>
@@ -20700,7 +20956,7 @@
 </p:sld>
 </file>
 
-<file path=ppt/slides/slide34.xml><?xml version="1.0" encoding="utf-8"?>
+<file path=ppt/slides/slide35.xml><?xml version="1.0" encoding="utf-8"?>
 <p:sld xmlns:a="http://schemas.openxmlformats.org/drawingml/2006/main" xmlns:r="http://schemas.openxmlformats.org/officeDocument/2006/relationships" xmlns:p="http://schemas.openxmlformats.org/presentationml/2006/main">
   <p:cSld>
     <p:bg>
@@ -21038,7 +21294,7 @@
             <a:pPr lvl="1"/>
             <a:r>
               <a:rPr lang="en-US" sz="2800" dirty="0"/>
-              <a:t>Headquarters in Detroit, MI</a:t>
+              <a:t>Headquarters in Los Angeles, CA</a:t>
             </a:r>
           </a:p>
           <a:p>
@@ -21052,14 +21308,14 @@
             <a:pPr lvl="1"/>
             <a:r>
               <a:rPr lang="en-US" sz="2800" dirty="0"/>
-              <a:t>500 workstations currently supported</a:t>
+              <a:t>250 workstations for non-clinical users are currently supported</a:t>
             </a:r>
           </a:p>
           <a:p>
             <a:pPr lvl="1"/>
             <a:r>
               <a:rPr lang="en-US" sz="2800" dirty="0"/>
-              <a:t>Data centers located in Detroit, MI and Dallas, TX</a:t>
+              <a:t>Data centers located in California and Northern Virginia</a:t>
             </a:r>
           </a:p>
           <a:p>
@@ -21068,7 +21324,7 @@
               <a:rPr lang="en-US" sz="2800" dirty="0">
                 <a:latin typeface="+mn-lt"/>
               </a:rPr>
-              <a:t>Current infrastructure investment in VMware and Citrix</a:t>
+              <a:t>Current virtual desktop infrastructure investment in VMware and Citrix</a:t>
             </a:r>
           </a:p>
         </p:txBody>
@@ -21124,7 +21380,7 @@
         <p:spPr>
           <a:xfrm>
             <a:off x="269239" y="1189175"/>
-            <a:ext cx="11653523" cy="5496889"/>
+            <a:ext cx="11653523" cy="5182957"/>
           </a:xfrm>
         </p:spPr>
         <p:txBody>
@@ -21135,7 +21391,7 @@
               <a:buNone/>
             </a:pPr>
             <a:r>
-              <a:rPr lang="en-US" sz="2800" dirty="0">
+              <a:rPr lang="en-US" sz="2400" dirty="0">
                 <a:latin typeface="Segoe UI Semibold" panose="020B0702040204020203" pitchFamily="34" charset="0"/>
                 <a:cs typeface="Segoe UI Semibold" panose="020B0702040204020203" pitchFamily="34" charset="0"/>
               </a:rPr>
@@ -21144,40 +21400,40 @@
           </a:p>
           <a:p>
             <a:r>
-              <a:rPr lang="en-US" sz="2800" dirty="0"/>
+              <a:rPr lang="en-US" sz="2400" dirty="0"/>
               <a:t>Understands the value of the cloud for availability and scalability</a:t>
             </a:r>
           </a:p>
           <a:p>
             <a:r>
-              <a:rPr lang="en-US" sz="2800" dirty="0"/>
-              <a:t>Focus on standardization of desktop images</a:t>
-            </a:r>
-          </a:p>
-          <a:p>
-            <a:r>
-              <a:rPr lang="en-US" sz="2800" dirty="0"/>
+              <a:rPr lang="en-US" sz="2400" dirty="0"/>
+              <a:t>Focus on standardization of desktop images and manage published applications</a:t>
+            </a:r>
+          </a:p>
+          <a:p>
+            <a:r>
+              <a:rPr lang="en-US" sz="2400" dirty="0"/>
               <a:t>Wants to avoid the need to manage desktops at individual locations</a:t>
             </a:r>
           </a:p>
           <a:p>
             <a:r>
-              <a:rPr lang="en-US" sz="2800" dirty="0"/>
-              <a:t>Interested in minimizing additional capital investments and maximizing current infrastructure</a:t>
+              <a:rPr lang="en-US" sz="2400" dirty="0"/>
+              <a:t>Interested in minimizing additional capital investments and maximizing current VMware and Citrix virtual desktop infrastructure in Azure</a:t>
             </a:r>
           </a:p>
           <a:p>
             <a:pPr marL="0" indent="0">
               <a:buNone/>
             </a:pPr>
-            <a:endParaRPr lang="en-US" sz="2800" dirty="0"/>
+            <a:endParaRPr lang="en-US" sz="2400" dirty="0"/>
           </a:p>
           <a:p>
             <a:pPr marL="0" indent="0">
               <a:buNone/>
             </a:pPr>
             <a:r>
-              <a:rPr lang="en-US" sz="2800" dirty="0">
+              <a:rPr lang="en-US" sz="2400" dirty="0">
                 <a:latin typeface="Segoe UI Semibold" panose="020B0702040204020203" pitchFamily="34" charset="0"/>
                 <a:cs typeface="Segoe UI Semibold" panose="020B0702040204020203" pitchFamily="34" charset="0"/>
               </a:rPr>
@@ -21186,25 +21442,31 @@
           </a:p>
           <a:p>
             <a:r>
-              <a:rPr lang="en-US" sz="2800" dirty="0"/>
+              <a:rPr lang="en-US" sz="2400" dirty="0"/>
               <a:t>Wants to avoid data exposure of PHI and PII</a:t>
             </a:r>
           </a:p>
           <a:p>
             <a:r>
-              <a:rPr lang="en-US" sz="2800" dirty="0"/>
+              <a:rPr lang="en-US" sz="2400" dirty="0"/>
+              <a:t>Compliance to California Personal Protection Act</a:t>
+            </a:r>
+          </a:p>
+          <a:p>
+            <a:r>
+              <a:rPr lang="en-US" sz="2400" dirty="0"/>
               <a:t>Focus on securing data and resources</a:t>
             </a:r>
           </a:p>
           <a:p>
             <a:r>
-              <a:rPr lang="en-US" sz="2800" dirty="0"/>
+              <a:rPr lang="en-US" sz="2400" dirty="0"/>
               <a:t>Concerned with potential data loss due to device theft</a:t>
             </a:r>
           </a:p>
           <a:p>
             <a:pPr lvl="1"/>
-            <a:endParaRPr lang="en-US" sz="1600" dirty="0"/>
+            <a:endParaRPr lang="en-US" sz="1400" dirty="0"/>
           </a:p>
         </p:txBody>
       </p:sp>
@@ -21286,8 +21548,8 @@
         </p:nvSpPr>
         <p:spPr>
           <a:xfrm>
-            <a:off x="269239" y="1189177"/>
-            <a:ext cx="11653523" cy="4764381"/>
+            <a:off x="269239" y="1318846"/>
+            <a:ext cx="11653523" cy="5139869"/>
           </a:xfrm>
         </p:spPr>
         <p:txBody>
@@ -21295,16 +21557,16 @@
           <a:lstStyle/>
           <a:p>
             <a:r>
-              <a:rPr lang="en-US" sz="3200" dirty="0">
+              <a:rPr lang="en-US" sz="2800" dirty="0">
                 <a:solidFill>
                   <a:schemeClr val="tx1"/>
                 </a:solidFill>
               </a:rPr>
-              <a:t>Increased need for mobile devices to access patient health records</a:t>
-            </a:r>
-          </a:p>
-          <a:p>
-            <a:endParaRPr lang="en-US" sz="3200" dirty="0">
+              <a:t>Increased need for mobile devices for non-clinical users</a:t>
+            </a:r>
+          </a:p>
+          <a:p>
+            <a:endParaRPr lang="en-US" sz="2800" dirty="0">
               <a:solidFill>
                 <a:schemeClr val="tx1"/>
               </a:solidFill>
@@ -21312,7 +21574,7 @@
           </a:p>
           <a:p>
             <a:r>
-              <a:rPr lang="en-US" sz="3200" dirty="0">
+              <a:rPr lang="en-US" sz="2800" dirty="0">
                 <a:solidFill>
                   <a:schemeClr val="tx1"/>
                 </a:solidFill>
@@ -21321,7 +21583,7 @@
             </a:r>
           </a:p>
           <a:p>
-            <a:endParaRPr lang="en-US" sz="3200" dirty="0">
+            <a:endParaRPr lang="en-US" sz="2800" dirty="0">
               <a:solidFill>
                 <a:schemeClr val="tx1"/>
               </a:solidFill>
@@ -21329,16 +21591,16 @@
           </a:p>
           <a:p>
             <a:r>
-              <a:rPr lang="en-US" sz="3200" dirty="0">
+              <a:rPr lang="en-US" sz="2800" dirty="0">
                 <a:solidFill>
                   <a:schemeClr val="tx1"/>
                 </a:solidFill>
               </a:rPr>
-              <a:t>Minimize data stored on local devices to mitigate PHI or PII exposure</a:t>
-            </a:r>
-          </a:p>
-          <a:p>
-            <a:endParaRPr lang="en-US" sz="3200" dirty="0">
+              <a:t>Management of authorized applications and block unauthorized cloud applications</a:t>
+            </a:r>
+          </a:p>
+          <a:p>
+            <a:endParaRPr lang="en-US" sz="2800" dirty="0">
               <a:solidFill>
                 <a:schemeClr val="tx1"/>
               </a:solidFill>
@@ -21346,7 +21608,24 @@
           </a:p>
           <a:p>
             <a:r>
-              <a:rPr lang="en-US" sz="3200" dirty="0">
+              <a:rPr lang="en-US" sz="2800" dirty="0">
+                <a:solidFill>
+                  <a:schemeClr val="tx1"/>
+                </a:solidFill>
+              </a:rPr>
+              <a:t>Manage and monitor application use and vulnerabilities within a single platform</a:t>
+            </a:r>
+          </a:p>
+          <a:p>
+            <a:endParaRPr lang="en-US" sz="2800" dirty="0">
+              <a:solidFill>
+                <a:schemeClr val="tx1"/>
+              </a:solidFill>
+            </a:endParaRPr>
+          </a:p>
+          <a:p>
+            <a:r>
+              <a:rPr lang="en-US" sz="2800" dirty="0">
                 <a:solidFill>
                   <a:schemeClr val="tx1"/>
                 </a:solidFill>
@@ -21422,7 +21701,7 @@
           <p:cNvPr id="2" name="Text Placeholder 1">
             <a:extLst>
               <a:ext uri="{FF2B5EF4-FFF2-40B4-BE49-F238E27FC236}">
-                <a16:creationId xmlns:a16="http://schemas.microsoft.com/office/drawing/2014/main" id="{94B1CFD0-EE96-4D8C-9380-EEE6C6A42E87}"/>
+                <a16:creationId xmlns:a16="http://schemas.microsoft.com/office/drawing/2014/main" id="{700FAA17-AE7C-4831-A454-9E176B3DC7AC}"/>
               </a:ext>
             </a:extLst>
           </p:cNvPr>
@@ -21436,7 +21715,7 @@
         <p:spPr>
           <a:xfrm>
             <a:off x="269239" y="1189177"/>
-            <a:ext cx="11653523" cy="5501955"/>
+            <a:ext cx="11653523" cy="3864584"/>
           </a:xfrm>
         </p:spPr>
         <p:txBody>
@@ -21444,48 +21723,33 @@
           <a:lstStyle/>
           <a:p>
             <a:r>
-              <a:rPr lang="en-US" sz="3600" dirty="0"/>
-              <a:t>24x7x365 access to applications</a:t>
-            </a:r>
-          </a:p>
-          <a:p>
-            <a:endParaRPr lang="en-US" sz="3600" dirty="0">
-              <a:latin typeface="+mj-lt"/>
+              <a:rPr lang="en-US" sz="4000" dirty="0">
+                <a:solidFill>
+                  <a:schemeClr val="tx1"/>
+                </a:solidFill>
+              </a:rPr>
+              <a:t>Minimize data stored on local devices to mitigate PII exposure</a:t>
+            </a:r>
+          </a:p>
+          <a:p>
+            <a:endParaRPr lang="en-US" sz="4000" dirty="0">
+              <a:solidFill>
+                <a:schemeClr val="tx1"/>
+              </a:solidFill>
             </a:endParaRPr>
           </a:p>
           <a:p>
             <a:r>
-              <a:rPr lang="en-US" sz="3600" dirty="0"/>
-              <a:t>High availability with limited capital investment</a:t>
-            </a:r>
-          </a:p>
-          <a:p>
-            <a:endParaRPr lang="en-US" sz="3600" dirty="0">
-              <a:latin typeface="+mj-lt"/>
-            </a:endParaRPr>
-          </a:p>
-          <a:p>
-            <a:r>
-              <a:rPr lang="en-US" sz="3600" dirty="0"/>
-              <a:t>Ability to scale resources as demand increases</a:t>
-            </a:r>
-          </a:p>
-          <a:p>
-            <a:endParaRPr lang="en-US" sz="3600" dirty="0">
-              <a:latin typeface="+mj-lt"/>
-            </a:endParaRPr>
-          </a:p>
-          <a:p>
-            <a:r>
-              <a:rPr lang="en-US" sz="3600" dirty="0"/>
-              <a:t>Network connections should be resilient with low latency to applications</a:t>
-            </a:r>
-            <a:endParaRPr lang="en-US" sz="2800" dirty="0">
-              <a:latin typeface="+mj-lt"/>
-            </a:endParaRPr>
-          </a:p>
-          <a:p>
-            <a:endParaRPr lang="en-IE" dirty="0"/>
+              <a:rPr lang="en-US" sz="4000" dirty="0">
+                <a:solidFill>
+                  <a:schemeClr val="tx1"/>
+                </a:solidFill>
+              </a:rPr>
+              <a:t>Maintain compliance to California Personal Protection Act</a:t>
+            </a:r>
+          </a:p>
+          <a:p>
+            <a:endParaRPr lang="en-US" dirty="0"/>
           </a:p>
         </p:txBody>
       </p:sp>
@@ -21494,7 +21758,7 @@
           <p:cNvPr id="3" name="Title 2">
             <a:extLst>
               <a:ext uri="{FF2B5EF4-FFF2-40B4-BE49-F238E27FC236}">
-                <a16:creationId xmlns:a16="http://schemas.microsoft.com/office/drawing/2014/main" id="{AB41BA66-A1EC-46C7-833C-D6C0E7B2B745}"/>
+                <a16:creationId xmlns:a16="http://schemas.microsoft.com/office/drawing/2014/main" id="{F2BBCE17-081A-4F43-ABFA-F1F77B108F04}"/>
               </a:ext>
             </a:extLst>
           </p:cNvPr>
@@ -21512,15 +21776,16 @@
           <a:p>
             <a:r>
               <a:rPr lang="en-IE" dirty="0"/>
-              <a:t>Customer Needs—Availability and Scalability</a:t>
-            </a:r>
+              <a:t>Customer Needs—Security</a:t>
+            </a:r>
+            <a:endParaRPr lang="en-US" dirty="0"/>
           </a:p>
         </p:txBody>
       </p:sp>
     </p:spTree>
     <p:extLst>
       <p:ext uri="{BB962C8B-B14F-4D97-AF65-F5344CB8AC3E}">
-        <p14:creationId xmlns:p14="http://schemas.microsoft.com/office/powerpoint/2010/main" val="3715253765"/>
+        <p14:creationId xmlns:p14="http://schemas.microsoft.com/office/powerpoint/2010/main" val="1686429815"/>
       </p:ext>
     </p:extLst>
   </p:cSld>
@@ -21569,60 +21834,56 @@
         <p:spPr>
           <a:xfrm>
             <a:off x="269239" y="1189177"/>
-            <a:ext cx="11653523" cy="3767185"/>
+            <a:ext cx="11653523" cy="5501955"/>
           </a:xfrm>
         </p:spPr>
         <p:txBody>
           <a:bodyPr/>
           <a:lstStyle/>
           <a:p>
-            <a:pPr>
-              <a:spcBef>
-                <a:spcPts val="1800"/>
-              </a:spcBef>
-            </a:pPr>
-            <a:r>
-              <a:rPr lang="en-US" sz="3200" dirty="0"/>
-              <a:t>Eliminate the need to update and manage local devices</a:t>
-            </a:r>
-          </a:p>
-          <a:p>
-            <a:pPr>
-              <a:spcBef>
-                <a:spcPts val="1800"/>
-              </a:spcBef>
-            </a:pPr>
-            <a:endParaRPr lang="en-US" sz="3200" dirty="0"/>
-          </a:p>
-          <a:p>
-            <a:pPr>
-              <a:spcBef>
-                <a:spcPts val="1800"/>
-              </a:spcBef>
-            </a:pPr>
-            <a:r>
-              <a:rPr lang="en-US" sz="3200" dirty="0"/>
-              <a:t>Utilize the current VMware and Citrix infrastructure for application access and delivery</a:t>
-            </a:r>
-          </a:p>
-          <a:p>
-            <a:pPr>
-              <a:spcBef>
-                <a:spcPts val="1800"/>
-              </a:spcBef>
-            </a:pPr>
-            <a:endParaRPr lang="en-US" sz="3200" dirty="0"/>
-          </a:p>
-          <a:p>
-            <a:pPr>
-              <a:spcBef>
-                <a:spcPts val="1800"/>
-              </a:spcBef>
-            </a:pPr>
-            <a:r>
-              <a:rPr lang="en-US" sz="3200" dirty="0"/>
-              <a:t>Create a standardized desktop image for users</a:t>
-            </a:r>
+            <a:r>
+              <a:rPr lang="en-US" sz="3600" dirty="0"/>
+              <a:t>24x7 access to applications</a:t>
+            </a:r>
+          </a:p>
+          <a:p>
+            <a:endParaRPr lang="en-US" sz="3600" dirty="0">
+              <a:latin typeface="+mj-lt"/>
+            </a:endParaRPr>
+          </a:p>
+          <a:p>
+            <a:r>
+              <a:rPr lang="en-US" sz="3600" dirty="0"/>
+              <a:t>High availability with limited capital investment</a:t>
+            </a:r>
+          </a:p>
+          <a:p>
+            <a:endParaRPr lang="en-US" sz="3600" dirty="0">
+              <a:latin typeface="+mj-lt"/>
+            </a:endParaRPr>
+          </a:p>
+          <a:p>
+            <a:r>
+              <a:rPr lang="en-US" sz="3600" dirty="0"/>
+              <a:t>Ability to scale resources as demand increases</a:t>
+            </a:r>
+          </a:p>
+          <a:p>
+            <a:endParaRPr lang="en-US" sz="3600" dirty="0">
+              <a:latin typeface="+mj-lt"/>
+            </a:endParaRPr>
+          </a:p>
+          <a:p>
+            <a:r>
+              <a:rPr lang="en-US" sz="3600" dirty="0"/>
+              <a:t>Network connections should be resilient with low latency to applications</a:t>
+            </a:r>
+            <a:endParaRPr lang="en-US" sz="2800" dirty="0">
+              <a:latin typeface="+mj-lt"/>
+            </a:endParaRPr>
+          </a:p>
+          <a:p>
+            <a:endParaRPr lang="en-IE" dirty="0"/>
           </a:p>
         </p:txBody>
       </p:sp>
@@ -21649,7 +21910,7 @@
           <a:p>
             <a:r>
               <a:rPr lang="en-IE" dirty="0"/>
-              <a:t>Customer Needs—Deployment Acceleration</a:t>
+              <a:t>Customer Needs—Availability and Scalability</a:t>
             </a:r>
           </a:p>
         </p:txBody>
@@ -21657,7 +21918,7 @@
     </p:spTree>
     <p:extLst>
       <p:ext uri="{BB962C8B-B14F-4D97-AF65-F5344CB8AC3E}">
-        <p14:creationId xmlns:p14="http://schemas.microsoft.com/office/powerpoint/2010/main" val="2119545179"/>
+        <p14:creationId xmlns:p14="http://schemas.microsoft.com/office/powerpoint/2010/main" val="3715253765"/>
       </p:ext>
     </p:extLst>
   </p:cSld>

</xml_diff>